<commit_message>
adding Geo and Text in SQL query examples
</commit_message>
<xml_diff>
--- a/mongodb-find-agg-vs-oracle-sql.pptx
+++ b/mongodb-find-agg-vs-oracle-sql.pptx
@@ -139,10 +139,10 @@
   </p:defaultTextStyle>
   <p:extLst>
     <p:ext uri="{EFAFB233-063F-42B5-8137-9DF3F51BA10A}">
-      <p15:sldGuideLst xmlns="" xmlns:p15="http://schemas.microsoft.com/office/powerpoint/2012/main"/>
+      <p15:sldGuideLst xmlns:p15="http://schemas.microsoft.com/office/powerpoint/2012/main" xmlns=""/>
     </p:ext>
     <p:ext uri="{2D200454-40CA-4A62-9FC3-DE9A4176ACB9}">
-      <p15:notesGuideLst xmlns="" xmlns:p15="http://schemas.microsoft.com/office/powerpoint/2012/main"/>
+      <p15:notesGuideLst xmlns:p15="http://schemas.microsoft.com/office/powerpoint/2012/main" xmlns=""/>
     </p:ext>
   </p:extLst>
 </p:presentation>
@@ -230,7 +230,7 @@
           <a:p>
             <a:fld id="{8DBB006A-2783-4486-9514-6DFE1115B29F}" type="datetimeFigureOut">
               <a:rPr lang="en-US" smtClean="0"/>
-              <a:t>2/26/2017</a:t>
+              <a:t>2/28/2017</a:t>
             </a:fld>
             <a:endParaRPr lang="en-US"/>
           </a:p>
@@ -22313,11 +22313,6 @@
               </a:rPr>
               <a:t>O</a:t>
             </a:r>
-            <a:endParaRPr lang="nl-NL" sz="7200" dirty="0">
-              <a:solidFill>
-                <a:srgbClr val="FF0000"/>
-              </a:solidFill>
-            </a:endParaRPr>
           </a:p>
         </p:txBody>
       </p:sp>
@@ -23581,9 +23576,6 @@
               </a:rPr>
               <a:t>)</a:t>
             </a:r>
-            <a:endParaRPr lang="en-US" dirty="0">
-              <a:latin typeface="Lucida Console" panose="020B0609040504020204" pitchFamily="49" charset="0"/>
-            </a:endParaRPr>
           </a:p>
         </p:txBody>
       </p:sp>
@@ -26440,9 +26432,6 @@
               </a:rPr>
               <a:t>)</a:t>
             </a:r>
-            <a:endParaRPr lang="en-US" sz="2000" dirty="0">
-              <a:latin typeface="Lucida Console" panose="020B0609040504020204" pitchFamily="49" charset="0"/>
-            </a:endParaRPr>
           </a:p>
         </p:txBody>
       </p:sp>
@@ -33709,8 +33698,17 @@
               <a:rPr lang="en-US" sz="1600" dirty="0">
                 <a:latin typeface="Lucida Console" panose="020B0609040504020204" pitchFamily="49" charset="0"/>
               </a:rPr>
-              <a:t>-- create index </a:t>
-            </a:r>
+              <a:t>-- create </a:t>
+            </a:r>
+            <a:r>
+              <a:rPr lang="en-US" sz="1600" dirty="0" smtClean="0">
+                <a:latin typeface="Lucida Console" panose="020B0609040504020204" pitchFamily="49" charset="0"/>
+              </a:rPr>
+              <a:t>spatial index </a:t>
+            </a:r>
+            <a:endParaRPr lang="en-US" sz="1600" dirty="0">
+              <a:latin typeface="Lucida Console" panose="020B0609040504020204" pitchFamily="49" charset="0"/>
+            </a:endParaRPr>
           </a:p>
           <a:p>
             <a:r>
@@ -33785,7 +33783,7 @@
         <p:spPr>
           <a:xfrm>
             <a:off x="8798166" y="1727200"/>
-            <a:ext cx="7800734" cy="923330"/>
+            <a:ext cx="7800734" cy="7971413"/>
           </a:xfrm>
           <a:prstGeom prst="rect">
             <a:avLst/>
@@ -33799,52 +33797,635 @@
           <a:lstStyle/>
           <a:p>
             <a:r>
-              <a:rPr lang="nl-NL" sz="1800" dirty="0" smtClean="0">
+              <a:rPr lang="nl-NL" sz="1600" dirty="0" smtClean="0">
                 <a:latin typeface="Lucida Console" panose="020B0609040504020204" pitchFamily="49" charset="0"/>
               </a:rPr>
               <a:t>-- </a:t>
             </a:r>
             <a:r>
-              <a:rPr lang="nl-NL" sz="1800" dirty="0" err="1" smtClean="0">
-                <a:latin typeface="Lucida Console" panose="020B0609040504020204" pitchFamily="49" charset="0"/>
-              </a:rPr>
-              <a:t>Locator</a:t>
-            </a:r>
-            <a:r>
-              <a:rPr lang="nl-NL" sz="1800" dirty="0" smtClean="0">
+              <a:rPr lang="nl-NL" sz="1600" dirty="0" err="1" smtClean="0">
+                <a:latin typeface="Lucida Console" panose="020B0609040504020204" pitchFamily="49" charset="0"/>
+              </a:rPr>
+              <a:t>add</a:t>
+            </a:r>
+            <a:r>
+              <a:rPr lang="nl-NL" sz="1600" dirty="0" smtClean="0">
+                <a:latin typeface="Lucida Console" panose="020B0609040504020204" pitchFamily="49" charset="0"/>
+              </a:rPr>
+              <a:t> column </a:t>
+            </a:r>
+            <a:r>
+              <a:rPr lang="nl-NL" sz="1600" dirty="0" err="1" smtClean="0">
+                <a:latin typeface="Lucida Console" panose="020B0609040504020204" pitchFamily="49" charset="0"/>
+              </a:rPr>
+              <a:t>geo_location</a:t>
+            </a:r>
+            <a:r>
+              <a:rPr lang="nl-NL" sz="1600" dirty="0" smtClean="0">
                 <a:latin typeface="Lucida Console" panose="020B0609040504020204" pitchFamily="49" charset="0"/>
               </a:rPr>
               <a:t> </a:t>
             </a:r>
-          </a:p>
-          <a:p>
-            <a:r>
-              <a:rPr lang="nl-NL" sz="1800" dirty="0">
+            <a:r>
+              <a:rPr lang="nl-NL" sz="1600" dirty="0" err="1" smtClean="0">
+                <a:latin typeface="Lucida Console" panose="020B0609040504020204" pitchFamily="49" charset="0"/>
+              </a:rPr>
+              <a:t>to</a:t>
+            </a:r>
+            <a:r>
+              <a:rPr lang="nl-NL" sz="1600" dirty="0" smtClean="0">
+                <a:latin typeface="Lucida Console" panose="020B0609040504020204" pitchFamily="49" charset="0"/>
+              </a:rPr>
+              <a:t> </a:t>
+            </a:r>
+            <a:r>
+              <a:rPr lang="nl-NL" sz="1600" dirty="0" err="1" smtClean="0">
+                <a:latin typeface="Lucida Console" panose="020B0609040504020204" pitchFamily="49" charset="0"/>
+              </a:rPr>
+              <a:t>hold</a:t>
+            </a:r>
+            <a:r>
+              <a:rPr lang="nl-NL" sz="1600" dirty="0" smtClean="0">
+                <a:latin typeface="Lucida Console" panose="020B0609040504020204" pitchFamily="49" charset="0"/>
+              </a:rPr>
+              <a:t> SDO_GEOMETRY</a:t>
+            </a:r>
+          </a:p>
+          <a:p>
+            <a:r>
+              <a:rPr lang="en-US" sz="1600" dirty="0" smtClean="0">
+                <a:latin typeface="Lucida Console" panose="020B0609040504020204" pitchFamily="49" charset="0"/>
+              </a:rPr>
+              <a:t>alter </a:t>
+            </a:r>
+            <a:r>
+              <a:rPr lang="en-US" sz="1600" dirty="0">
+                <a:latin typeface="Lucida Console" panose="020B0609040504020204" pitchFamily="49" charset="0"/>
+              </a:rPr>
+              <a:t>table </a:t>
+            </a:r>
+            <a:r>
+              <a:rPr lang="en-US" sz="1600" dirty="0" err="1">
+                <a:latin typeface="Lucida Console" panose="020B0609040504020204" pitchFamily="49" charset="0"/>
+              </a:rPr>
+              <a:t>dept</a:t>
+            </a:r>
+            <a:endParaRPr lang="en-US" sz="1600" dirty="0">
+              <a:latin typeface="Lucida Console" panose="020B0609040504020204" pitchFamily="49" charset="0"/>
+            </a:endParaRPr>
+          </a:p>
+          <a:p>
+            <a:r>
+              <a:rPr lang="en-US" sz="1600" dirty="0">
+                <a:latin typeface="Lucida Console" panose="020B0609040504020204" pitchFamily="49" charset="0"/>
+              </a:rPr>
+              <a:t>add (</a:t>
+            </a:r>
+            <a:r>
+              <a:rPr lang="en-US" sz="1600" dirty="0" err="1">
+                <a:latin typeface="Lucida Console" panose="020B0609040504020204" pitchFamily="49" charset="0"/>
+              </a:rPr>
+              <a:t>geo_location</a:t>
+            </a:r>
+            <a:r>
+              <a:rPr lang="en-US" sz="1600" dirty="0">
+                <a:latin typeface="Lucida Console" panose="020B0609040504020204" pitchFamily="49" charset="0"/>
+              </a:rPr>
+              <a:t> SDO_GEOMETRY</a:t>
+            </a:r>
+            <a:r>
+              <a:rPr lang="en-US" sz="1600" dirty="0" smtClean="0">
+                <a:latin typeface="Lucida Console" panose="020B0609040504020204" pitchFamily="49" charset="0"/>
+              </a:rPr>
+              <a:t>)</a:t>
+            </a:r>
+          </a:p>
+          <a:p>
+            <a:endParaRPr lang="nl-NL" sz="1600" dirty="0" smtClean="0">
+              <a:latin typeface="Lucida Console" panose="020B0609040504020204" pitchFamily="49" charset="0"/>
+            </a:endParaRPr>
+          </a:p>
+          <a:p>
+            <a:r>
+              <a:rPr lang="nl-NL" sz="1600" dirty="0" smtClean="0">
+                <a:latin typeface="Lucida Console" panose="020B0609040504020204" pitchFamily="49" charset="0"/>
+              </a:rPr>
+              <a:t>-- </a:t>
+            </a:r>
+            <a:r>
+              <a:rPr lang="nl-NL" sz="1600" dirty="0" err="1" smtClean="0">
+                <a:latin typeface="Lucida Console" panose="020B0609040504020204" pitchFamily="49" charset="0"/>
+              </a:rPr>
+              <a:t>add</a:t>
+            </a:r>
+            <a:r>
+              <a:rPr lang="nl-NL" sz="1600" dirty="0" smtClean="0">
+                <a:latin typeface="Lucida Console" panose="020B0609040504020204" pitchFamily="49" charset="0"/>
+              </a:rPr>
+              <a:t> </a:t>
+            </a:r>
+            <a:r>
+              <a:rPr lang="nl-NL" sz="1600" dirty="0" err="1" smtClean="0">
+                <a:latin typeface="Lucida Console" panose="020B0609040504020204" pitchFamily="49" charset="0"/>
+              </a:rPr>
+              <a:t>geo</a:t>
+            </a:r>
+            <a:r>
+              <a:rPr lang="nl-NL" sz="1600" dirty="0" smtClean="0">
+                <a:latin typeface="Lucida Console" panose="020B0609040504020204" pitchFamily="49" charset="0"/>
+              </a:rPr>
+              <a:t> </a:t>
+            </a:r>
+            <a:r>
+              <a:rPr lang="nl-NL" sz="1600" dirty="0" err="1" smtClean="0">
+                <a:latin typeface="Lucida Console" panose="020B0609040504020204" pitchFamily="49" charset="0"/>
+              </a:rPr>
+              <a:t>location</a:t>
+            </a:r>
+            <a:r>
+              <a:rPr lang="nl-NL" sz="1600" dirty="0" smtClean="0">
+                <a:latin typeface="Lucida Console" panose="020B0609040504020204" pitchFamily="49" charset="0"/>
+              </a:rPr>
+              <a:t> </a:t>
+            </a:r>
+            <a:r>
+              <a:rPr lang="nl-NL" sz="1600" dirty="0" err="1" smtClean="0">
+                <a:latin typeface="Lucida Console" panose="020B0609040504020204" pitchFamily="49" charset="0"/>
+              </a:rPr>
+              <a:t>to</a:t>
+            </a:r>
+            <a:r>
+              <a:rPr lang="nl-NL" sz="1600" dirty="0" smtClean="0">
+                <a:latin typeface="Lucida Console" panose="020B0609040504020204" pitchFamily="49" charset="0"/>
+              </a:rPr>
+              <a:t> </a:t>
+            </a:r>
+            <a:r>
+              <a:rPr lang="nl-NL" sz="1600" dirty="0" err="1" smtClean="0">
+                <a:latin typeface="Lucida Console" panose="020B0609040504020204" pitchFamily="49" charset="0"/>
+              </a:rPr>
+              <a:t>each</a:t>
+            </a:r>
+            <a:r>
+              <a:rPr lang="nl-NL" sz="1600" dirty="0" smtClean="0">
+                <a:latin typeface="Lucida Console" panose="020B0609040504020204" pitchFamily="49" charset="0"/>
+              </a:rPr>
+              <a:t> </a:t>
+            </a:r>
+            <a:r>
+              <a:rPr lang="nl-NL" sz="1600" dirty="0" err="1" smtClean="0">
+                <a:latin typeface="Lucida Console" panose="020B0609040504020204" pitchFamily="49" charset="0"/>
+              </a:rPr>
+              <a:t>department</a:t>
+            </a:r>
+            <a:endParaRPr lang="nl-NL" sz="1600" dirty="0">
+              <a:latin typeface="Lucida Console" panose="020B0609040504020204" pitchFamily="49" charset="0"/>
+            </a:endParaRPr>
+          </a:p>
+          <a:p>
+            <a:r>
+              <a:rPr lang="en-US" sz="1600" dirty="0">
+                <a:latin typeface="Lucida Console" panose="020B0609040504020204" pitchFamily="49" charset="0"/>
+              </a:rPr>
+              <a:t>update </a:t>
+            </a:r>
+            <a:r>
+              <a:rPr lang="en-US" sz="1600" dirty="0" err="1">
+                <a:latin typeface="Lucida Console" panose="020B0609040504020204" pitchFamily="49" charset="0"/>
+              </a:rPr>
+              <a:t>dept</a:t>
+            </a:r>
+            <a:endParaRPr lang="en-US" sz="1600" dirty="0">
+              <a:latin typeface="Lucida Console" panose="020B0609040504020204" pitchFamily="49" charset="0"/>
+            </a:endParaRPr>
+          </a:p>
+          <a:p>
+            <a:r>
+              <a:rPr lang="en-US" sz="1600" dirty="0">
+                <a:latin typeface="Lucida Console" panose="020B0609040504020204" pitchFamily="49" charset="0"/>
+              </a:rPr>
+              <a:t>set    </a:t>
+            </a:r>
+            <a:r>
+              <a:rPr lang="en-US" sz="1600" dirty="0" err="1">
+                <a:latin typeface="Lucida Console" panose="020B0609040504020204" pitchFamily="49" charset="0"/>
+              </a:rPr>
+              <a:t>geo_location</a:t>
+            </a:r>
+            <a:r>
+              <a:rPr lang="en-US" sz="1600" dirty="0">
+                <a:latin typeface="Lucida Console" panose="020B0609040504020204" pitchFamily="49" charset="0"/>
+              </a:rPr>
+              <a:t> = SDO_GEOMETRY(2001, 8307</a:t>
+            </a:r>
+            <a:r>
+              <a:rPr lang="en-US" sz="1600" dirty="0" smtClean="0">
+                <a:latin typeface="Lucida Console" panose="020B0609040504020204" pitchFamily="49" charset="0"/>
+              </a:rPr>
+              <a:t>,</a:t>
+            </a:r>
+            <a:br>
+              <a:rPr lang="en-US" sz="1600" dirty="0" smtClean="0">
+                <a:latin typeface="Lucida Console" panose="020B0609040504020204" pitchFamily="49" charset="0"/>
+              </a:rPr>
+            </a:br>
+            <a:r>
+              <a:rPr lang="en-US" sz="1600" dirty="0" smtClean="0">
+                <a:latin typeface="Lucida Console" panose="020B0609040504020204" pitchFamily="49" charset="0"/>
+              </a:rPr>
+              <a:t>                   SDO_POINT_TYPE </a:t>
+            </a:r>
+            <a:r>
+              <a:rPr lang="en-US" sz="1600" dirty="0">
+                <a:latin typeface="Lucida Console" panose="020B0609040504020204" pitchFamily="49" charset="0"/>
+              </a:rPr>
+              <a:t>(-73.935242, 40.730610,NULL</a:t>
+            </a:r>
+            <a:r>
+              <a:rPr lang="en-US" sz="1600" dirty="0" smtClean="0">
+                <a:latin typeface="Lucida Console" panose="020B0609040504020204" pitchFamily="49" charset="0"/>
+              </a:rPr>
+              <a:t>)</a:t>
+            </a:r>
+            <a:br>
+              <a:rPr lang="en-US" sz="1600" dirty="0" smtClean="0">
+                <a:latin typeface="Lucida Console" panose="020B0609040504020204" pitchFamily="49" charset="0"/>
+              </a:rPr>
+            </a:br>
+            <a:r>
+              <a:rPr lang="en-US" sz="1600" dirty="0" smtClean="0">
+                <a:latin typeface="Lucida Console" panose="020B0609040504020204" pitchFamily="49" charset="0"/>
+              </a:rPr>
+              <a:t>                                  , </a:t>
+            </a:r>
+            <a:r>
+              <a:rPr lang="en-US" sz="1600" dirty="0">
+                <a:latin typeface="Lucida Console" panose="020B0609040504020204" pitchFamily="49" charset="0"/>
+              </a:rPr>
+              <a:t>NULL, NULL)</a:t>
+            </a:r>
+          </a:p>
+          <a:p>
+            <a:r>
+              <a:rPr lang="en-US" sz="1600" dirty="0">
+                <a:latin typeface="Lucida Console" panose="020B0609040504020204" pitchFamily="49" charset="0"/>
+              </a:rPr>
+              <a:t>where  </a:t>
+            </a:r>
+            <a:r>
+              <a:rPr lang="en-US" sz="1600" dirty="0" err="1">
+                <a:latin typeface="Lucida Console" panose="020B0609040504020204" pitchFamily="49" charset="0"/>
+              </a:rPr>
+              <a:t>loc</a:t>
+            </a:r>
+            <a:r>
+              <a:rPr lang="en-US" sz="1600" dirty="0">
+                <a:latin typeface="Lucida Console" panose="020B0609040504020204" pitchFamily="49" charset="0"/>
+              </a:rPr>
+              <a:t> = 'NEW YORK</a:t>
+            </a:r>
+            <a:r>
+              <a:rPr lang="en-US" sz="1600" dirty="0" smtClean="0">
+                <a:latin typeface="Lucida Console" panose="020B0609040504020204" pitchFamily="49" charset="0"/>
+              </a:rPr>
+              <a:t>'</a:t>
+            </a:r>
+          </a:p>
+          <a:p>
+            <a:endParaRPr lang="en-US" sz="1600" dirty="0">
+              <a:latin typeface="Lucida Console" panose="020B0609040504020204" pitchFamily="49" charset="0"/>
+            </a:endParaRPr>
+          </a:p>
+          <a:p>
+            <a:r>
+              <a:rPr lang="en-US" sz="1600" dirty="0" smtClean="0">
+                <a:latin typeface="Lucida Console" panose="020B0609040504020204" pitchFamily="49" charset="0"/>
+              </a:rPr>
+              <a:t>update </a:t>
+            </a:r>
+            <a:r>
+              <a:rPr lang="en-US" sz="1600" dirty="0" err="1">
+                <a:latin typeface="Lucida Console" panose="020B0609040504020204" pitchFamily="49" charset="0"/>
+              </a:rPr>
+              <a:t>dept</a:t>
+            </a:r>
+            <a:endParaRPr lang="en-US" sz="1600" dirty="0">
+              <a:latin typeface="Lucida Console" panose="020B0609040504020204" pitchFamily="49" charset="0"/>
+            </a:endParaRPr>
+          </a:p>
+          <a:p>
+            <a:r>
+              <a:rPr lang="en-US" sz="1600" dirty="0">
+                <a:latin typeface="Lucida Console" panose="020B0609040504020204" pitchFamily="49" charset="0"/>
+              </a:rPr>
+              <a:t>set    </a:t>
+            </a:r>
+            <a:r>
+              <a:rPr lang="en-US" sz="1600" dirty="0" err="1">
+                <a:latin typeface="Lucida Console" panose="020B0609040504020204" pitchFamily="49" charset="0"/>
+              </a:rPr>
+              <a:t>geo_location</a:t>
+            </a:r>
+            <a:r>
+              <a:rPr lang="en-US" sz="1600" dirty="0">
+                <a:latin typeface="Lucida Console" panose="020B0609040504020204" pitchFamily="49" charset="0"/>
+              </a:rPr>
+              <a:t> = SDO_GEOMETRY(2001, 8307</a:t>
+            </a:r>
+            <a:r>
+              <a:rPr lang="en-US" sz="1600" dirty="0" smtClean="0">
+                <a:latin typeface="Lucida Console" panose="020B0609040504020204" pitchFamily="49" charset="0"/>
+              </a:rPr>
+              <a:t>,</a:t>
+            </a:r>
+            <a:br>
+              <a:rPr lang="en-US" sz="1600" dirty="0" smtClean="0">
+                <a:latin typeface="Lucida Console" panose="020B0609040504020204" pitchFamily="49" charset="0"/>
+              </a:rPr>
+            </a:br>
+            <a:r>
+              <a:rPr lang="en-US" sz="1600" dirty="0" smtClean="0">
+                <a:latin typeface="Lucida Console" panose="020B0609040504020204" pitchFamily="49" charset="0"/>
+              </a:rPr>
+              <a:t>          SDO_POINT_TYPE </a:t>
+            </a:r>
+            <a:r>
+              <a:rPr lang="en-US" sz="1600" dirty="0">
+                <a:latin typeface="Lucida Console" panose="020B0609040504020204" pitchFamily="49" charset="0"/>
+              </a:rPr>
+              <a:t>(-96.8005, 32.7801,NULL), NULL, NULL)</a:t>
+            </a:r>
+          </a:p>
+          <a:p>
+            <a:r>
+              <a:rPr lang="en-US" sz="1600" dirty="0">
+                <a:latin typeface="Lucida Console" panose="020B0609040504020204" pitchFamily="49" charset="0"/>
+              </a:rPr>
+              <a:t>where  </a:t>
+            </a:r>
+            <a:r>
+              <a:rPr lang="en-US" sz="1600" dirty="0" err="1">
+                <a:latin typeface="Lucida Console" panose="020B0609040504020204" pitchFamily="49" charset="0"/>
+              </a:rPr>
+              <a:t>loc</a:t>
+            </a:r>
+            <a:r>
+              <a:rPr lang="en-US" sz="1600" dirty="0">
+                <a:latin typeface="Lucida Console" panose="020B0609040504020204" pitchFamily="49" charset="0"/>
+              </a:rPr>
+              <a:t> = 'DALLAS'</a:t>
+            </a:r>
+          </a:p>
+          <a:p>
+            <a:endParaRPr lang="nl-NL" sz="1600" dirty="0" smtClean="0">
+              <a:latin typeface="Lucida Console" panose="020B0609040504020204" pitchFamily="49" charset="0"/>
+            </a:endParaRPr>
+          </a:p>
+          <a:p>
+            <a:r>
+              <a:rPr lang="nl-NL" sz="1600" dirty="0" smtClean="0">
+                <a:latin typeface="Lucida Console" panose="020B0609040504020204" pitchFamily="49" charset="0"/>
+              </a:rPr>
+              <a:t>-- </a:t>
+            </a:r>
+            <a:r>
+              <a:rPr lang="nl-NL" sz="1600" dirty="0" err="1" smtClean="0">
+                <a:latin typeface="Lucida Console" panose="020B0609040504020204" pitchFamily="49" charset="0"/>
+              </a:rPr>
+              <a:t>insert</a:t>
+            </a:r>
+            <a:r>
+              <a:rPr lang="nl-NL" sz="1600" dirty="0" smtClean="0">
+                <a:latin typeface="Lucida Console" panose="020B0609040504020204" pitchFamily="49" charset="0"/>
+              </a:rPr>
+              <a:t> </a:t>
+            </a:r>
+            <a:r>
+              <a:rPr lang="en-US" sz="1600" dirty="0" smtClean="0">
+                <a:latin typeface="Lucida Console" panose="020B0609040504020204" pitchFamily="49" charset="0"/>
+              </a:rPr>
+              <a:t>dimensional meta information </a:t>
+            </a:r>
+            <a:r>
+              <a:rPr lang="en-US" sz="1600" dirty="0">
+                <a:latin typeface="Lucida Console" panose="020B0609040504020204" pitchFamily="49" charset="0"/>
+              </a:rPr>
+              <a:t>for the  spatial column</a:t>
+            </a:r>
+            <a:endParaRPr lang="nl-NL" sz="1600" dirty="0" smtClean="0">
+              <a:latin typeface="Lucida Console" panose="020B0609040504020204" pitchFamily="49" charset="0"/>
+            </a:endParaRPr>
+          </a:p>
+          <a:p>
+            <a:r>
+              <a:rPr lang="en-US" sz="1600" dirty="0">
+                <a:latin typeface="Lucida Console" panose="020B0609040504020204" pitchFamily="49" charset="0"/>
+              </a:rPr>
+              <a:t>INSERT INTO USER_SDO_GEOM_METADATA </a:t>
+            </a:r>
+          </a:p>
+          <a:p>
+            <a:r>
+              <a:rPr lang="en-US" sz="1600" dirty="0">
+                <a:latin typeface="Lucida Console" panose="020B0609040504020204" pitchFamily="49" charset="0"/>
+              </a:rPr>
+              <a:t>(TABLE_NAME, COLUMN_NAME, DIMINFO, SRID) </a:t>
+            </a:r>
+          </a:p>
+          <a:p>
+            <a:r>
+              <a:rPr lang="en-US" sz="1600" dirty="0">
+                <a:latin typeface="Lucida Console" panose="020B0609040504020204" pitchFamily="49" charset="0"/>
+              </a:rPr>
+              <a:t>VALUES ('DEPT', 'GEO_LOCATION', </a:t>
+            </a:r>
+          </a:p>
+          <a:p>
+            <a:r>
+              <a:rPr lang="en-US" sz="1600" dirty="0">
+                <a:latin typeface="Lucida Console" panose="020B0609040504020204" pitchFamily="49" charset="0"/>
+              </a:rPr>
+              <a:t>   SDO_DIM_ARRAY </a:t>
+            </a:r>
+          </a:p>
+          <a:p>
+            <a:r>
+              <a:rPr lang="en-US" sz="1600" dirty="0">
+                <a:latin typeface="Lucida Console" panose="020B0609040504020204" pitchFamily="49" charset="0"/>
+              </a:rPr>
+              <a:t>    </a:t>
+            </a:r>
+            <a:r>
+              <a:rPr lang="en-US" sz="1600" dirty="0" smtClean="0">
                 <a:latin typeface="Lucida Console" panose="020B0609040504020204" pitchFamily="49" charset="0"/>
               </a:rPr>
               <a:t>(</a:t>
             </a:r>
             <a:r>
-              <a:rPr lang="nl-NL" sz="1800" dirty="0">
-                <a:latin typeface="Lucida Console" panose="020B0609040504020204" pitchFamily="49" charset="0"/>
-                <a:hlinkClick r:id="rId2"/>
-              </a:rPr>
-              <a:t>https://</a:t>
-            </a:r>
-            <a:r>
-              <a:rPr lang="nl-NL" sz="1800" dirty="0" smtClean="0">
-                <a:latin typeface="Lucida Console" panose="020B0609040504020204" pitchFamily="49" charset="0"/>
-                <a:hlinkClick r:id="rId2"/>
-              </a:rPr>
-              <a:t>docs.oracle.com/cd/B25329_01/doc/appdev.102/b28004/xe_locator.htm</a:t>
-            </a:r>
-            <a:r>
-              <a:rPr lang="nl-NL" sz="1800" dirty="0" smtClean="0">
-                <a:latin typeface="Lucida Console" panose="020B0609040504020204" pitchFamily="49" charset="0"/>
-              </a:rPr>
-              <a:t> )</a:t>
-            </a:r>
-            <a:endParaRPr lang="en-US" sz="1800" dirty="0">
+              <a:rPr lang="en-US" sz="1600" dirty="0">
+                <a:latin typeface="Lucida Console" panose="020B0609040504020204" pitchFamily="49" charset="0"/>
+              </a:rPr>
+              <a:t>SDO_DIM_ELEMENT('LONG', -180.0, 180.0, 0.5), </a:t>
+            </a:r>
+          </a:p>
+          <a:p>
+            <a:r>
+              <a:rPr lang="en-US" sz="1600" dirty="0">
+                <a:latin typeface="Lucida Console" panose="020B0609040504020204" pitchFamily="49" charset="0"/>
+              </a:rPr>
+              <a:t>     SDO_DIM_ELEMENT('LAT', -90.0, 90.0, 0.5</a:t>
+            </a:r>
+            <a:r>
+              <a:rPr lang="en-US" sz="1600" dirty="0" smtClean="0">
+                <a:latin typeface="Lucida Console" panose="020B0609040504020204" pitchFamily="49" charset="0"/>
+              </a:rPr>
+              <a:t>)</a:t>
+            </a:r>
+          </a:p>
+          <a:p>
+            <a:r>
+              <a:rPr lang="en-US" sz="1600" dirty="0">
+                <a:latin typeface="Lucida Console" panose="020B0609040504020204" pitchFamily="49" charset="0"/>
+              </a:rPr>
+              <a:t> </a:t>
+            </a:r>
+            <a:r>
+              <a:rPr lang="en-US" sz="1600" dirty="0" smtClean="0">
+                <a:latin typeface="Lucida Console" panose="020B0609040504020204" pitchFamily="49" charset="0"/>
+              </a:rPr>
+              <a:t>   ), </a:t>
+            </a:r>
+            <a:endParaRPr lang="en-US" sz="1600" dirty="0">
+              <a:latin typeface="Lucida Console" panose="020B0609040504020204" pitchFamily="49" charset="0"/>
+            </a:endParaRPr>
+          </a:p>
+          <a:p>
+            <a:r>
+              <a:rPr lang="en-US" sz="1600" dirty="0">
+                <a:latin typeface="Lucida Console" panose="020B0609040504020204" pitchFamily="49" charset="0"/>
+              </a:rPr>
+              <a:t>   </a:t>
+            </a:r>
+            <a:r>
+              <a:rPr lang="en-US" sz="1600" dirty="0" smtClean="0">
+                <a:latin typeface="Lucida Console" panose="020B0609040504020204" pitchFamily="49" charset="0"/>
+              </a:rPr>
+              <a:t>  8307</a:t>
+            </a:r>
+          </a:p>
+          <a:p>
+            <a:r>
+              <a:rPr lang="en-US" sz="1600" dirty="0" smtClean="0">
+                <a:latin typeface="Lucida Console" panose="020B0609040504020204" pitchFamily="49" charset="0"/>
+              </a:rPr>
+              <a:t>);</a:t>
+            </a:r>
+            <a:endParaRPr lang="en-US" sz="1600" dirty="0">
+              <a:latin typeface="Lucida Console" panose="020B0609040504020204" pitchFamily="49" charset="0"/>
+            </a:endParaRPr>
+          </a:p>
+          <a:p>
+            <a:endParaRPr lang="en-US" sz="1600" dirty="0">
+              <a:latin typeface="Lucida Console" panose="020B0609040504020204" pitchFamily="49" charset="0"/>
+            </a:endParaRPr>
+          </a:p>
+          <a:p>
+            <a:r>
+              <a:rPr lang="en-US" sz="1600" dirty="0">
+                <a:latin typeface="Lucida Console" panose="020B0609040504020204" pitchFamily="49" charset="0"/>
+              </a:rPr>
+              <a:t>-- create </a:t>
+            </a:r>
+            <a:r>
+              <a:rPr lang="en-US" sz="1600" dirty="0" smtClean="0">
+                <a:latin typeface="Lucida Console" panose="020B0609040504020204" pitchFamily="49" charset="0"/>
+              </a:rPr>
+              <a:t>spatial index </a:t>
+            </a:r>
+            <a:endParaRPr lang="en-US" sz="1600" dirty="0">
+              <a:latin typeface="Lucida Console" panose="020B0609040504020204" pitchFamily="49" charset="0"/>
+            </a:endParaRPr>
+          </a:p>
+          <a:p>
+            <a:r>
+              <a:rPr lang="en-US" sz="1600" dirty="0" smtClean="0">
+                <a:latin typeface="Lucida Console" panose="020B0609040504020204" pitchFamily="49" charset="0"/>
+              </a:rPr>
+              <a:t>CREATE </a:t>
+            </a:r>
+            <a:r>
+              <a:rPr lang="en-US" sz="1600" dirty="0">
+                <a:latin typeface="Lucida Console" panose="020B0609040504020204" pitchFamily="49" charset="0"/>
+              </a:rPr>
+              <a:t>INDEX </a:t>
+            </a:r>
+            <a:r>
+              <a:rPr lang="en-US" sz="1600" dirty="0" err="1">
+                <a:latin typeface="Lucida Console" panose="020B0609040504020204" pitchFamily="49" charset="0"/>
+              </a:rPr>
+              <a:t>dept_spatial_idx</a:t>
+            </a:r>
+            <a:r>
+              <a:rPr lang="en-US" sz="1600" dirty="0">
+                <a:latin typeface="Lucida Console" panose="020B0609040504020204" pitchFamily="49" charset="0"/>
+              </a:rPr>
+              <a:t> </a:t>
+            </a:r>
+          </a:p>
+          <a:p>
+            <a:r>
+              <a:rPr lang="en-US" sz="1600" dirty="0">
+                <a:latin typeface="Lucida Console" panose="020B0609040504020204" pitchFamily="49" charset="0"/>
+              </a:rPr>
+              <a:t>ON </a:t>
+            </a:r>
+            <a:r>
+              <a:rPr lang="en-US" sz="1600" dirty="0" err="1">
+                <a:latin typeface="Lucida Console" panose="020B0609040504020204" pitchFamily="49" charset="0"/>
+              </a:rPr>
+              <a:t>dept</a:t>
+            </a:r>
+            <a:r>
+              <a:rPr lang="en-US" sz="1600" dirty="0">
+                <a:latin typeface="Lucida Console" panose="020B0609040504020204" pitchFamily="49" charset="0"/>
+              </a:rPr>
+              <a:t>(</a:t>
+            </a:r>
+            <a:r>
+              <a:rPr lang="en-US" sz="1600" dirty="0" err="1">
+                <a:latin typeface="Lucida Console" panose="020B0609040504020204" pitchFamily="49" charset="0"/>
+              </a:rPr>
+              <a:t>geo_location</a:t>
+            </a:r>
+            <a:r>
+              <a:rPr lang="en-US" sz="1600" dirty="0">
+                <a:latin typeface="Lucida Console" panose="020B0609040504020204" pitchFamily="49" charset="0"/>
+              </a:rPr>
+              <a:t>)</a:t>
+            </a:r>
+          </a:p>
+          <a:p>
+            <a:r>
+              <a:rPr lang="en-US" sz="1600" dirty="0">
+                <a:latin typeface="Lucida Console" panose="020B0609040504020204" pitchFamily="49" charset="0"/>
+              </a:rPr>
+              <a:t>INDEXTYPE IS </a:t>
+            </a:r>
+            <a:r>
+              <a:rPr lang="en-US" sz="1600" dirty="0" err="1">
+                <a:latin typeface="Lucida Console" panose="020B0609040504020204" pitchFamily="49" charset="0"/>
+              </a:rPr>
+              <a:t>mdsys.spatial_index</a:t>
+            </a:r>
+            <a:r>
+              <a:rPr lang="en-US" sz="1600" dirty="0">
+                <a:latin typeface="Lucida Console" panose="020B0609040504020204" pitchFamily="49" charset="0"/>
+              </a:rPr>
+              <a:t>;</a:t>
+            </a:r>
+          </a:p>
+          <a:p>
+            <a:endParaRPr lang="en-US" sz="1600" dirty="0">
               <a:latin typeface="Lucida Console" panose="020B0609040504020204" pitchFamily="49" charset="0"/>
             </a:endParaRPr>
           </a:p>
@@ -34163,7 +34744,7 @@
         <p:spPr>
           <a:xfrm>
             <a:off x="8798166" y="1727200"/>
-            <a:ext cx="7800734" cy="923330"/>
+            <a:ext cx="7800734" cy="4524315"/>
           </a:xfrm>
           <a:prstGeom prst="rect">
             <a:avLst/>
@@ -34177,54 +34758,254 @@
           <a:lstStyle/>
           <a:p>
             <a:r>
+              <a:rPr lang="nl-NL" sz="1800" dirty="0" err="1">
+                <a:latin typeface="Lucida Console" panose="020B0609040504020204" pitchFamily="49" charset="0"/>
+              </a:rPr>
+              <a:t>with</a:t>
+            </a:r>
+            <a:r>
+              <a:rPr lang="nl-NL" sz="1800" dirty="0">
+                <a:latin typeface="Lucida Console" panose="020B0609040504020204" pitchFamily="49" charset="0"/>
+              </a:rPr>
+              <a:t> d as</a:t>
+            </a:r>
+          </a:p>
+          <a:p>
+            <a:r>
+              <a:rPr lang="nl-NL" sz="1800" dirty="0">
+                <a:latin typeface="Lucida Console" panose="020B0609040504020204" pitchFamily="49" charset="0"/>
+              </a:rPr>
+              <a:t>( SELECT </a:t>
+            </a:r>
+            <a:r>
               <a:rPr lang="nl-NL" sz="1800" dirty="0" smtClean="0">
                 <a:latin typeface="Lucida Console" panose="020B0609040504020204" pitchFamily="49" charset="0"/>
               </a:rPr>
-              <a:t>-- </a:t>
-            </a:r>
-            <a:r>
-              <a:rPr lang="nl-NL" sz="1800" dirty="0" err="1" smtClean="0">
-                <a:latin typeface="Lucida Console" panose="020B0609040504020204" pitchFamily="49" charset="0"/>
-              </a:rPr>
-              <a:t>Locator</a:t>
-            </a:r>
-            <a:r>
-              <a:rPr lang="nl-NL" sz="1800" dirty="0" smtClean="0">
-                <a:latin typeface="Lucida Console" panose="020B0609040504020204" pitchFamily="49" charset="0"/>
-              </a:rPr>
-              <a:t> </a:t>
-            </a:r>
-          </a:p>
-          <a:p>
-            <a:r>
-              <a:rPr lang="nl-NL" sz="1800" dirty="0">
-                <a:latin typeface="Lucida Console" panose="020B0609040504020204" pitchFamily="49" charset="0"/>
-              </a:rPr>
-              <a:t>(</a:t>
-            </a:r>
-            <a:r>
-              <a:rPr lang="nl-NL" sz="1800" dirty="0">
-                <a:latin typeface="Lucida Console" panose="020B0609040504020204" pitchFamily="49" charset="0"/>
-                <a:hlinkClick r:id="rId2"/>
-              </a:rPr>
-              <a:t>https://</a:t>
-            </a:r>
-            <a:r>
-              <a:rPr lang="nl-NL" sz="1800" dirty="0" smtClean="0">
-                <a:latin typeface="Lucida Console" panose="020B0609040504020204" pitchFamily="49" charset="0"/>
-                <a:hlinkClick r:id="rId2"/>
-              </a:rPr>
-              <a:t>docs.oracle.com/cd/B25329_01/doc/appdev.102/b28004/xe_locator.htm</a:t>
-            </a:r>
-            <a:r>
-              <a:rPr lang="nl-NL" sz="1800" dirty="0" smtClean="0">
-                <a:latin typeface="Lucida Console" panose="020B0609040504020204" pitchFamily="49" charset="0"/>
-              </a:rPr>
-              <a:t> )</a:t>
-            </a:r>
-            <a:endParaRPr lang="en-US" sz="1800" dirty="0">
+              <a:t>loc</a:t>
+            </a:r>
+            <a:endParaRPr lang="nl-NL" sz="1800" dirty="0">
               <a:latin typeface="Lucida Console" panose="020B0609040504020204" pitchFamily="49" charset="0"/>
             </a:endParaRPr>
+          </a:p>
+          <a:p>
+            <a:r>
+              <a:rPr lang="nl-NL" sz="1800" dirty="0">
+                <a:latin typeface="Lucida Console" panose="020B0609040504020204" pitchFamily="49" charset="0"/>
+              </a:rPr>
+              <a:t>  ,      SDO_GEOM.SDO_DISTANCE</a:t>
+            </a:r>
+          </a:p>
+          <a:p>
+            <a:r>
+              <a:rPr lang="nl-NL" sz="1800" dirty="0">
+                <a:latin typeface="Lucida Console" panose="020B0609040504020204" pitchFamily="49" charset="0"/>
+              </a:rPr>
+              <a:t>         ( SDO_GEOMETRY(2001, </a:t>
+            </a:r>
+            <a:r>
+              <a:rPr lang="nl-NL" sz="1800" dirty="0" smtClean="0">
+                <a:latin typeface="Lucida Console" panose="020B0609040504020204" pitchFamily="49" charset="0"/>
+              </a:rPr>
+              <a:t>8307</a:t>
+            </a:r>
+            <a:br>
+              <a:rPr lang="nl-NL" sz="1800" dirty="0" smtClean="0">
+                <a:latin typeface="Lucida Console" panose="020B0609040504020204" pitchFamily="49" charset="0"/>
+              </a:rPr>
+            </a:br>
+            <a:r>
+              <a:rPr lang="nl-NL" sz="1800" dirty="0" smtClean="0">
+                <a:latin typeface="Lucida Console" panose="020B0609040504020204" pitchFamily="49" charset="0"/>
+              </a:rPr>
+              <a:t>         , SDO_POINT_TYPE </a:t>
+            </a:r>
+            <a:r>
+              <a:rPr lang="nl-NL" sz="1800" dirty="0">
+                <a:latin typeface="Lucida Console" panose="020B0609040504020204" pitchFamily="49" charset="0"/>
+              </a:rPr>
+              <a:t>( -77.0364, 38.8951,NULL</a:t>
+            </a:r>
+            <a:r>
+              <a:rPr lang="nl-NL" sz="1800" dirty="0" smtClean="0">
+                <a:latin typeface="Lucida Console" panose="020B0609040504020204" pitchFamily="49" charset="0"/>
+              </a:rPr>
+              <a:t>)</a:t>
+            </a:r>
+            <a:br>
+              <a:rPr lang="nl-NL" sz="1800" dirty="0" smtClean="0">
+                <a:latin typeface="Lucida Console" panose="020B0609040504020204" pitchFamily="49" charset="0"/>
+              </a:rPr>
+            </a:br>
+            <a:r>
+              <a:rPr lang="nl-NL" sz="1800" dirty="0" smtClean="0">
+                <a:latin typeface="Lucida Console" panose="020B0609040504020204" pitchFamily="49" charset="0"/>
+              </a:rPr>
+              <a:t>         , </a:t>
+            </a:r>
+            <a:r>
+              <a:rPr lang="nl-NL" sz="1800" dirty="0">
+                <a:latin typeface="Lucida Console" panose="020B0609040504020204" pitchFamily="49" charset="0"/>
+              </a:rPr>
+              <a:t>NULL, </a:t>
+            </a:r>
+            <a:r>
+              <a:rPr lang="nl-NL" sz="1800" dirty="0" smtClean="0">
+                <a:latin typeface="Lucida Console" panose="020B0609040504020204" pitchFamily="49" charset="0"/>
+              </a:rPr>
+              <a:t>NULL</a:t>
+            </a:r>
+            <a:br>
+              <a:rPr lang="nl-NL" sz="1800" dirty="0" smtClean="0">
+                <a:latin typeface="Lucida Console" panose="020B0609040504020204" pitchFamily="49" charset="0"/>
+              </a:rPr>
+            </a:br>
+            <a:r>
+              <a:rPr lang="nl-NL" sz="1800" dirty="0" smtClean="0">
+                <a:latin typeface="Lucida Console" panose="020B0609040504020204" pitchFamily="49" charset="0"/>
+              </a:rPr>
+              <a:t>         )</a:t>
+            </a:r>
+            <a:endParaRPr lang="nl-NL" sz="1800" dirty="0">
+              <a:latin typeface="Lucida Console" panose="020B0609040504020204" pitchFamily="49" charset="0"/>
+            </a:endParaRPr>
+          </a:p>
+          <a:p>
+            <a:r>
+              <a:rPr lang="nl-NL" sz="1800" dirty="0">
+                <a:latin typeface="Lucida Console" panose="020B0609040504020204" pitchFamily="49" charset="0"/>
+              </a:rPr>
+              <a:t>         , </a:t>
+            </a:r>
+            <a:r>
+              <a:rPr lang="nl-NL" sz="1800" dirty="0" err="1" smtClean="0">
+                <a:latin typeface="Lucida Console" panose="020B0609040504020204" pitchFamily="49" charset="0"/>
+              </a:rPr>
+              <a:t>geo_location</a:t>
+            </a:r>
+            <a:endParaRPr lang="nl-NL" sz="1800" dirty="0">
+              <a:latin typeface="Lucida Console" panose="020B0609040504020204" pitchFamily="49" charset="0"/>
+            </a:endParaRPr>
+          </a:p>
+          <a:p>
+            <a:r>
+              <a:rPr lang="nl-NL" sz="1800" dirty="0">
+                <a:latin typeface="Lucida Console" panose="020B0609040504020204" pitchFamily="49" charset="0"/>
+              </a:rPr>
+              <a:t>         , 0.005</a:t>
+            </a:r>
+          </a:p>
+          <a:p>
+            <a:r>
+              <a:rPr lang="nl-NL" sz="1800" dirty="0">
+                <a:latin typeface="Lucida Console" panose="020B0609040504020204" pitchFamily="49" charset="0"/>
+              </a:rPr>
+              <a:t>         , 'unit=KM'</a:t>
+            </a:r>
+          </a:p>
+          <a:p>
+            <a:r>
+              <a:rPr lang="nl-NL" sz="1800" dirty="0">
+                <a:latin typeface="Lucida Console" panose="020B0609040504020204" pitchFamily="49" charset="0"/>
+              </a:rPr>
+              <a:t>         ) </a:t>
+            </a:r>
+            <a:r>
+              <a:rPr lang="nl-NL" sz="1800" dirty="0" err="1">
+                <a:latin typeface="Lucida Console" panose="020B0609040504020204" pitchFamily="49" charset="0"/>
+              </a:rPr>
+              <a:t>distance</a:t>
+            </a:r>
+            <a:endParaRPr lang="nl-NL" sz="1800" dirty="0">
+              <a:latin typeface="Lucida Console" panose="020B0609040504020204" pitchFamily="49" charset="0"/>
+            </a:endParaRPr>
+          </a:p>
+          <a:p>
+            <a:r>
+              <a:rPr lang="nl-NL" sz="1800" dirty="0">
+                <a:latin typeface="Lucida Console" panose="020B0609040504020204" pitchFamily="49" charset="0"/>
+              </a:rPr>
+              <a:t>  </a:t>
+            </a:r>
+            <a:r>
+              <a:rPr lang="nl-NL" sz="1800" dirty="0" err="1">
+                <a:latin typeface="Lucida Console" panose="020B0609040504020204" pitchFamily="49" charset="0"/>
+              </a:rPr>
+              <a:t>from</a:t>
+            </a:r>
+            <a:r>
+              <a:rPr lang="nl-NL" sz="1800" dirty="0">
+                <a:latin typeface="Lucida Console" panose="020B0609040504020204" pitchFamily="49" charset="0"/>
+              </a:rPr>
+              <a:t>   </a:t>
+            </a:r>
+            <a:r>
+              <a:rPr lang="nl-NL" sz="1800" dirty="0" smtClean="0">
+                <a:latin typeface="Lucida Console" panose="020B0609040504020204" pitchFamily="49" charset="0"/>
+              </a:rPr>
+              <a:t>dept</a:t>
+            </a:r>
+            <a:endParaRPr lang="nl-NL" sz="1800" dirty="0">
+              <a:latin typeface="Lucida Console" panose="020B0609040504020204" pitchFamily="49" charset="0"/>
+            </a:endParaRPr>
+          </a:p>
+          <a:p>
+            <a:r>
+              <a:rPr lang="nl-NL" sz="1800" dirty="0" smtClean="0">
+                <a:latin typeface="Lucida Console" panose="020B0609040504020204" pitchFamily="49" charset="0"/>
+              </a:rPr>
+              <a:t>)</a:t>
+            </a:r>
+            <a:endParaRPr lang="nl-NL" sz="1800" dirty="0">
+              <a:latin typeface="Lucida Console" panose="020B0609040504020204" pitchFamily="49" charset="0"/>
+            </a:endParaRPr>
+          </a:p>
+          <a:p>
+            <a:r>
+              <a:rPr lang="nl-NL" sz="1800" dirty="0">
+                <a:latin typeface="Lucida Console" panose="020B0609040504020204" pitchFamily="49" charset="0"/>
+              </a:rPr>
+              <a:t>select d.*</a:t>
+            </a:r>
+          </a:p>
+          <a:p>
+            <a:r>
+              <a:rPr lang="nl-NL" sz="1800" dirty="0" err="1">
+                <a:latin typeface="Lucida Console" panose="020B0609040504020204" pitchFamily="49" charset="0"/>
+              </a:rPr>
+              <a:t>from</a:t>
+            </a:r>
+            <a:r>
+              <a:rPr lang="nl-NL" sz="1800" dirty="0">
+                <a:latin typeface="Lucida Console" panose="020B0609040504020204" pitchFamily="49" charset="0"/>
+              </a:rPr>
+              <a:t>   d</a:t>
+            </a:r>
+          </a:p>
+          <a:p>
+            <a:r>
+              <a:rPr lang="nl-NL" sz="1800" dirty="0" err="1">
+                <a:latin typeface="Lucida Console" panose="020B0609040504020204" pitchFamily="49" charset="0"/>
+              </a:rPr>
+              <a:t>where</a:t>
+            </a:r>
+            <a:r>
+              <a:rPr lang="nl-NL" sz="1800" dirty="0">
+                <a:latin typeface="Lucida Console" panose="020B0609040504020204" pitchFamily="49" charset="0"/>
+              </a:rPr>
+              <a:t>  </a:t>
+            </a:r>
+            <a:r>
+              <a:rPr lang="nl-NL" sz="1800" dirty="0" err="1">
+                <a:latin typeface="Lucida Console" panose="020B0609040504020204" pitchFamily="49" charset="0"/>
+              </a:rPr>
+              <a:t>d.distance</a:t>
+            </a:r>
+            <a:r>
+              <a:rPr lang="nl-NL" sz="1800" dirty="0">
+                <a:latin typeface="Lucida Console" panose="020B0609040504020204" pitchFamily="49" charset="0"/>
+              </a:rPr>
+              <a:t> &lt; 500</a:t>
+            </a:r>
           </a:p>
         </p:txBody>
       </p:sp>
@@ -34702,7 +35483,7 @@
         <p:spPr>
           <a:xfrm>
             <a:off x="8798166" y="1727200"/>
-            <a:ext cx="7800734" cy="923330"/>
+            <a:ext cx="7800734" cy="5632311"/>
           </a:xfrm>
           <a:prstGeom prst="rect">
             <a:avLst/>
@@ -34716,52 +35497,311 @@
           <a:lstStyle/>
           <a:p>
             <a:r>
+              <a:rPr lang="nl-NL" sz="1800" dirty="0" err="1">
+                <a:latin typeface="Lucida Console" panose="020B0609040504020204" pitchFamily="49" charset="0"/>
+              </a:rPr>
+              <a:t>with</a:t>
+            </a:r>
+            <a:r>
+              <a:rPr lang="nl-NL" sz="1800" dirty="0">
+                <a:latin typeface="Lucida Console" panose="020B0609040504020204" pitchFamily="49" charset="0"/>
+              </a:rPr>
+              <a:t> d as</a:t>
+            </a:r>
+          </a:p>
+          <a:p>
+            <a:r>
+              <a:rPr lang="nl-NL" sz="1800" dirty="0">
+                <a:latin typeface="Lucida Console" panose="020B0609040504020204" pitchFamily="49" charset="0"/>
+              </a:rPr>
+              <a:t>( SELECT </a:t>
+            </a:r>
+            <a:r>
               <a:rPr lang="nl-NL" sz="1800" dirty="0" smtClean="0">
                 <a:latin typeface="Lucida Console" panose="020B0609040504020204" pitchFamily="49" charset="0"/>
               </a:rPr>
-              <a:t>-- </a:t>
+              <a:t>loc</a:t>
+            </a:r>
+          </a:p>
+          <a:p>
+            <a:r>
+              <a:rPr lang="nl-NL" sz="1800" dirty="0">
+                <a:latin typeface="Lucida Console" panose="020B0609040504020204" pitchFamily="49" charset="0"/>
+              </a:rPr>
+              <a:t> </a:t>
+            </a:r>
+            <a:r>
+              <a:rPr lang="nl-NL" sz="1800" dirty="0" smtClean="0">
+                <a:latin typeface="Lucida Console" panose="020B0609040504020204" pitchFamily="49" charset="0"/>
+              </a:rPr>
+              <a:t> ,      </a:t>
             </a:r>
             <a:r>
               <a:rPr lang="nl-NL" sz="1800" dirty="0" err="1" smtClean="0">
                 <a:latin typeface="Lucida Console" panose="020B0609040504020204" pitchFamily="49" charset="0"/>
               </a:rPr>
-              <a:t>Locator</a:t>
-            </a:r>
+              <a:t>dname</a:t>
+            </a:r>
+            <a:endParaRPr lang="nl-NL" sz="1800" dirty="0">
+              <a:latin typeface="Lucida Console" panose="020B0609040504020204" pitchFamily="49" charset="0"/>
+            </a:endParaRPr>
+          </a:p>
+          <a:p>
+            <a:r>
+              <a:rPr lang="nl-NL" sz="1800" dirty="0">
+                <a:latin typeface="Lucida Console" panose="020B0609040504020204" pitchFamily="49" charset="0"/>
+              </a:rPr>
+              <a:t>  ,      SDO_GEOM.SDO_DISTANCE</a:t>
+            </a:r>
+          </a:p>
+          <a:p>
+            <a:r>
+              <a:rPr lang="nl-NL" sz="1800" dirty="0">
+                <a:latin typeface="Lucida Console" panose="020B0609040504020204" pitchFamily="49" charset="0"/>
+              </a:rPr>
+              <a:t>         ( SDO_GEOMETRY(2001, 8307</a:t>
+            </a:r>
+            <a:br>
+              <a:rPr lang="nl-NL" sz="1800" dirty="0">
+                <a:latin typeface="Lucida Console" panose="020B0609040504020204" pitchFamily="49" charset="0"/>
+              </a:rPr>
+            </a:br>
+            <a:r>
+              <a:rPr lang="nl-NL" sz="1800" dirty="0">
+                <a:latin typeface="Lucida Console" panose="020B0609040504020204" pitchFamily="49" charset="0"/>
+              </a:rPr>
+              <a:t>         , SDO_POINT_TYPE ( -77.0364, 38.8951,NULL)</a:t>
+            </a:r>
+            <a:br>
+              <a:rPr lang="nl-NL" sz="1800" dirty="0">
+                <a:latin typeface="Lucida Console" panose="020B0609040504020204" pitchFamily="49" charset="0"/>
+              </a:rPr>
+            </a:br>
+            <a:r>
+              <a:rPr lang="nl-NL" sz="1800" dirty="0">
+                <a:latin typeface="Lucida Console" panose="020B0609040504020204" pitchFamily="49" charset="0"/>
+              </a:rPr>
+              <a:t>         , NULL, NULL</a:t>
+            </a:r>
+            <a:br>
+              <a:rPr lang="nl-NL" sz="1800" dirty="0">
+                <a:latin typeface="Lucida Console" panose="020B0609040504020204" pitchFamily="49" charset="0"/>
+              </a:rPr>
+            </a:br>
+            <a:r>
+              <a:rPr lang="nl-NL" sz="1800" dirty="0">
+                <a:latin typeface="Lucida Console" panose="020B0609040504020204" pitchFamily="49" charset="0"/>
+              </a:rPr>
+              <a:t>         )</a:t>
+            </a:r>
+          </a:p>
+          <a:p>
+            <a:r>
+              <a:rPr lang="nl-NL" sz="1800" dirty="0">
+                <a:latin typeface="Lucida Console" panose="020B0609040504020204" pitchFamily="49" charset="0"/>
+              </a:rPr>
+              <a:t>         , </a:t>
+            </a:r>
+            <a:r>
+              <a:rPr lang="nl-NL" sz="1800" dirty="0" err="1">
+                <a:latin typeface="Lucida Console" panose="020B0609040504020204" pitchFamily="49" charset="0"/>
+              </a:rPr>
+              <a:t>geo_location</a:t>
+            </a:r>
+            <a:endParaRPr lang="nl-NL" sz="1800" dirty="0">
+              <a:latin typeface="Lucida Console" panose="020B0609040504020204" pitchFamily="49" charset="0"/>
+            </a:endParaRPr>
+          </a:p>
+          <a:p>
+            <a:r>
+              <a:rPr lang="nl-NL" sz="1800" dirty="0">
+                <a:latin typeface="Lucida Console" panose="020B0609040504020204" pitchFamily="49" charset="0"/>
+              </a:rPr>
+              <a:t>         , 0.005</a:t>
+            </a:r>
+          </a:p>
+          <a:p>
+            <a:r>
+              <a:rPr lang="nl-NL" sz="1800" dirty="0">
+                <a:latin typeface="Lucida Console" panose="020B0609040504020204" pitchFamily="49" charset="0"/>
+              </a:rPr>
+              <a:t>         , 'unit=KM'</a:t>
+            </a:r>
+          </a:p>
+          <a:p>
+            <a:r>
+              <a:rPr lang="nl-NL" sz="1800" dirty="0">
+                <a:latin typeface="Lucida Console" panose="020B0609040504020204" pitchFamily="49" charset="0"/>
+              </a:rPr>
+              <a:t>         ) </a:t>
+            </a:r>
+            <a:r>
+              <a:rPr lang="nl-NL" sz="1800" dirty="0" err="1">
+                <a:latin typeface="Lucida Console" panose="020B0609040504020204" pitchFamily="49" charset="0"/>
+              </a:rPr>
+              <a:t>distance</a:t>
+            </a:r>
+            <a:endParaRPr lang="nl-NL" sz="1800" dirty="0">
+              <a:latin typeface="Lucida Console" panose="020B0609040504020204" pitchFamily="49" charset="0"/>
+            </a:endParaRPr>
+          </a:p>
+          <a:p>
+            <a:r>
+              <a:rPr lang="nl-NL" sz="1800" dirty="0">
+                <a:latin typeface="Lucida Console" panose="020B0609040504020204" pitchFamily="49" charset="0"/>
+              </a:rPr>
+              <a:t>  </a:t>
+            </a:r>
+            <a:r>
+              <a:rPr lang="nl-NL" sz="1800" dirty="0" err="1">
+                <a:latin typeface="Lucida Console" panose="020B0609040504020204" pitchFamily="49" charset="0"/>
+              </a:rPr>
+              <a:t>from</a:t>
+            </a:r>
+            <a:r>
+              <a:rPr lang="nl-NL" sz="1800" dirty="0">
+                <a:latin typeface="Lucida Console" panose="020B0609040504020204" pitchFamily="49" charset="0"/>
+              </a:rPr>
+              <a:t>   dept</a:t>
+            </a:r>
+          </a:p>
+          <a:p>
+            <a:r>
+              <a:rPr lang="nl-NL" sz="1800" dirty="0">
+                <a:latin typeface="Lucida Console" panose="020B0609040504020204" pitchFamily="49" charset="0"/>
+              </a:rPr>
+              <a:t>)</a:t>
+            </a:r>
+          </a:p>
+          <a:p>
+            <a:r>
+              <a:rPr lang="nl-NL" sz="1800" dirty="0">
+                <a:latin typeface="Lucida Console" panose="020B0609040504020204" pitchFamily="49" charset="0"/>
+              </a:rPr>
+              <a:t>select </a:t>
+            </a:r>
+            <a:r>
+              <a:rPr lang="nl-NL" sz="1800" dirty="0" err="1" smtClean="0">
+                <a:latin typeface="Lucida Console" panose="020B0609040504020204" pitchFamily="49" charset="0"/>
+              </a:rPr>
+              <a:t>d.dname</a:t>
+            </a:r>
+            <a:endParaRPr lang="nl-NL" sz="1800" dirty="0" smtClean="0">
+              <a:latin typeface="Lucida Console" panose="020B0609040504020204" pitchFamily="49" charset="0"/>
+            </a:endParaRPr>
+          </a:p>
+          <a:p>
             <a:r>
               <a:rPr lang="nl-NL" sz="1800" dirty="0" smtClean="0">
                 <a:latin typeface="Lucida Console" panose="020B0609040504020204" pitchFamily="49" charset="0"/>
               </a:rPr>
+              <a:t>,      </a:t>
+            </a:r>
+            <a:r>
+              <a:rPr lang="nl-NL" sz="1800" dirty="0" err="1" smtClean="0">
+                <a:latin typeface="Lucida Console" panose="020B0609040504020204" pitchFamily="49" charset="0"/>
+              </a:rPr>
+              <a:t>d.loc</a:t>
+            </a:r>
+            <a:endParaRPr lang="nl-NL" sz="1800" dirty="0" smtClean="0">
+              <a:latin typeface="Lucida Console" panose="020B0609040504020204" pitchFamily="49" charset="0"/>
+            </a:endParaRPr>
+          </a:p>
+          <a:p>
+            <a:r>
+              <a:rPr lang="nl-NL" sz="1800" dirty="0" smtClean="0">
+                <a:latin typeface="Lucida Console" panose="020B0609040504020204" pitchFamily="49" charset="0"/>
+              </a:rPr>
+              <a:t>,      </a:t>
+            </a:r>
+            <a:r>
+              <a:rPr lang="nl-NL" sz="1800" dirty="0" err="1" smtClean="0">
+                <a:latin typeface="Lucida Console" panose="020B0609040504020204" pitchFamily="49" charset="0"/>
+              </a:rPr>
+              <a:t>d.distance</a:t>
+            </a:r>
+            <a:r>
+              <a:rPr lang="nl-NL" sz="1800" dirty="0" smtClean="0">
+                <a:latin typeface="Lucida Console" panose="020B0609040504020204" pitchFamily="49" charset="0"/>
+              </a:rPr>
+              <a:t> “</a:t>
+            </a:r>
+            <a:r>
+              <a:rPr lang="en-US" sz="1800" dirty="0">
+                <a:latin typeface="Lucida Console" panose="020B0609040504020204" pitchFamily="49" charset="0"/>
+              </a:rPr>
+              <a:t>distance from Washington DC</a:t>
+            </a:r>
+            <a:r>
+              <a:rPr lang="nl-NL" sz="1800" dirty="0" smtClean="0">
+                <a:latin typeface="Lucida Console" panose="020B0609040504020204" pitchFamily="49" charset="0"/>
+              </a:rPr>
+              <a:t>”</a:t>
+            </a:r>
+            <a:endParaRPr lang="nl-NL" sz="1800" dirty="0">
+              <a:latin typeface="Lucida Console" panose="020B0609040504020204" pitchFamily="49" charset="0"/>
+            </a:endParaRPr>
+          </a:p>
+          <a:p>
+            <a:r>
+              <a:rPr lang="nl-NL" sz="1800" dirty="0" err="1">
+                <a:latin typeface="Lucida Console" panose="020B0609040504020204" pitchFamily="49" charset="0"/>
+              </a:rPr>
+              <a:t>from</a:t>
+            </a:r>
+            <a:r>
+              <a:rPr lang="nl-NL" sz="1800" dirty="0">
+                <a:latin typeface="Lucida Console" panose="020B0609040504020204" pitchFamily="49" charset="0"/>
+              </a:rPr>
+              <a:t>   </a:t>
+            </a:r>
+            <a:r>
+              <a:rPr lang="nl-NL" sz="1800" dirty="0" smtClean="0">
+                <a:latin typeface="Lucida Console" panose="020B0609040504020204" pitchFamily="49" charset="0"/>
+              </a:rPr>
+              <a:t>d</a:t>
+            </a:r>
+          </a:p>
+          <a:p>
+            <a:r>
+              <a:rPr lang="nl-NL" sz="1800" dirty="0">
+                <a:latin typeface="Lucida Console" panose="020B0609040504020204" pitchFamily="49" charset="0"/>
+              </a:rPr>
+              <a:t>o</a:t>
+            </a:r>
+            <a:r>
+              <a:rPr lang="nl-NL" sz="1800" dirty="0" smtClean="0">
+                <a:latin typeface="Lucida Console" panose="020B0609040504020204" pitchFamily="49" charset="0"/>
+              </a:rPr>
+              <a:t>rder</a:t>
+            </a:r>
+          </a:p>
+          <a:p>
+            <a:r>
+              <a:rPr lang="nl-NL" sz="1800" dirty="0" err="1" smtClean="0">
+                <a:latin typeface="Lucida Console" panose="020B0609040504020204" pitchFamily="49" charset="0"/>
+              </a:rPr>
+              <a:t>by</a:t>
+            </a:r>
+            <a:r>
+              <a:rPr lang="nl-NL" sz="1800" dirty="0" smtClean="0">
+                <a:latin typeface="Lucida Console" panose="020B0609040504020204" pitchFamily="49" charset="0"/>
+              </a:rPr>
+              <a:t>     </a:t>
+            </a:r>
+            <a:r>
+              <a:rPr lang="nl-NL" sz="1800" dirty="0" err="1" smtClean="0">
+                <a:latin typeface="Lucida Console" panose="020B0609040504020204" pitchFamily="49" charset="0"/>
+              </a:rPr>
+              <a:t>d.distance</a:t>
+            </a:r>
+            <a:r>
+              <a:rPr lang="nl-NL" sz="1800" dirty="0" smtClean="0">
+                <a:latin typeface="Lucida Console" panose="020B0609040504020204" pitchFamily="49" charset="0"/>
+              </a:rPr>
               <a:t> </a:t>
             </a:r>
-          </a:p>
-          <a:p>
-            <a:r>
-              <a:rPr lang="nl-NL" sz="1800" dirty="0">
-                <a:latin typeface="Lucida Console" panose="020B0609040504020204" pitchFamily="49" charset="0"/>
-              </a:rPr>
-              <a:t>(</a:t>
-            </a:r>
-            <a:r>
-              <a:rPr lang="nl-NL" sz="1800" dirty="0">
-                <a:latin typeface="Lucida Console" panose="020B0609040504020204" pitchFamily="49" charset="0"/>
-                <a:hlinkClick r:id="rId2"/>
-              </a:rPr>
-              <a:t>https://</a:t>
-            </a:r>
-            <a:r>
-              <a:rPr lang="nl-NL" sz="1800" dirty="0" smtClean="0">
-                <a:latin typeface="Lucida Console" panose="020B0609040504020204" pitchFamily="49" charset="0"/>
-                <a:hlinkClick r:id="rId2"/>
-              </a:rPr>
-              <a:t>docs.oracle.com/cd/B25329_01/doc/appdev.102/b28004/xe_locator.htm</a:t>
-            </a:r>
-            <a:r>
-              <a:rPr lang="nl-NL" sz="1800" dirty="0" smtClean="0">
-                <a:latin typeface="Lucida Console" panose="020B0609040504020204" pitchFamily="49" charset="0"/>
-              </a:rPr>
-              <a:t> )</a:t>
-            </a:r>
-            <a:endParaRPr lang="en-US" sz="1800" dirty="0">
+            <a:endParaRPr lang="nl-NL" sz="1800" dirty="0">
               <a:latin typeface="Lucida Console" panose="020B0609040504020204" pitchFamily="49" charset="0"/>
             </a:endParaRPr>
           </a:p>
@@ -35416,7 +36456,7 @@
         <p:spPr>
           <a:xfrm>
             <a:off x="8798166" y="1727200"/>
-            <a:ext cx="7800734" cy="369332"/>
+            <a:ext cx="7800734" cy="5355312"/>
           </a:xfrm>
           <a:prstGeom prst="rect">
             <a:avLst/>
@@ -35430,11 +36470,387 @@
           <a:lstStyle/>
           <a:p>
             <a:r>
+              <a:rPr lang="en-US" sz="1800" dirty="0">
+                <a:latin typeface="Lucida Console" panose="020B0609040504020204" pitchFamily="49" charset="0"/>
+              </a:rPr>
+              <a:t>update </a:t>
+            </a:r>
+            <a:r>
+              <a:rPr lang="en-US" sz="1800" dirty="0" err="1">
+                <a:latin typeface="Lucida Console" panose="020B0609040504020204" pitchFamily="49" charset="0"/>
+              </a:rPr>
+              <a:t>emp</a:t>
+            </a:r>
+            <a:endParaRPr lang="en-US" sz="1800" dirty="0">
+              <a:latin typeface="Lucida Console" panose="020B0609040504020204" pitchFamily="49" charset="0"/>
+            </a:endParaRPr>
+          </a:p>
+          <a:p>
+            <a:r>
+              <a:rPr lang="en-US" sz="1800" dirty="0">
+                <a:latin typeface="Lucida Console" panose="020B0609040504020204" pitchFamily="49" charset="0"/>
+              </a:rPr>
+              <a:t>set    bio = q'[Gerald Ford was born ... in 2006.]'</a:t>
+            </a:r>
+          </a:p>
+          <a:p>
+            <a:r>
+              <a:rPr lang="en-US" sz="1800" dirty="0">
+                <a:latin typeface="Lucida Console" panose="020B0609040504020204" pitchFamily="49" charset="0"/>
+              </a:rPr>
+              <a:t>where  </a:t>
+            </a:r>
+            <a:r>
+              <a:rPr lang="en-US" sz="1800" dirty="0" err="1">
+                <a:latin typeface="Lucida Console" panose="020B0609040504020204" pitchFamily="49" charset="0"/>
+              </a:rPr>
+              <a:t>ename</a:t>
+            </a:r>
+            <a:r>
+              <a:rPr lang="en-US" sz="1800" dirty="0">
+                <a:latin typeface="Lucida Console" panose="020B0609040504020204" pitchFamily="49" charset="0"/>
+              </a:rPr>
+              <a:t> = </a:t>
+            </a:r>
+            <a:r>
+              <a:rPr lang="en-US" sz="1800" dirty="0" smtClean="0">
+                <a:latin typeface="Lucida Console" panose="020B0609040504020204" pitchFamily="49" charset="0"/>
+              </a:rPr>
+              <a:t>'KING‘</a:t>
+            </a:r>
+          </a:p>
+          <a:p>
+            <a:endParaRPr lang="nl-NL" sz="1800" dirty="0">
+              <a:latin typeface="Lucida Console" panose="020B0609040504020204" pitchFamily="49" charset="0"/>
+            </a:endParaRPr>
+          </a:p>
+          <a:p>
+            <a:r>
+              <a:rPr lang="en-US" sz="1800" dirty="0">
+                <a:latin typeface="Lucida Console" panose="020B0609040504020204" pitchFamily="49" charset="0"/>
+              </a:rPr>
+              <a:t>update </a:t>
+            </a:r>
+            <a:r>
+              <a:rPr lang="en-US" sz="1800" dirty="0" err="1">
+                <a:latin typeface="Lucida Console" panose="020B0609040504020204" pitchFamily="49" charset="0"/>
+              </a:rPr>
+              <a:t>emp</a:t>
+            </a:r>
+            <a:endParaRPr lang="en-US" sz="1800" dirty="0">
+              <a:latin typeface="Lucida Console" panose="020B0609040504020204" pitchFamily="49" charset="0"/>
+            </a:endParaRPr>
+          </a:p>
+          <a:p>
+            <a:r>
+              <a:rPr lang="en-US" sz="1800" dirty="0">
+                <a:latin typeface="Lucida Console" panose="020B0609040504020204" pitchFamily="49" charset="0"/>
+              </a:rPr>
+              <a:t>set    bio = q'[Jamaican sprinter Yohan Blake holds ...]'</a:t>
+            </a:r>
+          </a:p>
+          <a:p>
+            <a:r>
+              <a:rPr lang="en-US" sz="1800" dirty="0">
+                <a:latin typeface="Lucida Console" panose="020B0609040504020204" pitchFamily="49" charset="0"/>
+              </a:rPr>
+              <a:t>where  </a:t>
+            </a:r>
+            <a:r>
+              <a:rPr lang="en-US" sz="1800" dirty="0" err="1">
+                <a:latin typeface="Lucida Console" panose="020B0609040504020204" pitchFamily="49" charset="0"/>
+              </a:rPr>
+              <a:t>ename</a:t>
+            </a:r>
+            <a:r>
+              <a:rPr lang="en-US" sz="1800" dirty="0">
+                <a:latin typeface="Lucida Console" panose="020B0609040504020204" pitchFamily="49" charset="0"/>
+              </a:rPr>
+              <a:t> = 'BLAKE'</a:t>
+            </a:r>
+          </a:p>
+          <a:p>
+            <a:endParaRPr lang="nl-NL" sz="1800" dirty="0" smtClean="0">
+              <a:latin typeface="Lucida Console" panose="020B0609040504020204" pitchFamily="49" charset="0"/>
+            </a:endParaRPr>
+          </a:p>
+          <a:p>
+            <a:r>
               <a:rPr lang="nl-NL" sz="1800" dirty="0" smtClean="0">
                 <a:latin typeface="Lucida Console" panose="020B0609040504020204" pitchFamily="49" charset="0"/>
               </a:rPr>
-              <a:t>-- TEXT </a:t>
-            </a:r>
+              <a:t>-- </a:t>
+            </a:r>
+            <a:r>
+              <a:rPr lang="nl-NL" sz="1800" dirty="0" err="1" smtClean="0">
+                <a:latin typeface="Lucida Console" panose="020B0609040504020204" pitchFamily="49" charset="0"/>
+              </a:rPr>
+              <a:t>create</a:t>
+            </a:r>
+            <a:r>
+              <a:rPr lang="nl-NL" sz="1800" dirty="0" smtClean="0">
+                <a:latin typeface="Lucida Console" panose="020B0609040504020204" pitchFamily="49" charset="0"/>
+              </a:rPr>
+              <a:t> a </a:t>
+            </a:r>
+            <a:r>
+              <a:rPr lang="nl-NL" sz="1800" dirty="0" err="1" smtClean="0">
+                <a:latin typeface="Lucida Console" panose="020B0609040504020204" pitchFamily="49" charset="0"/>
+              </a:rPr>
+              <a:t>multi</a:t>
+            </a:r>
+            <a:r>
+              <a:rPr lang="nl-NL" sz="1800" dirty="0" smtClean="0">
+                <a:latin typeface="Lucida Console" panose="020B0609040504020204" pitchFamily="49" charset="0"/>
+              </a:rPr>
+              <a:t> column </a:t>
+            </a:r>
+            <a:r>
+              <a:rPr lang="nl-NL" sz="1800" dirty="0" err="1" smtClean="0">
+                <a:latin typeface="Lucida Console" panose="020B0609040504020204" pitchFamily="49" charset="0"/>
+              </a:rPr>
+              <a:t>text</a:t>
+            </a:r>
+            <a:r>
+              <a:rPr lang="nl-NL" sz="1800" dirty="0" smtClean="0">
+                <a:latin typeface="Lucida Console" panose="020B0609040504020204" pitchFamily="49" charset="0"/>
+              </a:rPr>
+              <a:t> index</a:t>
+            </a:r>
+            <a:endParaRPr lang="nl-NL" sz="1800" dirty="0">
+              <a:latin typeface="Lucida Console" panose="020B0609040504020204" pitchFamily="49" charset="0"/>
+            </a:endParaRPr>
+          </a:p>
+          <a:p>
+            <a:r>
+              <a:rPr lang="en-US" sz="1800" dirty="0">
+                <a:latin typeface="Lucida Console" panose="020B0609040504020204" pitchFamily="49" charset="0"/>
+              </a:rPr>
+              <a:t>exec </a:t>
+            </a:r>
+            <a:r>
+              <a:rPr lang="en-US" sz="1800" dirty="0" err="1" smtClean="0">
+                <a:latin typeface="Lucida Console" panose="020B0609040504020204" pitchFamily="49" charset="0"/>
+              </a:rPr>
+              <a:t>ctx_ddl.create_preference</a:t>
+            </a:r>
+            <a:r>
+              <a:rPr lang="en-US" sz="1800" dirty="0" smtClean="0">
+                <a:latin typeface="Lucida Console" panose="020B0609040504020204" pitchFamily="49" charset="0"/>
+              </a:rPr>
+              <a:t/>
+            </a:r>
+            <a:br>
+              <a:rPr lang="en-US" sz="1800" dirty="0" smtClean="0">
+                <a:latin typeface="Lucida Console" panose="020B0609040504020204" pitchFamily="49" charset="0"/>
+              </a:rPr>
+            </a:br>
+            <a:r>
+              <a:rPr lang="en-US" sz="1800" dirty="0" smtClean="0">
+                <a:latin typeface="Lucida Console" panose="020B0609040504020204" pitchFamily="49" charset="0"/>
+              </a:rPr>
+              <a:t>     ( </a:t>
+            </a:r>
+            <a:r>
+              <a:rPr lang="en-US" sz="1800" dirty="0">
+                <a:latin typeface="Lucida Console" panose="020B0609040504020204" pitchFamily="49" charset="0"/>
+              </a:rPr>
+              <a:t>'</a:t>
+            </a:r>
+            <a:r>
+              <a:rPr lang="en-US" sz="1800" dirty="0" err="1">
+                <a:latin typeface="Lucida Console" panose="020B0609040504020204" pitchFamily="49" charset="0"/>
+              </a:rPr>
+              <a:t>my_mcds</a:t>
+            </a:r>
+            <a:r>
+              <a:rPr lang="en-US" sz="1800" dirty="0">
+                <a:latin typeface="Lucida Console" panose="020B0609040504020204" pitchFamily="49" charset="0"/>
+              </a:rPr>
+              <a:t>', '</a:t>
+            </a:r>
+            <a:r>
+              <a:rPr lang="en-US" sz="1800" dirty="0" err="1">
+                <a:latin typeface="Lucida Console" panose="020B0609040504020204" pitchFamily="49" charset="0"/>
+              </a:rPr>
+              <a:t>multi_column_datastore</a:t>
+            </a:r>
+            <a:r>
+              <a:rPr lang="en-US" sz="1800" dirty="0">
+                <a:latin typeface="Lucida Console" panose="020B0609040504020204" pitchFamily="49" charset="0"/>
+              </a:rPr>
+              <a:t>' )</a:t>
+            </a:r>
+          </a:p>
+          <a:p>
+            <a:r>
+              <a:rPr lang="en-US" sz="1800" dirty="0">
+                <a:latin typeface="Lucida Console" panose="020B0609040504020204" pitchFamily="49" charset="0"/>
+              </a:rPr>
+              <a:t>exec </a:t>
+            </a:r>
+            <a:r>
+              <a:rPr lang="en-US" sz="1800" dirty="0" err="1" smtClean="0">
+                <a:latin typeface="Lucida Console" panose="020B0609040504020204" pitchFamily="49" charset="0"/>
+              </a:rPr>
+              <a:t>ctx_ddl.set_attribute</a:t>
+            </a:r>
+            <a:r>
+              <a:rPr lang="en-US" sz="1800" dirty="0" smtClean="0">
+                <a:latin typeface="Lucida Console" panose="020B0609040504020204" pitchFamily="49" charset="0"/>
+              </a:rPr>
+              <a:t/>
+            </a:r>
+            <a:br>
+              <a:rPr lang="en-US" sz="1800" dirty="0" smtClean="0">
+                <a:latin typeface="Lucida Console" panose="020B0609040504020204" pitchFamily="49" charset="0"/>
+              </a:rPr>
+            </a:br>
+            <a:r>
+              <a:rPr lang="en-US" sz="1800" dirty="0" smtClean="0">
+                <a:latin typeface="Lucida Console" panose="020B0609040504020204" pitchFamily="49" charset="0"/>
+              </a:rPr>
+              <a:t>     ( '</a:t>
+            </a:r>
+            <a:r>
+              <a:rPr lang="en-US" sz="1800" dirty="0" err="1" smtClean="0">
+                <a:latin typeface="Lucida Console" panose="020B0609040504020204" pitchFamily="49" charset="0"/>
+              </a:rPr>
+              <a:t>my_mcds</a:t>
+            </a:r>
+            <a:r>
+              <a:rPr lang="en-US" sz="1800" dirty="0">
+                <a:latin typeface="Lucida Console" panose="020B0609040504020204" pitchFamily="49" charset="0"/>
+              </a:rPr>
+              <a:t>', 'columns', 'bio, </a:t>
+            </a:r>
+            <a:r>
+              <a:rPr lang="en-US" sz="1800" dirty="0" err="1">
+                <a:latin typeface="Lucida Console" panose="020B0609040504020204" pitchFamily="49" charset="0"/>
+              </a:rPr>
+              <a:t>ename</a:t>
+            </a:r>
+            <a:r>
+              <a:rPr lang="en-US" sz="1800" dirty="0">
+                <a:latin typeface="Lucida Console" panose="020B0609040504020204" pitchFamily="49" charset="0"/>
+              </a:rPr>
+              <a:t>, job' </a:t>
+            </a:r>
+            <a:r>
+              <a:rPr lang="en-US" sz="1800" dirty="0" smtClean="0">
+                <a:latin typeface="Lucida Console" panose="020B0609040504020204" pitchFamily="49" charset="0"/>
+              </a:rPr>
+              <a:t>)</a:t>
+            </a:r>
+            <a:br>
+              <a:rPr lang="en-US" sz="1800" dirty="0" smtClean="0">
+                <a:latin typeface="Lucida Console" panose="020B0609040504020204" pitchFamily="49" charset="0"/>
+              </a:rPr>
+            </a:br>
+            <a:endParaRPr lang="en-US" sz="1800" dirty="0">
+              <a:latin typeface="Lucida Console" panose="020B0609040504020204" pitchFamily="49" charset="0"/>
+            </a:endParaRPr>
+          </a:p>
+          <a:p>
+            <a:r>
+              <a:rPr lang="en-US" sz="1800" dirty="0">
+                <a:latin typeface="Lucida Console" panose="020B0609040504020204" pitchFamily="49" charset="0"/>
+              </a:rPr>
+              <a:t>create index </a:t>
+            </a:r>
+            <a:r>
+              <a:rPr lang="en-US" sz="1800" dirty="0" err="1">
+                <a:latin typeface="Lucida Console" panose="020B0609040504020204" pitchFamily="49" charset="0"/>
+              </a:rPr>
+              <a:t>emp_txt_idx</a:t>
+            </a:r>
+            <a:r>
+              <a:rPr lang="en-US" sz="1800" dirty="0">
+                <a:latin typeface="Lucida Console" panose="020B0609040504020204" pitchFamily="49" charset="0"/>
+              </a:rPr>
+              <a:t> on </a:t>
+            </a:r>
+            <a:r>
+              <a:rPr lang="en-US" sz="1800" dirty="0" err="1">
+                <a:latin typeface="Lucida Console" panose="020B0609040504020204" pitchFamily="49" charset="0"/>
+              </a:rPr>
+              <a:t>emp</a:t>
+            </a:r>
+            <a:r>
+              <a:rPr lang="en-US" sz="1800" dirty="0">
+                <a:latin typeface="Lucida Console" panose="020B0609040504020204" pitchFamily="49" charset="0"/>
+              </a:rPr>
+              <a:t>( </a:t>
+            </a:r>
+            <a:r>
+              <a:rPr lang="en-US" sz="1800" dirty="0" err="1">
+                <a:latin typeface="Lucida Console" panose="020B0609040504020204" pitchFamily="49" charset="0"/>
+              </a:rPr>
+              <a:t>ename</a:t>
+            </a:r>
+            <a:r>
+              <a:rPr lang="en-US" sz="1800" dirty="0">
+                <a:latin typeface="Lucida Console" panose="020B0609040504020204" pitchFamily="49" charset="0"/>
+              </a:rPr>
+              <a:t> )</a:t>
+            </a:r>
+          </a:p>
+          <a:p>
+            <a:r>
+              <a:rPr lang="en-US" sz="1800" dirty="0" err="1">
+                <a:latin typeface="Lucida Console" panose="020B0609040504020204" pitchFamily="49" charset="0"/>
+              </a:rPr>
+              <a:t>indextype</a:t>
+            </a:r>
+            <a:r>
+              <a:rPr lang="en-US" sz="1800" dirty="0">
+                <a:latin typeface="Lucida Console" panose="020B0609040504020204" pitchFamily="49" charset="0"/>
+              </a:rPr>
+              <a:t> is </a:t>
+            </a:r>
+            <a:r>
+              <a:rPr lang="en-US" sz="1800" dirty="0" err="1">
+                <a:latin typeface="Lucida Console" panose="020B0609040504020204" pitchFamily="49" charset="0"/>
+              </a:rPr>
+              <a:t>ctxsys.context</a:t>
+            </a:r>
+            <a:endParaRPr lang="en-US" sz="1800" dirty="0">
+              <a:latin typeface="Lucida Console" panose="020B0609040504020204" pitchFamily="49" charset="0"/>
+            </a:endParaRPr>
+          </a:p>
+          <a:p>
+            <a:r>
+              <a:rPr lang="en-US" sz="1800" dirty="0">
+                <a:latin typeface="Lucida Console" panose="020B0609040504020204" pitchFamily="49" charset="0"/>
+              </a:rPr>
+              <a:t>parameters( '</a:t>
+            </a:r>
+            <a:r>
+              <a:rPr lang="en-US" sz="1800" dirty="0" err="1">
+                <a:latin typeface="Lucida Console" panose="020B0609040504020204" pitchFamily="49" charset="0"/>
+              </a:rPr>
+              <a:t>datastore</a:t>
+            </a:r>
+            <a:r>
+              <a:rPr lang="en-US" sz="1800" dirty="0">
+                <a:latin typeface="Lucida Console" panose="020B0609040504020204" pitchFamily="49" charset="0"/>
+              </a:rPr>
+              <a:t> </a:t>
+            </a:r>
+            <a:r>
+              <a:rPr lang="en-US" sz="1800" dirty="0" err="1">
+                <a:latin typeface="Lucida Console" panose="020B0609040504020204" pitchFamily="49" charset="0"/>
+              </a:rPr>
+              <a:t>my_mcds</a:t>
+            </a:r>
+            <a:r>
+              <a:rPr lang="en-US" sz="1800" dirty="0">
+                <a:latin typeface="Lucida Console" panose="020B0609040504020204" pitchFamily="49" charset="0"/>
+              </a:rPr>
+              <a:t>' )</a:t>
+            </a:r>
+          </a:p>
+          <a:p>
             <a:endParaRPr lang="en-US" sz="1800" dirty="0">
               <a:latin typeface="Lucida Console" panose="020B0609040504020204" pitchFamily="49" charset="0"/>
             </a:endParaRPr>
@@ -35495,7 +36911,6 @@
               <a:rPr lang="en-US" dirty="0"/>
               <a:t>find the names of all managers</a:t>
             </a:r>
-            <a:endParaRPr lang="en-US" dirty="0"/>
           </a:p>
         </p:txBody>
       </p:sp>
@@ -35633,9 +37048,6 @@
               </a:rPr>
               <a:t>)</a:t>
             </a:r>
-            <a:endParaRPr lang="en-US" dirty="0" smtClean="0">
-              <a:latin typeface="Lucida Console" panose="020B0609040504020204" pitchFamily="49" charset="0"/>
-            </a:endParaRPr>
           </a:p>
         </p:txBody>
       </p:sp>
@@ -36022,7 +37434,7 @@
         <p:spPr>
           <a:xfrm>
             <a:off x="8798166" y="1727200"/>
-            <a:ext cx="7800734" cy="369332"/>
+            <a:ext cx="7800734" cy="1754326"/>
           </a:xfrm>
           <a:prstGeom prst="rect">
             <a:avLst/>
@@ -36039,7 +37451,179 @@
               <a:rPr lang="nl-NL" sz="1800" dirty="0" smtClean="0">
                 <a:latin typeface="Lucida Console" panose="020B0609040504020204" pitchFamily="49" charset="0"/>
               </a:rPr>
-              <a:t>-- TEXT </a:t>
+              <a:t>-- </a:t>
+            </a:r>
+            <a:r>
+              <a:rPr lang="nl-NL" sz="1800" dirty="0" err="1" smtClean="0">
+                <a:latin typeface="Lucida Console" panose="020B0609040504020204" pitchFamily="49" charset="0"/>
+              </a:rPr>
+              <a:t>leveraging</a:t>
+            </a:r>
+            <a:r>
+              <a:rPr lang="nl-NL" sz="1800" dirty="0" smtClean="0">
+                <a:latin typeface="Lucida Console" panose="020B0609040504020204" pitchFamily="49" charset="0"/>
+              </a:rPr>
+              <a:t> </a:t>
+            </a:r>
+            <a:r>
+              <a:rPr lang="nl-NL" sz="1800" dirty="0" err="1" smtClean="0">
+                <a:latin typeface="Lucida Console" panose="020B0609040504020204" pitchFamily="49" charset="0"/>
+              </a:rPr>
+              <a:t>the</a:t>
+            </a:r>
+            <a:r>
+              <a:rPr lang="nl-NL" sz="1800" dirty="0" smtClean="0">
+                <a:latin typeface="Lucida Console" panose="020B0609040504020204" pitchFamily="49" charset="0"/>
+              </a:rPr>
+              <a:t> </a:t>
+            </a:r>
+            <a:r>
+              <a:rPr lang="nl-NL" sz="1800" dirty="0" err="1" smtClean="0">
+                <a:latin typeface="Lucida Console" panose="020B0609040504020204" pitchFamily="49" charset="0"/>
+              </a:rPr>
+              <a:t>multicolumn</a:t>
+            </a:r>
+            <a:r>
+              <a:rPr lang="nl-NL" sz="1800" dirty="0" smtClean="0">
+                <a:latin typeface="Lucida Console" panose="020B0609040504020204" pitchFamily="49" charset="0"/>
+              </a:rPr>
+              <a:t> </a:t>
+            </a:r>
+            <a:r>
+              <a:rPr lang="nl-NL" sz="1800" dirty="0" err="1" smtClean="0">
+                <a:latin typeface="Lucida Console" panose="020B0609040504020204" pitchFamily="49" charset="0"/>
+              </a:rPr>
+              <a:t>text</a:t>
+            </a:r>
+            <a:r>
+              <a:rPr lang="nl-NL" sz="1800" dirty="0" smtClean="0">
+                <a:latin typeface="Lucida Console" panose="020B0609040504020204" pitchFamily="49" charset="0"/>
+              </a:rPr>
+              <a:t> index </a:t>
+            </a:r>
+            <a:br>
+              <a:rPr lang="nl-NL" sz="1800" dirty="0" smtClean="0">
+                <a:latin typeface="Lucida Console" panose="020B0609040504020204" pitchFamily="49" charset="0"/>
+              </a:rPr>
+            </a:br>
+            <a:r>
+              <a:rPr lang="nl-NL" sz="1800" dirty="0" smtClean="0">
+                <a:latin typeface="Lucida Console" panose="020B0609040504020204" pitchFamily="49" charset="0"/>
+              </a:rPr>
+              <a:t>-- on </a:t>
+            </a:r>
+            <a:r>
+              <a:rPr lang="nl-NL" sz="1800" dirty="0" err="1" smtClean="0">
+                <a:latin typeface="Lucida Console" panose="020B0609040504020204" pitchFamily="49" charset="0"/>
+              </a:rPr>
+              <a:t>ename</a:t>
+            </a:r>
+            <a:r>
+              <a:rPr lang="nl-NL" sz="1800" dirty="0" smtClean="0">
+                <a:latin typeface="Lucida Console" panose="020B0609040504020204" pitchFamily="49" charset="0"/>
+              </a:rPr>
+              <a:t>, bio </a:t>
+            </a:r>
+            <a:r>
+              <a:rPr lang="nl-NL" sz="1800" dirty="0" err="1" smtClean="0">
+                <a:latin typeface="Lucida Console" panose="020B0609040504020204" pitchFamily="49" charset="0"/>
+              </a:rPr>
+              <a:t>and</a:t>
+            </a:r>
+            <a:r>
+              <a:rPr lang="nl-NL" sz="1800" dirty="0" smtClean="0">
+                <a:latin typeface="Lucida Console" panose="020B0609040504020204" pitchFamily="49" charset="0"/>
+              </a:rPr>
+              <a:t> job</a:t>
+            </a:r>
+          </a:p>
+          <a:p>
+            <a:r>
+              <a:rPr lang="en-US" sz="1800" dirty="0">
+                <a:latin typeface="Lucida Console" panose="020B0609040504020204" pitchFamily="49" charset="0"/>
+              </a:rPr>
+              <a:t>SELECT </a:t>
+            </a:r>
+            <a:r>
+              <a:rPr lang="en-US" sz="1800" dirty="0" err="1" smtClean="0">
+                <a:latin typeface="Lucida Console" panose="020B0609040504020204" pitchFamily="49" charset="0"/>
+              </a:rPr>
+              <a:t>ename</a:t>
+            </a:r>
+            <a:endParaRPr lang="en-US" sz="1800" dirty="0" smtClean="0">
+              <a:latin typeface="Lucida Console" panose="020B0609040504020204" pitchFamily="49" charset="0"/>
+            </a:endParaRPr>
+          </a:p>
+          <a:p>
+            <a:r>
+              <a:rPr lang="en-US" sz="1800" dirty="0" smtClean="0">
+                <a:latin typeface="Lucida Console" panose="020B0609040504020204" pitchFamily="49" charset="0"/>
+              </a:rPr>
+              <a:t>,      SCORE(1</a:t>
+            </a:r>
+            <a:r>
+              <a:rPr lang="en-US" sz="1800" dirty="0">
+                <a:latin typeface="Lucida Console" panose="020B0609040504020204" pitchFamily="49" charset="0"/>
+              </a:rPr>
+              <a:t>)</a:t>
+            </a:r>
+          </a:p>
+          <a:p>
+            <a:r>
+              <a:rPr lang="en-US" sz="1800" dirty="0">
+                <a:latin typeface="Lucida Console" panose="020B0609040504020204" pitchFamily="49" charset="0"/>
+              </a:rPr>
+              <a:t>FROM   </a:t>
+            </a:r>
+            <a:r>
+              <a:rPr lang="en-US" sz="1800" dirty="0" err="1">
+                <a:latin typeface="Lucida Console" panose="020B0609040504020204" pitchFamily="49" charset="0"/>
+              </a:rPr>
+              <a:t>emp</a:t>
+            </a:r>
+            <a:r>
+              <a:rPr lang="en-US" sz="1800" dirty="0">
+                <a:latin typeface="Lucida Console" panose="020B0609040504020204" pitchFamily="49" charset="0"/>
+              </a:rPr>
+              <a:t> </a:t>
+            </a:r>
+          </a:p>
+          <a:p>
+            <a:r>
+              <a:rPr lang="en-US" sz="1800" dirty="0">
+                <a:latin typeface="Lucida Console" panose="020B0609040504020204" pitchFamily="49" charset="0"/>
+              </a:rPr>
+              <a:t>WHERE  </a:t>
+            </a:r>
+            <a:r>
+              <a:rPr lang="en-US" sz="1800" dirty="0" smtClean="0">
+                <a:latin typeface="Lucida Console" panose="020B0609040504020204" pitchFamily="49" charset="0"/>
+              </a:rPr>
+              <a:t>CONTAINS(</a:t>
+            </a:r>
+            <a:r>
+              <a:rPr lang="en-US" sz="1800" dirty="0" err="1" smtClean="0">
+                <a:latin typeface="Lucida Console" panose="020B0609040504020204" pitchFamily="49" charset="0"/>
+              </a:rPr>
+              <a:t>ename</a:t>
+            </a:r>
+            <a:r>
+              <a:rPr lang="en-US" sz="1800" dirty="0" smtClean="0">
+                <a:latin typeface="Lucida Console" panose="020B0609040504020204" pitchFamily="49" charset="0"/>
+              </a:rPr>
+              <a:t>, </a:t>
+            </a:r>
+            <a:r>
+              <a:rPr lang="en-US" sz="1800" dirty="0">
+                <a:latin typeface="Lucida Console" panose="020B0609040504020204" pitchFamily="49" charset="0"/>
+              </a:rPr>
+              <a:t>'lead', 1) &gt; 0</a:t>
+            </a:r>
+            <a:r>
+              <a:rPr lang="nl-NL" sz="1800" dirty="0" smtClean="0">
+                <a:latin typeface="Lucida Console" panose="020B0609040504020204" pitchFamily="49" charset="0"/>
+              </a:rPr>
+              <a:t> </a:t>
             </a:r>
             <a:endParaRPr lang="en-US" sz="1800" dirty="0">
               <a:latin typeface="Lucida Console" panose="020B0609040504020204" pitchFamily="49" charset="0"/>
@@ -36422,7 +38006,7 @@
         <p:spPr>
           <a:xfrm>
             <a:off x="8798166" y="1727200"/>
-            <a:ext cx="7800734" cy="369332"/>
+            <a:ext cx="7800734" cy="2308324"/>
           </a:xfrm>
           <a:prstGeom prst="rect">
             <a:avLst/>
@@ -36436,10 +38020,216 @@
           <a:lstStyle/>
           <a:p>
             <a:r>
+              <a:rPr lang="nl-NL" sz="1800" dirty="0">
+                <a:latin typeface="Lucida Console" panose="020B0609040504020204" pitchFamily="49" charset="0"/>
+              </a:rPr>
+              <a:t>-- </a:t>
+            </a:r>
+            <a:r>
+              <a:rPr lang="nl-NL" sz="1800" dirty="0" err="1">
+                <a:latin typeface="Lucida Console" panose="020B0609040504020204" pitchFamily="49" charset="0"/>
+              </a:rPr>
+              <a:t>leveraging</a:t>
+            </a:r>
+            <a:r>
+              <a:rPr lang="nl-NL" sz="1800" dirty="0">
+                <a:latin typeface="Lucida Console" panose="020B0609040504020204" pitchFamily="49" charset="0"/>
+              </a:rPr>
+              <a:t> </a:t>
+            </a:r>
+            <a:r>
+              <a:rPr lang="nl-NL" sz="1800" dirty="0" err="1">
+                <a:latin typeface="Lucida Console" panose="020B0609040504020204" pitchFamily="49" charset="0"/>
+              </a:rPr>
+              <a:t>the</a:t>
+            </a:r>
+            <a:r>
+              <a:rPr lang="nl-NL" sz="1800" dirty="0">
+                <a:latin typeface="Lucida Console" panose="020B0609040504020204" pitchFamily="49" charset="0"/>
+              </a:rPr>
+              <a:t> </a:t>
+            </a:r>
+            <a:r>
+              <a:rPr lang="nl-NL" sz="1800" dirty="0" err="1">
+                <a:latin typeface="Lucida Console" panose="020B0609040504020204" pitchFamily="49" charset="0"/>
+              </a:rPr>
+              <a:t>multicolumn</a:t>
+            </a:r>
+            <a:r>
+              <a:rPr lang="nl-NL" sz="1800" dirty="0">
+                <a:latin typeface="Lucida Console" panose="020B0609040504020204" pitchFamily="49" charset="0"/>
+              </a:rPr>
+              <a:t> </a:t>
+            </a:r>
+            <a:r>
+              <a:rPr lang="nl-NL" sz="1800" dirty="0" err="1">
+                <a:latin typeface="Lucida Console" panose="020B0609040504020204" pitchFamily="49" charset="0"/>
+              </a:rPr>
+              <a:t>text</a:t>
+            </a:r>
+            <a:r>
+              <a:rPr lang="nl-NL" sz="1800" dirty="0">
+                <a:latin typeface="Lucida Console" panose="020B0609040504020204" pitchFamily="49" charset="0"/>
+              </a:rPr>
+              <a:t> index </a:t>
+            </a:r>
+            <a:br>
+              <a:rPr lang="nl-NL" sz="1800" dirty="0">
+                <a:latin typeface="Lucida Console" panose="020B0609040504020204" pitchFamily="49" charset="0"/>
+              </a:rPr>
+            </a:br>
+            <a:r>
+              <a:rPr lang="nl-NL" sz="1800" dirty="0">
+                <a:latin typeface="Lucida Console" panose="020B0609040504020204" pitchFamily="49" charset="0"/>
+              </a:rPr>
+              <a:t>-- on </a:t>
+            </a:r>
+            <a:r>
+              <a:rPr lang="nl-NL" sz="1800" dirty="0" err="1">
+                <a:latin typeface="Lucida Console" panose="020B0609040504020204" pitchFamily="49" charset="0"/>
+              </a:rPr>
+              <a:t>ename</a:t>
+            </a:r>
+            <a:r>
+              <a:rPr lang="nl-NL" sz="1800" dirty="0">
+                <a:latin typeface="Lucida Console" panose="020B0609040504020204" pitchFamily="49" charset="0"/>
+              </a:rPr>
+              <a:t>, bio </a:t>
+            </a:r>
+            <a:r>
+              <a:rPr lang="nl-NL" sz="1800" dirty="0" err="1">
+                <a:latin typeface="Lucida Console" panose="020B0609040504020204" pitchFamily="49" charset="0"/>
+              </a:rPr>
+              <a:t>and</a:t>
+            </a:r>
+            <a:r>
+              <a:rPr lang="nl-NL" sz="1800" dirty="0">
+                <a:latin typeface="Lucida Console" panose="020B0609040504020204" pitchFamily="49" charset="0"/>
+              </a:rPr>
+              <a:t> job</a:t>
+            </a:r>
+          </a:p>
+          <a:p>
+            <a:r>
+              <a:rPr lang="en-US" sz="1800" dirty="0">
+                <a:latin typeface="Lucida Console" panose="020B0609040504020204" pitchFamily="49" charset="0"/>
+              </a:rPr>
+              <a:t>SELECT </a:t>
+            </a:r>
+            <a:r>
+              <a:rPr lang="en-US" sz="1800" dirty="0" err="1">
+                <a:latin typeface="Lucida Console" panose="020B0609040504020204" pitchFamily="49" charset="0"/>
+              </a:rPr>
+              <a:t>ename</a:t>
+            </a:r>
+            <a:endParaRPr lang="en-US" sz="1800" dirty="0">
+              <a:latin typeface="Lucida Console" panose="020B0609040504020204" pitchFamily="49" charset="0"/>
+            </a:endParaRPr>
+          </a:p>
+          <a:p>
+            <a:r>
+              <a:rPr lang="en-US" sz="1800" dirty="0">
+                <a:latin typeface="Lucida Console" panose="020B0609040504020204" pitchFamily="49" charset="0"/>
+              </a:rPr>
+              <a:t>,      SCORE(1</a:t>
+            </a:r>
+            <a:r>
+              <a:rPr lang="en-US" sz="1800" dirty="0" smtClean="0">
+                <a:latin typeface="Lucida Console" panose="020B0609040504020204" pitchFamily="49" charset="0"/>
+              </a:rPr>
+              <a:t>) score</a:t>
+            </a:r>
+            <a:endParaRPr lang="en-US" sz="1800" dirty="0">
+              <a:latin typeface="Lucida Console" panose="020B0609040504020204" pitchFamily="49" charset="0"/>
+            </a:endParaRPr>
+          </a:p>
+          <a:p>
+            <a:r>
+              <a:rPr lang="en-US" sz="1800" dirty="0">
+                <a:latin typeface="Lucida Console" panose="020B0609040504020204" pitchFamily="49" charset="0"/>
+              </a:rPr>
+              <a:t>FROM   </a:t>
+            </a:r>
+            <a:r>
+              <a:rPr lang="en-US" sz="1800" dirty="0" err="1">
+                <a:latin typeface="Lucida Console" panose="020B0609040504020204" pitchFamily="49" charset="0"/>
+              </a:rPr>
+              <a:t>emp</a:t>
+            </a:r>
+            <a:r>
+              <a:rPr lang="en-US" sz="1800" dirty="0">
+                <a:latin typeface="Lucida Console" panose="020B0609040504020204" pitchFamily="49" charset="0"/>
+              </a:rPr>
+              <a:t> </a:t>
+            </a:r>
+          </a:p>
+          <a:p>
+            <a:r>
+              <a:rPr lang="en-US" sz="1800" dirty="0">
+                <a:latin typeface="Lucida Console" panose="020B0609040504020204" pitchFamily="49" charset="0"/>
+              </a:rPr>
+              <a:t>WHERE  CONTAINS(</a:t>
+            </a:r>
+            <a:r>
+              <a:rPr lang="en-US" sz="1800" dirty="0" err="1">
+                <a:latin typeface="Lucida Console" panose="020B0609040504020204" pitchFamily="49" charset="0"/>
+              </a:rPr>
+              <a:t>ename</a:t>
+            </a:r>
+            <a:r>
+              <a:rPr lang="en-US" sz="1800" dirty="0">
+                <a:latin typeface="Lucida Console" panose="020B0609040504020204" pitchFamily="49" charset="0"/>
+              </a:rPr>
+              <a:t>, </a:t>
+            </a:r>
+            <a:r>
+              <a:rPr lang="en-US" sz="1800" dirty="0" smtClean="0">
+                <a:latin typeface="Lucida Console" panose="020B0609040504020204" pitchFamily="49" charset="0"/>
+              </a:rPr>
+              <a:t>'$manage', </a:t>
+            </a:r>
+            <a:r>
+              <a:rPr lang="en-US" sz="1800" dirty="0">
+                <a:latin typeface="Lucida Console" panose="020B0609040504020204" pitchFamily="49" charset="0"/>
+              </a:rPr>
+              <a:t>1) &gt; 0</a:t>
+            </a:r>
+            <a:r>
+              <a:rPr lang="nl-NL" sz="1800" dirty="0">
+                <a:latin typeface="Lucida Console" panose="020B0609040504020204" pitchFamily="49" charset="0"/>
+              </a:rPr>
+              <a:t> </a:t>
+            </a:r>
+            <a:endParaRPr lang="nl-NL" sz="1800" dirty="0" smtClean="0">
+              <a:latin typeface="Lucida Console" panose="020B0609040504020204" pitchFamily="49" charset="0"/>
+            </a:endParaRPr>
+          </a:p>
+          <a:p>
+            <a:r>
               <a:rPr lang="nl-NL" sz="1800" dirty="0" smtClean="0">
                 <a:latin typeface="Lucida Console" panose="020B0609040504020204" pitchFamily="49" charset="0"/>
               </a:rPr>
-              <a:t>-- TEXT </a:t>
+              <a:t>order</a:t>
+            </a:r>
+          </a:p>
+          <a:p>
+            <a:r>
+              <a:rPr lang="nl-NL" sz="1800" dirty="0" err="1" smtClean="0">
+                <a:latin typeface="Lucida Console" panose="020B0609040504020204" pitchFamily="49" charset="0"/>
+              </a:rPr>
+              <a:t>By</a:t>
+            </a:r>
+            <a:r>
+              <a:rPr lang="nl-NL" sz="1800" dirty="0" smtClean="0">
+                <a:latin typeface="Lucida Console" panose="020B0609040504020204" pitchFamily="49" charset="0"/>
+              </a:rPr>
+              <a:t>     score </a:t>
+            </a:r>
+            <a:r>
+              <a:rPr lang="nl-NL" sz="1800" dirty="0" err="1" smtClean="0">
+                <a:latin typeface="Lucida Console" panose="020B0609040504020204" pitchFamily="49" charset="0"/>
+              </a:rPr>
+              <a:t>desc</a:t>
             </a:r>
             <a:endParaRPr lang="en-US" sz="1800" dirty="0">
               <a:latin typeface="Lucida Console" panose="020B0609040504020204" pitchFamily="49" charset="0"/>
@@ -37144,9 +38934,6 @@
               </a:rPr>
               <a:t>.limit(2)</a:t>
             </a:r>
-            <a:endParaRPr lang="en-US" dirty="0" smtClean="0">
-              <a:latin typeface="Lucida Console" panose="020B0609040504020204" pitchFamily="49" charset="0"/>
-            </a:endParaRPr>
           </a:p>
         </p:txBody>
       </p:sp>
@@ -37612,9 +39399,6 @@
               </a:rPr>
               <a:t>( {'ENAME':1})</a:t>
             </a:r>
-            <a:endParaRPr lang="en-US" dirty="0" smtClean="0">
-              <a:latin typeface="Lucida Console" panose="020B0609040504020204" pitchFamily="49" charset="0"/>
-            </a:endParaRPr>
           </a:p>
         </p:txBody>
       </p:sp>
@@ -37903,7 +39687,6 @@
               <a:rPr lang="en-US" dirty="0"/>
               <a:t>and salary and sorted alphabetically by name</a:t>
             </a:r>
-            <a:endParaRPr lang="en-US" dirty="0"/>
           </a:p>
         </p:txBody>
       </p:sp>
@@ -38084,9 +39867,6 @@
               </a:rPr>
               <a:t>( {'ENAME':1})</a:t>
             </a:r>
-            <a:endParaRPr lang="en-US" dirty="0" smtClean="0">
-              <a:latin typeface="Lucida Console" panose="020B0609040504020204" pitchFamily="49" charset="0"/>
-            </a:endParaRPr>
           </a:p>
         </p:txBody>
       </p:sp>
@@ -38754,9 +40534,6 @@
               </a:rPr>
               <a:t>)</a:t>
             </a:r>
-            <a:endParaRPr lang="en-US" dirty="0" smtClean="0">
-              <a:latin typeface="Lucida Console" panose="020B0609040504020204" pitchFamily="49" charset="0"/>
-            </a:endParaRPr>
           </a:p>
         </p:txBody>
       </p:sp>
@@ -39736,7 +41513,7 @@
   <a:extraClrSchemeLst/>
   <a:extLst>
     <a:ext uri="{05A4C25C-085E-4340-85A3-A5531E510DB2}">
-      <thm15:themeFamily xmlns="" xmlns:thm15="http://schemas.microsoft.com/office/thememl/2012/main" name="AMIS_WIDESCREEN" id="{B3E69953-2F37-46EB-A098-E591A47BCAD3}" vid="{18689EA0-6BAF-404F-B4FD-27D36DF7127D}"/>
+      <thm15:themeFamily xmlns:thm15="http://schemas.microsoft.com/office/thememl/2012/main" xmlns="" name="AMIS_WIDESCREEN" id="{B3E69953-2F37-46EB-A098-E591A47BCAD3}" vid="{18689EA0-6BAF-404F-B4FD-27D36DF7127D}"/>
     </a:ext>
   </a:extLst>
 </a:theme>

</xml_diff>

<commit_message>
Adding nested table and materialized view
</commit_message>
<xml_diff>
--- a/mongodb-find-agg-vs-oracle-sql.pptx
+++ b/mongodb-find-agg-vs-oracle-sql.pptx
@@ -30912,7 +30912,7 @@
         <p:spPr>
           <a:xfrm>
             <a:off x="8798166" y="1727200"/>
-            <a:ext cx="7800734" cy="646331"/>
+            <a:ext cx="7800734" cy="8217634"/>
           </a:xfrm>
           <a:prstGeom prst="rect">
             <a:avLst/>
@@ -30926,9 +30926,150 @@
           <a:lstStyle/>
           <a:p>
             <a:r>
+              <a:rPr lang="en-US" sz="1800" dirty="0">
+                <a:latin typeface="Lucida Console" panose="020B0609040504020204" pitchFamily="49" charset="0"/>
+              </a:rPr>
+              <a:t>create or replace type </a:t>
+            </a:r>
+            <a:r>
+              <a:rPr lang="en-US" sz="1800" dirty="0" err="1">
+                <a:latin typeface="Lucida Console" panose="020B0609040504020204" pitchFamily="49" charset="0"/>
+              </a:rPr>
+              <a:t>emp_t</a:t>
+            </a:r>
+            <a:r>
+              <a:rPr lang="en-US" sz="1800" dirty="0">
+                <a:latin typeface="Lucida Console" panose="020B0609040504020204" pitchFamily="49" charset="0"/>
+              </a:rPr>
+              <a:t> as object</a:t>
+            </a:r>
+          </a:p>
+          <a:p>
+            <a:r>
+              <a:rPr lang="en-US" sz="1800" dirty="0">
+                <a:latin typeface="Lucida Console" panose="020B0609040504020204" pitchFamily="49" charset="0"/>
+              </a:rPr>
+              <a:t>( EMPNO            NUMBER(4)      </a:t>
+            </a:r>
+          </a:p>
+          <a:p>
+            <a:r>
+              <a:rPr lang="en-US" sz="1400" dirty="0">
+                <a:latin typeface="Lucida Console" panose="020B0609040504020204" pitchFamily="49" charset="0"/>
+              </a:rPr>
+              <a:t>, ENAME              VARCHAR2(10)   </a:t>
+            </a:r>
+          </a:p>
+          <a:p>
+            <a:r>
+              <a:rPr lang="en-US" sz="1400" dirty="0">
+                <a:latin typeface="Lucida Console" panose="020B0609040504020204" pitchFamily="49" charset="0"/>
+              </a:rPr>
+              <a:t>, JOB                VARCHAR2(9)    </a:t>
+            </a:r>
+          </a:p>
+          <a:p>
+            <a:r>
+              <a:rPr lang="en-US" sz="1400" dirty="0">
+                <a:latin typeface="Lucida Console" panose="020B0609040504020204" pitchFamily="49" charset="0"/>
+              </a:rPr>
+              <a:t>, MGR                NUMBER(4)      </a:t>
+            </a:r>
+          </a:p>
+          <a:p>
+            <a:r>
+              <a:rPr lang="en-US" sz="1400" dirty="0">
+                <a:latin typeface="Lucida Console" panose="020B0609040504020204" pitchFamily="49" charset="0"/>
+              </a:rPr>
+              <a:t>, SAL                NUMBER(7,2)    </a:t>
+            </a:r>
+          </a:p>
+          <a:p>
+            <a:r>
+              <a:rPr lang="en-US" sz="1400" dirty="0">
+                <a:latin typeface="Lucida Console" panose="020B0609040504020204" pitchFamily="49" charset="0"/>
+              </a:rPr>
+              <a:t>, COMM               NUMBER(7,2)    </a:t>
+            </a:r>
+          </a:p>
+          <a:p>
+            <a:r>
+              <a:rPr lang="en-US" sz="1400" dirty="0">
+                <a:latin typeface="Lucida Console" panose="020B0609040504020204" pitchFamily="49" charset="0"/>
+              </a:rPr>
+              <a:t>, STARTDATE          DATE</a:t>
+            </a:r>
+          </a:p>
+          <a:p>
+            <a:r>
+              <a:rPr lang="en-US" sz="1800" dirty="0">
+                <a:latin typeface="Lucida Console" panose="020B0609040504020204" pitchFamily="49" charset="0"/>
+              </a:rPr>
+              <a:t>)</a:t>
+            </a:r>
+          </a:p>
+          <a:p>
+            <a:endParaRPr lang="en-US" sz="1800" dirty="0">
+              <a:latin typeface="Lucida Console" panose="020B0609040504020204" pitchFamily="49" charset="0"/>
+            </a:endParaRPr>
+          </a:p>
+          <a:p>
+            <a:r>
+              <a:rPr lang="en-US" sz="1800" dirty="0">
+                <a:latin typeface="Lucida Console" panose="020B0609040504020204" pitchFamily="49" charset="0"/>
+              </a:rPr>
+              <a:t>create or replace type </a:t>
+            </a:r>
+            <a:r>
+              <a:rPr lang="en-US" sz="1800" dirty="0" err="1">
+                <a:latin typeface="Lucida Console" panose="020B0609040504020204" pitchFamily="49" charset="0"/>
+              </a:rPr>
+              <a:t>emp_tbl_t</a:t>
+            </a:r>
+            <a:r>
+              <a:rPr lang="en-US" sz="1800" dirty="0">
+                <a:latin typeface="Lucida Console" panose="020B0609040504020204" pitchFamily="49" charset="0"/>
+              </a:rPr>
+              <a:t> as  table of </a:t>
+            </a:r>
+            <a:r>
+              <a:rPr lang="en-US" sz="1800" dirty="0" err="1">
+                <a:latin typeface="Lucida Console" panose="020B0609040504020204" pitchFamily="49" charset="0"/>
+              </a:rPr>
+              <a:t>emp_t</a:t>
+            </a:r>
+            <a:r>
+              <a:rPr lang="en-US" sz="1800" dirty="0">
+                <a:latin typeface="Lucida Console" panose="020B0609040504020204" pitchFamily="49" charset="0"/>
+              </a:rPr>
+              <a:t> </a:t>
+            </a:r>
+            <a:r>
               <a:rPr lang="nl-NL" sz="1800" dirty="0" smtClean="0">
                 <a:latin typeface="Lucida Console" panose="020B0609040504020204" pitchFamily="49" charset="0"/>
               </a:rPr>
+              <a:t/>
+            </a:r>
+            <a:br>
+              <a:rPr lang="nl-NL" sz="1800" dirty="0" smtClean="0">
+                <a:latin typeface="Lucida Console" panose="020B0609040504020204" pitchFamily="49" charset="0"/>
+              </a:rPr>
+            </a:br>
+            <a:r>
+              <a:rPr lang="nl-NL" sz="1800" dirty="0" smtClean="0">
+                <a:latin typeface="Lucida Console" panose="020B0609040504020204" pitchFamily="49" charset="0"/>
+              </a:rPr>
+              <a:t/>
+            </a:r>
+            <a:br>
+              <a:rPr lang="nl-NL" sz="1800" dirty="0" smtClean="0">
+                <a:latin typeface="Lucida Console" panose="020B0609040504020204" pitchFamily="49" charset="0"/>
+              </a:rPr>
+            </a:br>
+            <a:r>
+              <a:rPr lang="nl-NL" sz="1800" dirty="0" smtClean="0">
+                <a:latin typeface="Lucida Console" panose="020B0609040504020204" pitchFamily="49" charset="0"/>
+              </a:rPr>
               <a:t>-- </a:t>
             </a:r>
             <a:r>
@@ -30976,41 +31117,325 @@
               <a:t> </a:t>
             </a:r>
             <a:r>
+              <a:rPr lang="nl-NL" sz="1800" dirty="0" err="1">
+                <a:latin typeface="Lucida Console" panose="020B0609040504020204" pitchFamily="49" charset="0"/>
+              </a:rPr>
+              <a:t>n</a:t>
+            </a:r>
+            <a:r>
               <a:rPr lang="nl-NL" sz="1800" dirty="0" err="1" smtClean="0">
                 <a:latin typeface="Lucida Console" panose="020B0609040504020204" pitchFamily="49" charset="0"/>
               </a:rPr>
-              <a:t>nested</a:t>
+              <a:t>ested</a:t>
             </a:r>
             <a:r>
               <a:rPr lang="nl-NL" sz="1800" dirty="0" smtClean="0">
                 <a:latin typeface="Lucida Console" panose="020B0609040504020204" pitchFamily="49" charset="0"/>
               </a:rPr>
-              <a:t> cursor? </a:t>
+              <a:t> </a:t>
             </a:r>
             <a:r>
               <a:rPr lang="nl-NL" sz="1800" dirty="0" err="1" smtClean="0">
                 <a:latin typeface="Lucida Console" panose="020B0609040504020204" pitchFamily="49" charset="0"/>
               </a:rPr>
-              <a:t>Nested</a:t>
-            </a:r>
-            <a:r>
-              <a:rPr lang="nl-NL" sz="1800" dirty="0" smtClean="0">
-                <a:latin typeface="Lucida Console" panose="020B0609040504020204" pitchFamily="49" charset="0"/>
-              </a:rPr>
-              <a:t> </a:t>
-            </a:r>
-            <a:r>
-              <a:rPr lang="nl-NL" sz="1800" dirty="0" err="1" smtClean="0">
-                <a:latin typeface="Lucida Console" panose="020B0609040504020204" pitchFamily="49" charset="0"/>
-              </a:rPr>
               <a:t>table</a:t>
             </a:r>
-            <a:r>
-              <a:rPr lang="nl-NL" sz="1800" dirty="0" smtClean="0">
-                <a:latin typeface="Lucida Console" panose="020B0609040504020204" pitchFamily="49" charset="0"/>
-              </a:rPr>
-              <a:t>?</a:t>
-            </a:r>
+            <a:endParaRPr lang="nl-NL" sz="1800" dirty="0" smtClean="0">
+              <a:latin typeface="Lucida Console" panose="020B0609040504020204" pitchFamily="49" charset="0"/>
+            </a:endParaRPr>
+          </a:p>
+          <a:p>
+            <a:r>
+              <a:rPr lang="en-US" sz="1800" dirty="0">
+                <a:latin typeface="Lucida Console" panose="020B0609040504020204" pitchFamily="49" charset="0"/>
+              </a:rPr>
+              <a:t>create materialized view departments</a:t>
+            </a:r>
+          </a:p>
+          <a:p>
+            <a:r>
+              <a:rPr lang="en-US" sz="1800" dirty="0">
+                <a:latin typeface="Lucida Console" panose="020B0609040504020204" pitchFamily="49" charset="0"/>
+              </a:rPr>
+              <a:t>BUILD IMMEDIATE </a:t>
+            </a:r>
+          </a:p>
+          <a:p>
+            <a:r>
+              <a:rPr lang="en-US" sz="1800" dirty="0">
+                <a:latin typeface="Lucida Console" panose="020B0609040504020204" pitchFamily="49" charset="0"/>
+              </a:rPr>
+              <a:t>REFRESH FORCE </a:t>
+            </a:r>
+          </a:p>
+          <a:p>
+            <a:r>
+              <a:rPr lang="en-US" sz="1800" dirty="0">
+                <a:latin typeface="Lucida Console" panose="020B0609040504020204" pitchFamily="49" charset="0"/>
+              </a:rPr>
+              <a:t>ON DEMAND </a:t>
+            </a:r>
+          </a:p>
+          <a:p>
+            <a:r>
+              <a:rPr lang="en-US" sz="1800" dirty="0">
+                <a:latin typeface="Lucida Console" panose="020B0609040504020204" pitchFamily="49" charset="0"/>
+              </a:rPr>
+              <a:t>as </a:t>
+            </a:r>
+          </a:p>
+          <a:p>
+            <a:r>
+              <a:rPr lang="en-US" sz="1800" dirty="0">
+                <a:latin typeface="Lucida Console" panose="020B0609040504020204" pitchFamily="49" charset="0"/>
+              </a:rPr>
+              <a:t>select </a:t>
+            </a:r>
+            <a:r>
+              <a:rPr lang="en-US" sz="1800" dirty="0" err="1">
+                <a:latin typeface="Lucida Console" panose="020B0609040504020204" pitchFamily="49" charset="0"/>
+              </a:rPr>
+              <a:t>deptno</a:t>
+            </a:r>
+            <a:endParaRPr lang="en-US" sz="1800" dirty="0">
+              <a:latin typeface="Lucida Console" panose="020B0609040504020204" pitchFamily="49" charset="0"/>
+            </a:endParaRPr>
+          </a:p>
+          <a:p>
+            <a:r>
+              <a:rPr lang="en-US" sz="1800" dirty="0">
+                <a:latin typeface="Lucida Console" panose="020B0609040504020204" pitchFamily="49" charset="0"/>
+              </a:rPr>
+              <a:t>,      </a:t>
+            </a:r>
+            <a:r>
+              <a:rPr lang="en-US" sz="1800" dirty="0" err="1">
+                <a:latin typeface="Lucida Console" panose="020B0609040504020204" pitchFamily="49" charset="0"/>
+              </a:rPr>
+              <a:t>dname</a:t>
+            </a:r>
+            <a:endParaRPr lang="en-US" sz="1800" dirty="0">
+              <a:latin typeface="Lucida Console" panose="020B0609040504020204" pitchFamily="49" charset="0"/>
+            </a:endParaRPr>
+          </a:p>
+          <a:p>
+            <a:r>
+              <a:rPr lang="en-US" sz="1800" dirty="0">
+                <a:latin typeface="Lucida Console" panose="020B0609040504020204" pitchFamily="49" charset="0"/>
+              </a:rPr>
+              <a:t>,      </a:t>
+            </a:r>
+            <a:r>
+              <a:rPr lang="en-US" sz="1800" dirty="0" err="1">
+                <a:latin typeface="Lucida Console" panose="020B0609040504020204" pitchFamily="49" charset="0"/>
+              </a:rPr>
+              <a:t>loc</a:t>
+            </a:r>
+            <a:endParaRPr lang="en-US" sz="1800" dirty="0">
+              <a:latin typeface="Lucida Console" panose="020B0609040504020204" pitchFamily="49" charset="0"/>
+            </a:endParaRPr>
+          </a:p>
+          <a:p>
+            <a:r>
+              <a:rPr lang="en-US" sz="1800" dirty="0">
+                <a:latin typeface="Lucida Console" panose="020B0609040504020204" pitchFamily="49" charset="0"/>
+              </a:rPr>
+              <a:t>,      cast ( multiset ( select </a:t>
+            </a:r>
+            <a:r>
+              <a:rPr lang="en-US" sz="1800" dirty="0" err="1">
+                <a:latin typeface="Lucida Console" panose="020B0609040504020204" pitchFamily="49" charset="0"/>
+              </a:rPr>
+              <a:t>empno</a:t>
+            </a:r>
+            <a:r>
+              <a:rPr lang="en-US" sz="1800" dirty="0">
+                <a:latin typeface="Lucida Console" panose="020B0609040504020204" pitchFamily="49" charset="0"/>
+              </a:rPr>
+              <a:t>, </a:t>
+            </a:r>
+            <a:r>
+              <a:rPr lang="en-US" sz="1800" dirty="0" err="1">
+                <a:latin typeface="Lucida Console" panose="020B0609040504020204" pitchFamily="49" charset="0"/>
+              </a:rPr>
+              <a:t>ename</a:t>
+            </a:r>
+            <a:r>
+              <a:rPr lang="en-US" sz="1800" dirty="0">
+                <a:latin typeface="Lucida Console" panose="020B0609040504020204" pitchFamily="49" charset="0"/>
+              </a:rPr>
+              <a:t>, </a:t>
+            </a:r>
+            <a:r>
+              <a:rPr lang="en-US" sz="1800" dirty="0" smtClean="0">
+                <a:latin typeface="Lucida Console" panose="020B0609040504020204" pitchFamily="49" charset="0"/>
+              </a:rPr>
+              <a:t>job</a:t>
+            </a:r>
+            <a:br>
+              <a:rPr lang="en-US" sz="1800" dirty="0" smtClean="0">
+                <a:latin typeface="Lucida Console" panose="020B0609040504020204" pitchFamily="49" charset="0"/>
+              </a:rPr>
+            </a:br>
+            <a:r>
+              <a:rPr lang="en-US" sz="1800" dirty="0" smtClean="0">
+                <a:latin typeface="Lucida Console" panose="020B0609040504020204" pitchFamily="49" charset="0"/>
+              </a:rPr>
+              <a:t>                         ,    </a:t>
+            </a:r>
+            <a:r>
+              <a:rPr lang="en-US" sz="1800" dirty="0" err="1" smtClean="0">
+                <a:latin typeface="Lucida Console" panose="020B0609040504020204" pitchFamily="49" charset="0"/>
+              </a:rPr>
+              <a:t>mgr</a:t>
+            </a:r>
+            <a:r>
+              <a:rPr lang="en-US" sz="1800" dirty="0">
+                <a:latin typeface="Lucida Console" panose="020B0609040504020204" pitchFamily="49" charset="0"/>
+              </a:rPr>
+              <a:t>, </a:t>
+            </a:r>
+            <a:r>
+              <a:rPr lang="en-US" sz="1800" dirty="0" err="1">
+                <a:latin typeface="Lucida Console" panose="020B0609040504020204" pitchFamily="49" charset="0"/>
+              </a:rPr>
+              <a:t>sal</a:t>
+            </a:r>
+            <a:r>
+              <a:rPr lang="en-US" sz="1800" dirty="0">
+                <a:latin typeface="Lucida Console" panose="020B0609040504020204" pitchFamily="49" charset="0"/>
+              </a:rPr>
+              <a:t>, </a:t>
+            </a:r>
+            <a:r>
+              <a:rPr lang="en-US" sz="1800" dirty="0" err="1">
+                <a:latin typeface="Lucida Console" panose="020B0609040504020204" pitchFamily="49" charset="0"/>
+              </a:rPr>
+              <a:t>comm</a:t>
+            </a:r>
+            <a:r>
+              <a:rPr lang="en-US" sz="1800" dirty="0">
+                <a:latin typeface="Lucida Console" panose="020B0609040504020204" pitchFamily="49" charset="0"/>
+              </a:rPr>
+              <a:t>, </a:t>
+            </a:r>
+            <a:r>
+              <a:rPr lang="en-US" sz="1800" dirty="0" err="1">
+                <a:latin typeface="Lucida Console" panose="020B0609040504020204" pitchFamily="49" charset="0"/>
+              </a:rPr>
+              <a:t>hiredate</a:t>
+            </a:r>
+            <a:endParaRPr lang="en-US" sz="1800" dirty="0">
+              <a:latin typeface="Lucida Console" panose="020B0609040504020204" pitchFamily="49" charset="0"/>
+            </a:endParaRPr>
+          </a:p>
+          <a:p>
+            <a:r>
+              <a:rPr lang="en-US" sz="1800" dirty="0">
+                <a:latin typeface="Lucida Console" panose="020B0609040504020204" pitchFamily="49" charset="0"/>
+              </a:rPr>
+              <a:t>                         from   </a:t>
+            </a:r>
+            <a:r>
+              <a:rPr lang="en-US" sz="1800" dirty="0" err="1">
+                <a:latin typeface="Lucida Console" panose="020B0609040504020204" pitchFamily="49" charset="0"/>
+              </a:rPr>
+              <a:t>emp</a:t>
+            </a:r>
+            <a:r>
+              <a:rPr lang="en-US" sz="1800" dirty="0">
+                <a:latin typeface="Lucida Console" panose="020B0609040504020204" pitchFamily="49" charset="0"/>
+              </a:rPr>
+              <a:t> e</a:t>
+            </a:r>
+          </a:p>
+          <a:p>
+            <a:r>
+              <a:rPr lang="en-US" sz="1800" dirty="0">
+                <a:latin typeface="Lucida Console" panose="020B0609040504020204" pitchFamily="49" charset="0"/>
+              </a:rPr>
+              <a:t>                         where  </a:t>
+            </a:r>
+            <a:r>
+              <a:rPr lang="en-US" sz="1800" dirty="0" err="1">
+                <a:latin typeface="Lucida Console" panose="020B0609040504020204" pitchFamily="49" charset="0"/>
+              </a:rPr>
+              <a:t>e.deptno</a:t>
+            </a:r>
+            <a:r>
+              <a:rPr lang="en-US" sz="1800" dirty="0">
+                <a:latin typeface="Lucida Console" panose="020B0609040504020204" pitchFamily="49" charset="0"/>
+              </a:rPr>
+              <a:t> = </a:t>
+            </a:r>
+            <a:r>
+              <a:rPr lang="en-US" sz="1800" dirty="0" err="1" smtClean="0">
+                <a:latin typeface="Lucida Console" panose="020B0609040504020204" pitchFamily="49" charset="0"/>
+              </a:rPr>
+              <a:t>d.deptno</a:t>
+            </a:r>
+            <a:r>
+              <a:rPr lang="en-US" sz="1800" dirty="0" smtClean="0">
+                <a:latin typeface="Lucida Console" panose="020B0609040504020204" pitchFamily="49" charset="0"/>
+              </a:rPr>
+              <a:t/>
+            </a:r>
+            <a:br>
+              <a:rPr lang="en-US" sz="1800" dirty="0" smtClean="0">
+                <a:latin typeface="Lucida Console" panose="020B0609040504020204" pitchFamily="49" charset="0"/>
+              </a:rPr>
+            </a:br>
+            <a:r>
+              <a:rPr lang="en-US" sz="1800" dirty="0" smtClean="0">
+                <a:latin typeface="Lucida Console" panose="020B0609040504020204" pitchFamily="49" charset="0"/>
+              </a:rPr>
+              <a:t>                       ) </a:t>
+            </a:r>
+            <a:br>
+              <a:rPr lang="en-US" sz="1800" dirty="0" smtClean="0">
+                <a:latin typeface="Lucida Console" panose="020B0609040504020204" pitchFamily="49" charset="0"/>
+              </a:rPr>
+            </a:br>
+            <a:r>
+              <a:rPr lang="en-US" sz="1800" dirty="0" smtClean="0">
+                <a:latin typeface="Lucida Console" panose="020B0609040504020204" pitchFamily="49" charset="0"/>
+              </a:rPr>
+              <a:t>              as </a:t>
+            </a:r>
+            <a:r>
+              <a:rPr lang="en-US" sz="1800" dirty="0" err="1">
+                <a:latin typeface="Lucida Console" panose="020B0609040504020204" pitchFamily="49" charset="0"/>
+              </a:rPr>
+              <a:t>emp_tbl_t</a:t>
+            </a:r>
+            <a:r>
+              <a:rPr lang="en-US" sz="1800" dirty="0">
+                <a:latin typeface="Lucida Console" panose="020B0609040504020204" pitchFamily="49" charset="0"/>
+              </a:rPr>
+              <a:t>) staff</a:t>
+            </a:r>
+          </a:p>
+          <a:p>
+            <a:r>
+              <a:rPr lang="en-US" sz="1800" dirty="0">
+                <a:latin typeface="Lucida Console" panose="020B0609040504020204" pitchFamily="49" charset="0"/>
+              </a:rPr>
+              <a:t>from   </a:t>
+            </a:r>
+            <a:r>
+              <a:rPr lang="en-US" sz="1800" dirty="0" err="1">
+                <a:latin typeface="Lucida Console" panose="020B0609040504020204" pitchFamily="49" charset="0"/>
+              </a:rPr>
+              <a:t>dept</a:t>
+            </a:r>
+            <a:r>
+              <a:rPr lang="en-US" sz="1800" dirty="0">
+                <a:latin typeface="Lucida Console" panose="020B0609040504020204" pitchFamily="49" charset="0"/>
+              </a:rPr>
+              <a:t> d</a:t>
+            </a:r>
+          </a:p>
+          <a:p>
             <a:endParaRPr lang="en-US" sz="1800" dirty="0">
               <a:latin typeface="Lucida Console" panose="020B0609040504020204" pitchFamily="49" charset="0"/>
             </a:endParaRPr>
@@ -31266,7 +31691,7 @@
         <p:spPr>
           <a:xfrm>
             <a:off x="8798166" y="1727200"/>
-            <a:ext cx="7800734" cy="646331"/>
+            <a:ext cx="7800734" cy="2308324"/>
           </a:xfrm>
           <a:prstGeom prst="rect">
             <a:avLst/>
@@ -31280,90 +31705,168 @@
           <a:lstStyle/>
           <a:p>
             <a:r>
-              <a:rPr lang="nl-NL" sz="1800" dirty="0" smtClean="0">
-                <a:latin typeface="Lucida Console" panose="020B0609040504020204" pitchFamily="49" charset="0"/>
-              </a:rPr>
-              <a:t>-- </a:t>
-            </a:r>
-            <a:r>
-              <a:rPr lang="nl-NL" sz="1800" dirty="0" err="1" smtClean="0">
-                <a:latin typeface="Lucida Console" panose="020B0609040504020204" pitchFamily="49" charset="0"/>
-              </a:rPr>
-              <a:t>create</a:t>
-            </a:r>
-            <a:r>
-              <a:rPr lang="nl-NL" sz="1800" dirty="0" smtClean="0">
+              <a:rPr lang="en-US" sz="1800" dirty="0">
+                <a:latin typeface="Lucida Console" panose="020B0609040504020204" pitchFamily="49" charset="0"/>
+              </a:rPr>
+              <a:t>select </a:t>
+            </a:r>
+            <a:r>
+              <a:rPr lang="en-US" sz="1800" dirty="0" err="1">
+                <a:latin typeface="Lucida Console" panose="020B0609040504020204" pitchFamily="49" charset="0"/>
+              </a:rPr>
+              <a:t>d.deptno</a:t>
+            </a:r>
+            <a:endParaRPr lang="en-US" sz="1800" dirty="0">
+              <a:latin typeface="Lucida Console" panose="020B0609040504020204" pitchFamily="49" charset="0"/>
+            </a:endParaRPr>
+          </a:p>
+          <a:p>
+            <a:r>
+              <a:rPr lang="en-US" sz="1800" dirty="0" smtClean="0">
+                <a:latin typeface="Lucida Console" panose="020B0609040504020204" pitchFamily="49" charset="0"/>
+              </a:rPr>
+              <a:t>,      </a:t>
+            </a:r>
+            <a:r>
+              <a:rPr lang="en-US" sz="1800" dirty="0" err="1">
+                <a:latin typeface="Lucida Console" panose="020B0609040504020204" pitchFamily="49" charset="0"/>
+              </a:rPr>
+              <a:t>d.dname</a:t>
+            </a:r>
+            <a:endParaRPr lang="en-US" sz="1800" dirty="0">
+              <a:latin typeface="Lucida Console" panose="020B0609040504020204" pitchFamily="49" charset="0"/>
+            </a:endParaRPr>
+          </a:p>
+          <a:p>
+            <a:r>
+              <a:rPr lang="en-US" sz="1800" dirty="0" smtClean="0">
+                <a:latin typeface="Lucida Console" panose="020B0609040504020204" pitchFamily="49" charset="0"/>
+              </a:rPr>
+              <a:t>,      </a:t>
+            </a:r>
+            <a:r>
+              <a:rPr lang="en-US" sz="1800" dirty="0" err="1">
+                <a:latin typeface="Lucida Console" panose="020B0609040504020204" pitchFamily="49" charset="0"/>
+              </a:rPr>
+              <a:t>d.loc</a:t>
+            </a:r>
+            <a:endParaRPr lang="en-US" sz="1800" dirty="0">
+              <a:latin typeface="Lucida Console" panose="020B0609040504020204" pitchFamily="49" charset="0"/>
+            </a:endParaRPr>
+          </a:p>
+          <a:p>
+            <a:r>
+              <a:rPr lang="en-US" sz="1800" dirty="0" smtClean="0">
+                <a:latin typeface="Lucida Console" panose="020B0609040504020204" pitchFamily="49" charset="0"/>
+              </a:rPr>
+              <a:t>from   </a:t>
+            </a:r>
+            <a:r>
+              <a:rPr lang="en-US" sz="1800" dirty="0">
+                <a:latin typeface="Lucida Console" panose="020B0609040504020204" pitchFamily="49" charset="0"/>
+              </a:rPr>
+              <a:t>departments d</a:t>
+            </a:r>
+          </a:p>
+          <a:p>
+            <a:r>
+              <a:rPr lang="en-US" sz="1800" dirty="0" smtClean="0">
+                <a:latin typeface="Lucida Console" panose="020B0609040504020204" pitchFamily="49" charset="0"/>
+              </a:rPr>
+              <a:t>where  ( </a:t>
+            </a:r>
+            <a:r>
+              <a:rPr lang="en-US" sz="1800" dirty="0">
+                <a:latin typeface="Lucida Console" panose="020B0609040504020204" pitchFamily="49" charset="0"/>
+              </a:rPr>
+              <a:t>select count(*) </a:t>
+            </a:r>
+            <a:r>
+              <a:rPr lang="en-US" sz="1800" dirty="0" smtClean="0">
+                <a:latin typeface="Lucida Console" panose="020B0609040504020204" pitchFamily="49" charset="0"/>
+              </a:rPr>
+              <a:t/>
+            </a:r>
+            <a:br>
+              <a:rPr lang="en-US" sz="1800" dirty="0" smtClean="0">
+                <a:latin typeface="Lucida Console" panose="020B0609040504020204" pitchFamily="49" charset="0"/>
+              </a:rPr>
+            </a:br>
+            <a:r>
+              <a:rPr lang="en-US" sz="1800" dirty="0" smtClean="0">
+                <a:latin typeface="Lucida Console" panose="020B0609040504020204" pitchFamily="49" charset="0"/>
+              </a:rPr>
+              <a:t>         from </a:t>
+            </a:r>
+            <a:r>
+              <a:rPr lang="en-US" sz="1800" dirty="0">
+                <a:latin typeface="Lucida Console" panose="020B0609040504020204" pitchFamily="49" charset="0"/>
+              </a:rPr>
+              <a:t>table(</a:t>
+            </a:r>
+            <a:r>
+              <a:rPr lang="en-US" sz="1800" dirty="0" err="1">
+                <a:latin typeface="Lucida Console" panose="020B0609040504020204" pitchFamily="49" charset="0"/>
+              </a:rPr>
+              <a:t>d.staff</a:t>
+            </a:r>
+            <a:r>
+              <a:rPr lang="en-US" sz="1800" dirty="0">
+                <a:latin typeface="Lucida Console" panose="020B0609040504020204" pitchFamily="49" charset="0"/>
+              </a:rPr>
+              <a:t>) </a:t>
+            </a:r>
+            <a:r>
+              <a:rPr lang="en-US" sz="1800" dirty="0" smtClean="0">
+                <a:latin typeface="Lucida Console" panose="020B0609040504020204" pitchFamily="49" charset="0"/>
+              </a:rPr>
+              <a:t/>
+            </a:r>
+            <a:br>
+              <a:rPr lang="en-US" sz="1800" dirty="0" smtClean="0">
+                <a:latin typeface="Lucida Console" panose="020B0609040504020204" pitchFamily="49" charset="0"/>
+              </a:rPr>
+            </a:br>
+            <a:r>
+              <a:rPr lang="en-US" sz="1800" dirty="0" smtClean="0">
+                <a:latin typeface="Lucida Console" panose="020B0609040504020204" pitchFamily="49" charset="0"/>
+              </a:rPr>
+              <a:t>         where </a:t>
+            </a:r>
+            <a:r>
+              <a:rPr lang="en-US" sz="1800" dirty="0" err="1" smtClean="0">
+                <a:latin typeface="Lucida Console" panose="020B0609040504020204" pitchFamily="49" charset="0"/>
+              </a:rPr>
+              <a:t>ename</a:t>
+            </a:r>
+            <a:r>
+              <a:rPr lang="en-US" sz="1800" dirty="0" smtClean="0">
                 <a:latin typeface="Lucida Console" panose="020B0609040504020204" pitchFamily="49" charset="0"/>
               </a:rPr>
               <a:t> </a:t>
             </a:r>
             <a:r>
-              <a:rPr lang="nl-NL" sz="1800" dirty="0" err="1" smtClean="0">
-                <a:latin typeface="Lucida Console" panose="020B0609040504020204" pitchFamily="49" charset="0"/>
-              </a:rPr>
-              <a:t>materialized</a:t>
-            </a:r>
-            <a:r>
-              <a:rPr lang="nl-NL" sz="1800" dirty="0" smtClean="0">
-                <a:latin typeface="Lucida Console" panose="020B0609040504020204" pitchFamily="49" charset="0"/>
-              </a:rPr>
-              <a:t> view</a:t>
-            </a:r>
-          </a:p>
-          <a:p>
-            <a:r>
-              <a:rPr lang="nl-NL" sz="1800" dirty="0" smtClean="0">
-                <a:latin typeface="Lucida Console" panose="020B0609040504020204" pitchFamily="49" charset="0"/>
-              </a:rPr>
-              <a:t>-- </a:t>
-            </a:r>
-            <a:r>
-              <a:rPr lang="nl-NL" sz="1800" dirty="0" err="1" smtClean="0">
-                <a:latin typeface="Lucida Console" panose="020B0609040504020204" pitchFamily="49" charset="0"/>
-              </a:rPr>
-              <a:t>with</a:t>
-            </a:r>
-            <a:r>
-              <a:rPr lang="nl-NL" sz="1800" dirty="0" smtClean="0">
-                <a:latin typeface="Lucida Console" panose="020B0609040504020204" pitchFamily="49" charset="0"/>
-              </a:rPr>
-              <a:t> </a:t>
-            </a:r>
-            <a:r>
-              <a:rPr lang="nl-NL" sz="1800" dirty="0" err="1" smtClean="0">
-                <a:latin typeface="Lucida Console" panose="020B0609040504020204" pitchFamily="49" charset="0"/>
-              </a:rPr>
-              <a:t>nested</a:t>
-            </a:r>
-            <a:r>
-              <a:rPr lang="nl-NL" sz="1800" dirty="0" smtClean="0">
-                <a:latin typeface="Lucida Console" panose="020B0609040504020204" pitchFamily="49" charset="0"/>
-              </a:rPr>
-              <a:t> cursor? </a:t>
-            </a:r>
-            <a:r>
-              <a:rPr lang="nl-NL" sz="1800" dirty="0" err="1" smtClean="0">
-                <a:latin typeface="Lucida Console" panose="020B0609040504020204" pitchFamily="49" charset="0"/>
-              </a:rPr>
-              <a:t>Nested</a:t>
-            </a:r>
-            <a:r>
-              <a:rPr lang="nl-NL" sz="1800" dirty="0" smtClean="0">
-                <a:latin typeface="Lucida Console" panose="020B0609040504020204" pitchFamily="49" charset="0"/>
-              </a:rPr>
-              <a:t> </a:t>
-            </a:r>
-            <a:r>
-              <a:rPr lang="nl-NL" sz="1800" dirty="0" err="1" smtClean="0">
-                <a:latin typeface="Lucida Console" panose="020B0609040504020204" pitchFamily="49" charset="0"/>
-              </a:rPr>
-              <a:t>table</a:t>
-            </a:r>
-            <a:r>
-              <a:rPr lang="nl-NL" sz="1800" dirty="0" smtClean="0">
-                <a:latin typeface="Lucida Console" panose="020B0609040504020204" pitchFamily="49" charset="0"/>
-              </a:rPr>
-              <a:t>?</a:t>
+              <a:rPr lang="en-US" sz="1800" dirty="0">
+                <a:latin typeface="Lucida Console" panose="020B0609040504020204" pitchFamily="49" charset="0"/>
+              </a:rPr>
+              <a:t>=</a:t>
+            </a:r>
+            <a:r>
+              <a:rPr lang="en-US" sz="1800" dirty="0" smtClean="0">
+                <a:latin typeface="Lucida Console" panose="020B0609040504020204" pitchFamily="49" charset="0"/>
+              </a:rPr>
+              <a:t>'KING'</a:t>
+            </a:r>
+            <a:br>
+              <a:rPr lang="en-US" sz="1800" dirty="0" smtClean="0">
+                <a:latin typeface="Lucida Console" panose="020B0609040504020204" pitchFamily="49" charset="0"/>
+              </a:rPr>
+            </a:br>
+            <a:r>
+              <a:rPr lang="en-US" sz="1800" dirty="0" smtClean="0">
+                <a:latin typeface="Lucida Console" panose="020B0609040504020204" pitchFamily="49" charset="0"/>
+              </a:rPr>
+              <a:t>       ) &gt; 0</a:t>
             </a:r>
             <a:endParaRPr lang="en-US" sz="1800" dirty="0">
               <a:latin typeface="Lucida Console" panose="020B0609040504020204" pitchFamily="49" charset="0"/>
@@ -31759,7 +32262,7 @@
         <p:spPr>
           <a:xfrm>
             <a:off x="8798166" y="1727200"/>
-            <a:ext cx="7800734" cy="646331"/>
+            <a:ext cx="7800734" cy="2031325"/>
           </a:xfrm>
           <a:prstGeom prst="rect">
             <a:avLst/>
@@ -31773,90 +32276,109 @@
           <a:lstStyle/>
           <a:p>
             <a:r>
-              <a:rPr lang="nl-NL" sz="1800" dirty="0" smtClean="0">
-                <a:latin typeface="Lucida Console" panose="020B0609040504020204" pitchFamily="49" charset="0"/>
-              </a:rPr>
-              <a:t>-- </a:t>
-            </a:r>
-            <a:r>
-              <a:rPr lang="nl-NL" sz="1800" dirty="0" err="1" smtClean="0">
-                <a:latin typeface="Lucida Console" panose="020B0609040504020204" pitchFamily="49" charset="0"/>
-              </a:rPr>
-              <a:t>create</a:t>
-            </a:r>
-            <a:r>
-              <a:rPr lang="nl-NL" sz="1800" dirty="0" smtClean="0">
-                <a:latin typeface="Lucida Console" panose="020B0609040504020204" pitchFamily="49" charset="0"/>
-              </a:rPr>
-              <a:t> </a:t>
-            </a:r>
-            <a:r>
-              <a:rPr lang="nl-NL" sz="1800" dirty="0" err="1" smtClean="0">
-                <a:latin typeface="Lucida Console" panose="020B0609040504020204" pitchFamily="49" charset="0"/>
-              </a:rPr>
-              <a:t>materialized</a:t>
-            </a:r>
-            <a:r>
-              <a:rPr lang="nl-NL" sz="1800" dirty="0" smtClean="0">
-                <a:latin typeface="Lucida Console" panose="020B0609040504020204" pitchFamily="49" charset="0"/>
-              </a:rPr>
-              <a:t> view</a:t>
-            </a:r>
-          </a:p>
-          <a:p>
-            <a:r>
-              <a:rPr lang="nl-NL" sz="1800" dirty="0" smtClean="0">
-                <a:latin typeface="Lucida Console" panose="020B0609040504020204" pitchFamily="49" charset="0"/>
-              </a:rPr>
-              <a:t>-- </a:t>
-            </a:r>
-            <a:r>
-              <a:rPr lang="nl-NL" sz="1800" dirty="0" err="1" smtClean="0">
-                <a:latin typeface="Lucida Console" panose="020B0609040504020204" pitchFamily="49" charset="0"/>
-              </a:rPr>
-              <a:t>with</a:t>
-            </a:r>
-            <a:r>
-              <a:rPr lang="nl-NL" sz="1800" dirty="0" smtClean="0">
-                <a:latin typeface="Lucida Console" panose="020B0609040504020204" pitchFamily="49" charset="0"/>
-              </a:rPr>
-              <a:t> </a:t>
-            </a:r>
-            <a:r>
-              <a:rPr lang="nl-NL" sz="1800" dirty="0" err="1" smtClean="0">
-                <a:latin typeface="Lucida Console" panose="020B0609040504020204" pitchFamily="49" charset="0"/>
-              </a:rPr>
-              <a:t>nested</a:t>
-            </a:r>
-            <a:r>
-              <a:rPr lang="nl-NL" sz="1800" dirty="0" smtClean="0">
-                <a:latin typeface="Lucida Console" panose="020B0609040504020204" pitchFamily="49" charset="0"/>
-              </a:rPr>
-              <a:t> cursor? </a:t>
-            </a:r>
-            <a:r>
-              <a:rPr lang="nl-NL" sz="1800" dirty="0" err="1" smtClean="0">
-                <a:latin typeface="Lucida Console" panose="020B0609040504020204" pitchFamily="49" charset="0"/>
-              </a:rPr>
-              <a:t>Nested</a:t>
-            </a:r>
-            <a:r>
-              <a:rPr lang="nl-NL" sz="1800" dirty="0" smtClean="0">
-                <a:latin typeface="Lucida Console" panose="020B0609040504020204" pitchFamily="49" charset="0"/>
-              </a:rPr>
-              <a:t> </a:t>
-            </a:r>
-            <a:r>
-              <a:rPr lang="nl-NL" sz="1800" dirty="0" err="1" smtClean="0">
-                <a:latin typeface="Lucida Console" panose="020B0609040504020204" pitchFamily="49" charset="0"/>
-              </a:rPr>
-              <a:t>table</a:t>
-            </a:r>
-            <a:r>
-              <a:rPr lang="nl-NL" sz="1800" dirty="0" smtClean="0">
-                <a:latin typeface="Lucida Console" panose="020B0609040504020204" pitchFamily="49" charset="0"/>
-              </a:rPr>
-              <a:t>?</a:t>
+              <a:rPr lang="en-US" sz="1800" dirty="0">
+                <a:latin typeface="Lucida Console" panose="020B0609040504020204" pitchFamily="49" charset="0"/>
+              </a:rPr>
+              <a:t>select </a:t>
+            </a:r>
+            <a:r>
+              <a:rPr lang="en-US" sz="1800" dirty="0" err="1">
+                <a:latin typeface="Lucida Console" panose="020B0609040504020204" pitchFamily="49" charset="0"/>
+              </a:rPr>
+              <a:t>d.deptno</a:t>
+            </a:r>
+            <a:endParaRPr lang="en-US" sz="1800" dirty="0">
+              <a:latin typeface="Lucida Console" panose="020B0609040504020204" pitchFamily="49" charset="0"/>
+            </a:endParaRPr>
+          </a:p>
+          <a:p>
+            <a:r>
+              <a:rPr lang="en-US" sz="1800" dirty="0">
+                <a:latin typeface="Lucida Console" panose="020B0609040504020204" pitchFamily="49" charset="0"/>
+              </a:rPr>
+              <a:t>,      </a:t>
+            </a:r>
+            <a:r>
+              <a:rPr lang="en-US" sz="1800" dirty="0" err="1">
+                <a:latin typeface="Lucida Console" panose="020B0609040504020204" pitchFamily="49" charset="0"/>
+              </a:rPr>
+              <a:t>d.dname</a:t>
+            </a:r>
+            <a:endParaRPr lang="en-US" sz="1800" dirty="0">
+              <a:latin typeface="Lucida Console" panose="020B0609040504020204" pitchFamily="49" charset="0"/>
+            </a:endParaRPr>
+          </a:p>
+          <a:p>
+            <a:r>
+              <a:rPr lang="en-US" sz="1800" dirty="0">
+                <a:latin typeface="Lucida Console" panose="020B0609040504020204" pitchFamily="49" charset="0"/>
+              </a:rPr>
+              <a:t>,      </a:t>
+            </a:r>
+            <a:r>
+              <a:rPr lang="en-US" sz="1800" dirty="0" err="1">
+                <a:latin typeface="Lucida Console" panose="020B0609040504020204" pitchFamily="49" charset="0"/>
+              </a:rPr>
+              <a:t>d.loc</a:t>
+            </a:r>
+            <a:endParaRPr lang="en-US" sz="1800" dirty="0">
+              <a:latin typeface="Lucida Console" panose="020B0609040504020204" pitchFamily="49" charset="0"/>
+            </a:endParaRPr>
+          </a:p>
+          <a:p>
+            <a:r>
+              <a:rPr lang="en-US" sz="1800" dirty="0">
+                <a:latin typeface="Lucida Console" panose="020B0609040504020204" pitchFamily="49" charset="0"/>
+              </a:rPr>
+              <a:t>,      staff.*</a:t>
+            </a:r>
+          </a:p>
+          <a:p>
+            <a:r>
+              <a:rPr lang="en-US" sz="1800" dirty="0">
+                <a:latin typeface="Lucida Console" panose="020B0609040504020204" pitchFamily="49" charset="0"/>
+              </a:rPr>
+              <a:t>from   departments d</a:t>
+            </a:r>
+          </a:p>
+          <a:p>
+            <a:r>
+              <a:rPr lang="en-US" sz="1800" dirty="0">
+                <a:latin typeface="Lucida Console" panose="020B0609040504020204" pitchFamily="49" charset="0"/>
+              </a:rPr>
+              <a:t>,      table(</a:t>
+            </a:r>
+            <a:r>
+              <a:rPr lang="en-US" sz="1800" dirty="0" err="1">
+                <a:latin typeface="Lucida Console" panose="020B0609040504020204" pitchFamily="49" charset="0"/>
+              </a:rPr>
+              <a:t>d.staff</a:t>
+            </a:r>
+            <a:r>
+              <a:rPr lang="en-US" sz="1800" dirty="0">
+                <a:latin typeface="Lucida Console" panose="020B0609040504020204" pitchFamily="49" charset="0"/>
+              </a:rPr>
+              <a:t>) staff</a:t>
+            </a:r>
+          </a:p>
+          <a:p>
+            <a:r>
+              <a:rPr lang="en-US" sz="1800" dirty="0">
+                <a:latin typeface="Lucida Console" panose="020B0609040504020204" pitchFamily="49" charset="0"/>
+              </a:rPr>
+              <a:t>where  </a:t>
+            </a:r>
+            <a:r>
+              <a:rPr lang="en-US" sz="1800" dirty="0" err="1">
+                <a:latin typeface="Lucida Console" panose="020B0609040504020204" pitchFamily="49" charset="0"/>
+              </a:rPr>
+              <a:t>staff.ename</a:t>
+            </a:r>
+            <a:r>
+              <a:rPr lang="en-US" sz="1800" dirty="0">
+                <a:latin typeface="Lucida Console" panose="020B0609040504020204" pitchFamily="49" charset="0"/>
+              </a:rPr>
+              <a:t> = 'KING'</a:t>
             </a:r>
             <a:endParaRPr lang="en-US" sz="1800" dirty="0">
               <a:latin typeface="Lucida Console" panose="020B0609040504020204" pitchFamily="49" charset="0"/>
@@ -32180,7 +32702,7 @@
         <p:spPr>
           <a:xfrm>
             <a:off x="8798166" y="1727200"/>
-            <a:ext cx="7800734" cy="646331"/>
+            <a:ext cx="7800734" cy="1200329"/>
           </a:xfrm>
           <a:prstGeom prst="rect">
             <a:avLst/>
@@ -32194,90 +32716,67 @@
           <a:lstStyle/>
           <a:p>
             <a:r>
-              <a:rPr lang="nl-NL" sz="1800" dirty="0" smtClean="0">
-                <a:latin typeface="Lucida Console" panose="020B0609040504020204" pitchFamily="49" charset="0"/>
-              </a:rPr>
-              <a:t>-- </a:t>
-            </a:r>
-            <a:r>
-              <a:rPr lang="nl-NL" sz="1800" dirty="0" err="1" smtClean="0">
-                <a:latin typeface="Lucida Console" panose="020B0609040504020204" pitchFamily="49" charset="0"/>
-              </a:rPr>
-              <a:t>create</a:t>
-            </a:r>
-            <a:r>
-              <a:rPr lang="nl-NL" sz="1800" dirty="0" smtClean="0">
-                <a:latin typeface="Lucida Console" panose="020B0609040504020204" pitchFamily="49" charset="0"/>
-              </a:rPr>
-              <a:t> </a:t>
-            </a:r>
-            <a:r>
-              <a:rPr lang="nl-NL" sz="1800" dirty="0" err="1" smtClean="0">
-                <a:latin typeface="Lucida Console" panose="020B0609040504020204" pitchFamily="49" charset="0"/>
-              </a:rPr>
-              <a:t>materialized</a:t>
-            </a:r>
-            <a:r>
-              <a:rPr lang="nl-NL" sz="1800" dirty="0" smtClean="0">
-                <a:latin typeface="Lucida Console" panose="020B0609040504020204" pitchFamily="49" charset="0"/>
-              </a:rPr>
-              <a:t> view</a:t>
-            </a:r>
-          </a:p>
-          <a:p>
-            <a:r>
-              <a:rPr lang="nl-NL" sz="1800" dirty="0" smtClean="0">
-                <a:latin typeface="Lucida Console" panose="020B0609040504020204" pitchFamily="49" charset="0"/>
-              </a:rPr>
-              <a:t>-- </a:t>
-            </a:r>
-            <a:r>
-              <a:rPr lang="nl-NL" sz="1800" dirty="0" err="1" smtClean="0">
-                <a:latin typeface="Lucida Console" panose="020B0609040504020204" pitchFamily="49" charset="0"/>
-              </a:rPr>
-              <a:t>with</a:t>
-            </a:r>
-            <a:r>
-              <a:rPr lang="nl-NL" sz="1800" dirty="0" smtClean="0">
-                <a:latin typeface="Lucida Console" panose="020B0609040504020204" pitchFamily="49" charset="0"/>
-              </a:rPr>
-              <a:t> </a:t>
-            </a:r>
-            <a:r>
-              <a:rPr lang="nl-NL" sz="1800" dirty="0" err="1" smtClean="0">
-                <a:latin typeface="Lucida Console" panose="020B0609040504020204" pitchFamily="49" charset="0"/>
-              </a:rPr>
-              <a:t>nested</a:t>
-            </a:r>
-            <a:r>
-              <a:rPr lang="nl-NL" sz="1800" dirty="0" smtClean="0">
-                <a:latin typeface="Lucida Console" panose="020B0609040504020204" pitchFamily="49" charset="0"/>
-              </a:rPr>
-              <a:t> cursor? </a:t>
-            </a:r>
-            <a:r>
-              <a:rPr lang="nl-NL" sz="1800" dirty="0" err="1" smtClean="0">
-                <a:latin typeface="Lucida Console" panose="020B0609040504020204" pitchFamily="49" charset="0"/>
-              </a:rPr>
-              <a:t>Nested</a:t>
-            </a:r>
-            <a:r>
-              <a:rPr lang="nl-NL" sz="1800" dirty="0" smtClean="0">
-                <a:latin typeface="Lucida Console" panose="020B0609040504020204" pitchFamily="49" charset="0"/>
-              </a:rPr>
-              <a:t> </a:t>
-            </a:r>
-            <a:r>
-              <a:rPr lang="nl-NL" sz="1800" dirty="0" err="1" smtClean="0">
-                <a:latin typeface="Lucida Console" panose="020B0609040504020204" pitchFamily="49" charset="0"/>
-              </a:rPr>
-              <a:t>table</a:t>
-            </a:r>
-            <a:r>
-              <a:rPr lang="nl-NL" sz="1800" dirty="0" smtClean="0">
-                <a:latin typeface="Lucida Console" panose="020B0609040504020204" pitchFamily="49" charset="0"/>
-              </a:rPr>
-              <a:t>?</a:t>
+              <a:rPr lang="en-US" sz="1800" dirty="0">
+                <a:latin typeface="Lucida Console" panose="020B0609040504020204" pitchFamily="49" charset="0"/>
+              </a:rPr>
+              <a:t>select </a:t>
+            </a:r>
+            <a:r>
+              <a:rPr lang="en-US" sz="1800" dirty="0" err="1">
+                <a:latin typeface="Lucida Console" panose="020B0609040504020204" pitchFamily="49" charset="0"/>
+              </a:rPr>
+              <a:t>staff.ename</a:t>
+            </a:r>
+            <a:endParaRPr lang="en-US" sz="1800" dirty="0">
+              <a:latin typeface="Lucida Console" panose="020B0609040504020204" pitchFamily="49" charset="0"/>
+            </a:endParaRPr>
+          </a:p>
+          <a:p>
+            <a:r>
+              <a:rPr lang="en-US" sz="1800" dirty="0">
+                <a:latin typeface="Lucida Console" panose="020B0609040504020204" pitchFamily="49" charset="0"/>
+              </a:rPr>
+              <a:t>from   departments d</a:t>
+            </a:r>
+          </a:p>
+          <a:p>
+            <a:r>
+              <a:rPr lang="en-US" sz="1800" dirty="0">
+                <a:latin typeface="Lucida Console" panose="020B0609040504020204" pitchFamily="49" charset="0"/>
+              </a:rPr>
+              <a:t>,      table(</a:t>
+            </a:r>
+            <a:r>
+              <a:rPr lang="en-US" sz="1800" dirty="0" err="1">
+                <a:latin typeface="Lucida Console" panose="020B0609040504020204" pitchFamily="49" charset="0"/>
+              </a:rPr>
+              <a:t>d.staff</a:t>
+            </a:r>
+            <a:r>
+              <a:rPr lang="en-US" sz="1800" dirty="0">
+                <a:latin typeface="Lucida Console" panose="020B0609040504020204" pitchFamily="49" charset="0"/>
+              </a:rPr>
+              <a:t>) staff</a:t>
+            </a:r>
+          </a:p>
+          <a:p>
+            <a:r>
+              <a:rPr lang="en-US" sz="1800" dirty="0">
+                <a:latin typeface="Lucida Console" panose="020B0609040504020204" pitchFamily="49" charset="0"/>
+              </a:rPr>
+              <a:t>where  </a:t>
+            </a:r>
+            <a:r>
+              <a:rPr lang="en-US" sz="1800" dirty="0" err="1">
+                <a:latin typeface="Lucida Console" panose="020B0609040504020204" pitchFamily="49" charset="0"/>
+              </a:rPr>
+              <a:t>staff.job</a:t>
+            </a:r>
+            <a:r>
+              <a:rPr lang="en-US" sz="1800" dirty="0">
+                <a:latin typeface="Lucida Console" panose="020B0609040504020204" pitchFamily="49" charset="0"/>
+              </a:rPr>
+              <a:t> = 'MANAGER'</a:t>
             </a:r>
             <a:endParaRPr lang="en-US" sz="1800" dirty="0">
               <a:latin typeface="Lucida Console" panose="020B0609040504020204" pitchFamily="49" charset="0"/>
@@ -32618,7 +33117,7 @@
         <p:spPr>
           <a:xfrm>
             <a:off x="8798166" y="1727200"/>
-            <a:ext cx="7800734" cy="646331"/>
+            <a:ext cx="7800734" cy="2308324"/>
           </a:xfrm>
           <a:prstGeom prst="rect">
             <a:avLst/>
@@ -32632,90 +33131,123 @@
           <a:lstStyle/>
           <a:p>
             <a:r>
-              <a:rPr lang="nl-NL" sz="1800" dirty="0" smtClean="0">
-                <a:latin typeface="Lucida Console" panose="020B0609040504020204" pitchFamily="49" charset="0"/>
-              </a:rPr>
-              <a:t>-- </a:t>
-            </a:r>
-            <a:r>
-              <a:rPr lang="nl-NL" sz="1800" dirty="0" err="1" smtClean="0">
-                <a:latin typeface="Lucida Console" panose="020B0609040504020204" pitchFamily="49" charset="0"/>
-              </a:rPr>
-              <a:t>create</a:t>
-            </a:r>
-            <a:r>
-              <a:rPr lang="nl-NL" sz="1800" dirty="0" smtClean="0">
-                <a:latin typeface="Lucida Console" panose="020B0609040504020204" pitchFamily="49" charset="0"/>
-              </a:rPr>
-              <a:t> </a:t>
-            </a:r>
-            <a:r>
-              <a:rPr lang="nl-NL" sz="1800" dirty="0" err="1" smtClean="0">
-                <a:latin typeface="Lucida Console" panose="020B0609040504020204" pitchFamily="49" charset="0"/>
-              </a:rPr>
-              <a:t>materialized</a:t>
-            </a:r>
-            <a:r>
-              <a:rPr lang="nl-NL" sz="1800" dirty="0" smtClean="0">
-                <a:latin typeface="Lucida Console" panose="020B0609040504020204" pitchFamily="49" charset="0"/>
-              </a:rPr>
-              <a:t> view</a:t>
-            </a:r>
-          </a:p>
-          <a:p>
-            <a:r>
-              <a:rPr lang="nl-NL" sz="1800" dirty="0" smtClean="0">
-                <a:latin typeface="Lucida Console" panose="020B0609040504020204" pitchFamily="49" charset="0"/>
-              </a:rPr>
-              <a:t>-- </a:t>
-            </a:r>
-            <a:r>
-              <a:rPr lang="nl-NL" sz="1800" dirty="0" err="1" smtClean="0">
-                <a:latin typeface="Lucida Console" panose="020B0609040504020204" pitchFamily="49" charset="0"/>
-              </a:rPr>
-              <a:t>with</a:t>
-            </a:r>
-            <a:r>
-              <a:rPr lang="nl-NL" sz="1800" dirty="0" smtClean="0">
-                <a:latin typeface="Lucida Console" panose="020B0609040504020204" pitchFamily="49" charset="0"/>
-              </a:rPr>
-              <a:t> </a:t>
-            </a:r>
-            <a:r>
-              <a:rPr lang="nl-NL" sz="1800" dirty="0" err="1" smtClean="0">
-                <a:latin typeface="Lucida Console" panose="020B0609040504020204" pitchFamily="49" charset="0"/>
-              </a:rPr>
-              <a:t>nested</a:t>
-            </a:r>
-            <a:r>
-              <a:rPr lang="nl-NL" sz="1800" dirty="0" smtClean="0">
-                <a:latin typeface="Lucida Console" panose="020B0609040504020204" pitchFamily="49" charset="0"/>
-              </a:rPr>
-              <a:t> cursor? </a:t>
-            </a:r>
-            <a:r>
-              <a:rPr lang="nl-NL" sz="1800" dirty="0" err="1" smtClean="0">
-                <a:latin typeface="Lucida Console" panose="020B0609040504020204" pitchFamily="49" charset="0"/>
-              </a:rPr>
-              <a:t>Nested</a:t>
-            </a:r>
-            <a:r>
-              <a:rPr lang="nl-NL" sz="1800" dirty="0" smtClean="0">
-                <a:latin typeface="Lucida Console" panose="020B0609040504020204" pitchFamily="49" charset="0"/>
-              </a:rPr>
-              <a:t> </a:t>
-            </a:r>
-            <a:r>
-              <a:rPr lang="nl-NL" sz="1800" dirty="0" err="1" smtClean="0">
-                <a:latin typeface="Lucida Console" panose="020B0609040504020204" pitchFamily="49" charset="0"/>
-              </a:rPr>
-              <a:t>table</a:t>
-            </a:r>
-            <a:r>
-              <a:rPr lang="nl-NL" sz="1800" dirty="0" smtClean="0">
-                <a:latin typeface="Lucida Console" panose="020B0609040504020204" pitchFamily="49" charset="0"/>
-              </a:rPr>
-              <a:t>?</a:t>
+              <a:rPr lang="en-US" sz="1800" dirty="0">
+                <a:latin typeface="Lucida Console" panose="020B0609040504020204" pitchFamily="49" charset="0"/>
+              </a:rPr>
+              <a:t>select </a:t>
+            </a:r>
+            <a:r>
+              <a:rPr lang="en-US" sz="1800" dirty="0" err="1">
+                <a:latin typeface="Lucida Console" panose="020B0609040504020204" pitchFamily="49" charset="0"/>
+              </a:rPr>
+              <a:t>staff.ename</a:t>
+            </a:r>
+            <a:endParaRPr lang="en-US" sz="1800" dirty="0">
+              <a:latin typeface="Lucida Console" panose="020B0609040504020204" pitchFamily="49" charset="0"/>
+            </a:endParaRPr>
+          </a:p>
+          <a:p>
+            <a:r>
+              <a:rPr lang="en-US" sz="1800" dirty="0">
+                <a:latin typeface="Lucida Console" panose="020B0609040504020204" pitchFamily="49" charset="0"/>
+              </a:rPr>
+              <a:t>,      </a:t>
+            </a:r>
+            <a:r>
+              <a:rPr lang="en-US" sz="1800" dirty="0" err="1">
+                <a:latin typeface="Lucida Console" panose="020B0609040504020204" pitchFamily="49" charset="0"/>
+              </a:rPr>
+              <a:t>staff.sal</a:t>
+            </a:r>
+            <a:endParaRPr lang="en-US" sz="1800" dirty="0">
+              <a:latin typeface="Lucida Console" panose="020B0609040504020204" pitchFamily="49" charset="0"/>
+            </a:endParaRPr>
+          </a:p>
+          <a:p>
+            <a:r>
+              <a:rPr lang="en-US" sz="1800" dirty="0">
+                <a:latin typeface="Lucida Console" panose="020B0609040504020204" pitchFamily="49" charset="0"/>
+              </a:rPr>
+              <a:t>,      </a:t>
+            </a:r>
+            <a:r>
+              <a:rPr lang="en-US" sz="1800" dirty="0" err="1">
+                <a:latin typeface="Lucida Console" panose="020B0609040504020204" pitchFamily="49" charset="0"/>
+              </a:rPr>
+              <a:t>d.deptno</a:t>
+            </a:r>
+            <a:endParaRPr lang="en-US" sz="1800" dirty="0">
+              <a:latin typeface="Lucida Console" panose="020B0609040504020204" pitchFamily="49" charset="0"/>
+            </a:endParaRPr>
+          </a:p>
+          <a:p>
+            <a:r>
+              <a:rPr lang="en-US" sz="1800" dirty="0">
+                <a:latin typeface="Lucida Console" panose="020B0609040504020204" pitchFamily="49" charset="0"/>
+              </a:rPr>
+              <a:t>from   departments d</a:t>
+            </a:r>
+          </a:p>
+          <a:p>
+            <a:r>
+              <a:rPr lang="en-US" sz="1800" dirty="0">
+                <a:latin typeface="Lucida Console" panose="020B0609040504020204" pitchFamily="49" charset="0"/>
+              </a:rPr>
+              <a:t>,      table(</a:t>
+            </a:r>
+            <a:r>
+              <a:rPr lang="en-US" sz="1800" dirty="0" err="1">
+                <a:latin typeface="Lucida Console" panose="020B0609040504020204" pitchFamily="49" charset="0"/>
+              </a:rPr>
+              <a:t>d.staff</a:t>
+            </a:r>
+            <a:r>
+              <a:rPr lang="en-US" sz="1800" dirty="0">
+                <a:latin typeface="Lucida Console" panose="020B0609040504020204" pitchFamily="49" charset="0"/>
+              </a:rPr>
+              <a:t>) staff</a:t>
+            </a:r>
+          </a:p>
+          <a:p>
+            <a:r>
+              <a:rPr lang="en-US" sz="1800" dirty="0">
+                <a:latin typeface="Lucida Console" panose="020B0609040504020204" pitchFamily="49" charset="0"/>
+              </a:rPr>
+              <a:t>where  </a:t>
+            </a:r>
+            <a:r>
+              <a:rPr lang="en-US" sz="1800" dirty="0" err="1">
+                <a:latin typeface="Lucida Console" panose="020B0609040504020204" pitchFamily="49" charset="0"/>
+              </a:rPr>
+              <a:t>d.deptno</a:t>
+            </a:r>
+            <a:r>
+              <a:rPr lang="en-US" sz="1800" dirty="0">
+                <a:latin typeface="Lucida Console" panose="020B0609040504020204" pitchFamily="49" charset="0"/>
+              </a:rPr>
+              <a:t> != 10</a:t>
+            </a:r>
+          </a:p>
+          <a:p>
+            <a:r>
+              <a:rPr lang="en-US" sz="1800" dirty="0">
+                <a:latin typeface="Lucida Console" panose="020B0609040504020204" pitchFamily="49" charset="0"/>
+              </a:rPr>
+              <a:t>order</a:t>
+            </a:r>
+          </a:p>
+          <a:p>
+            <a:r>
+              <a:rPr lang="en-US" sz="1800" dirty="0">
+                <a:latin typeface="Lucida Console" panose="020B0609040504020204" pitchFamily="49" charset="0"/>
+              </a:rPr>
+              <a:t>by     </a:t>
+            </a:r>
+            <a:r>
+              <a:rPr lang="en-US" sz="1800" dirty="0" err="1">
+                <a:latin typeface="Lucida Console" panose="020B0609040504020204" pitchFamily="49" charset="0"/>
+              </a:rPr>
+              <a:t>staff.ename</a:t>
             </a:r>
             <a:endParaRPr lang="en-US" sz="1800" dirty="0">
               <a:latin typeface="Lucida Console" panose="020B0609040504020204" pitchFamily="49" charset="0"/>
@@ -33128,7 +33660,7 @@
         <p:spPr>
           <a:xfrm>
             <a:off x="8798166" y="1727200"/>
-            <a:ext cx="7800734" cy="646331"/>
+            <a:ext cx="7800734" cy="2585323"/>
           </a:xfrm>
           <a:prstGeom prst="rect">
             <a:avLst/>
@@ -33142,90 +33674,257 @@
           <a:lstStyle/>
           <a:p>
             <a:r>
-              <a:rPr lang="nl-NL" sz="1800" dirty="0" smtClean="0">
-                <a:latin typeface="Lucida Console" panose="020B0609040504020204" pitchFamily="49" charset="0"/>
-              </a:rPr>
-              <a:t>-- </a:t>
-            </a:r>
-            <a:r>
-              <a:rPr lang="nl-NL" sz="1800" dirty="0" err="1" smtClean="0">
-                <a:latin typeface="Lucida Console" panose="020B0609040504020204" pitchFamily="49" charset="0"/>
-              </a:rPr>
-              <a:t>create</a:t>
-            </a:r>
-            <a:r>
-              <a:rPr lang="nl-NL" sz="1800" dirty="0" smtClean="0">
-                <a:latin typeface="Lucida Console" panose="020B0609040504020204" pitchFamily="49" charset="0"/>
-              </a:rPr>
-              <a:t> </a:t>
-            </a:r>
-            <a:r>
-              <a:rPr lang="nl-NL" sz="1800" dirty="0" err="1" smtClean="0">
-                <a:latin typeface="Lucida Console" panose="020B0609040504020204" pitchFamily="49" charset="0"/>
-              </a:rPr>
-              <a:t>materialized</a:t>
-            </a:r>
-            <a:r>
-              <a:rPr lang="nl-NL" sz="1800" dirty="0" smtClean="0">
-                <a:latin typeface="Lucida Console" panose="020B0609040504020204" pitchFamily="49" charset="0"/>
-              </a:rPr>
-              <a:t> view</a:t>
-            </a:r>
-          </a:p>
-          <a:p>
-            <a:r>
-              <a:rPr lang="nl-NL" sz="1800" dirty="0" smtClean="0">
-                <a:latin typeface="Lucida Console" panose="020B0609040504020204" pitchFamily="49" charset="0"/>
-              </a:rPr>
-              <a:t>-- </a:t>
-            </a:r>
-            <a:r>
-              <a:rPr lang="nl-NL" sz="1800" dirty="0" err="1" smtClean="0">
-                <a:latin typeface="Lucida Console" panose="020B0609040504020204" pitchFamily="49" charset="0"/>
-              </a:rPr>
-              <a:t>with</a:t>
-            </a:r>
-            <a:r>
-              <a:rPr lang="nl-NL" sz="1800" dirty="0" smtClean="0">
-                <a:latin typeface="Lucida Console" panose="020B0609040504020204" pitchFamily="49" charset="0"/>
-              </a:rPr>
-              <a:t> </a:t>
-            </a:r>
-            <a:r>
-              <a:rPr lang="nl-NL" sz="1800" dirty="0" err="1" smtClean="0">
-                <a:latin typeface="Lucida Console" panose="020B0609040504020204" pitchFamily="49" charset="0"/>
-              </a:rPr>
-              <a:t>nested</a:t>
-            </a:r>
-            <a:r>
-              <a:rPr lang="nl-NL" sz="1800" dirty="0" smtClean="0">
-                <a:latin typeface="Lucida Console" panose="020B0609040504020204" pitchFamily="49" charset="0"/>
-              </a:rPr>
-              <a:t> cursor? </a:t>
-            </a:r>
-            <a:r>
-              <a:rPr lang="nl-NL" sz="1800" dirty="0" err="1" smtClean="0">
-                <a:latin typeface="Lucida Console" panose="020B0609040504020204" pitchFamily="49" charset="0"/>
-              </a:rPr>
-              <a:t>Nested</a:t>
-            </a:r>
-            <a:r>
-              <a:rPr lang="nl-NL" sz="1800" dirty="0" smtClean="0">
-                <a:latin typeface="Lucida Console" panose="020B0609040504020204" pitchFamily="49" charset="0"/>
-              </a:rPr>
-              <a:t> </a:t>
-            </a:r>
-            <a:r>
-              <a:rPr lang="nl-NL" sz="1800" dirty="0" err="1" smtClean="0">
+              <a:rPr lang="nl-NL" sz="1800" dirty="0">
+                <a:latin typeface="Lucida Console" panose="020B0609040504020204" pitchFamily="49" charset="0"/>
+              </a:rPr>
+              <a:t>select </a:t>
+            </a:r>
+            <a:r>
+              <a:rPr lang="nl-NL" sz="1800" dirty="0" err="1">
+                <a:latin typeface="Lucida Console" panose="020B0609040504020204" pitchFamily="49" charset="0"/>
+              </a:rPr>
+              <a:t>d.deptno</a:t>
+            </a:r>
+            <a:endParaRPr lang="nl-NL" sz="1800" dirty="0">
+              <a:latin typeface="Lucida Console" panose="020B0609040504020204" pitchFamily="49" charset="0"/>
+            </a:endParaRPr>
+          </a:p>
+          <a:p>
+            <a:r>
+              <a:rPr lang="nl-NL" sz="1800" dirty="0">
+                <a:latin typeface="Lucida Console" panose="020B0609040504020204" pitchFamily="49" charset="0"/>
+              </a:rPr>
+              <a:t>,      </a:t>
+            </a:r>
+            <a:r>
+              <a:rPr lang="nl-NL" sz="1800" dirty="0" err="1">
+                <a:latin typeface="Lucida Console" panose="020B0609040504020204" pitchFamily="49" charset="0"/>
+              </a:rPr>
+              <a:t>sum</a:t>
+            </a:r>
+            <a:r>
+              <a:rPr lang="nl-NL" sz="1800" dirty="0">
+                <a:latin typeface="Lucida Console" panose="020B0609040504020204" pitchFamily="49" charset="0"/>
+              </a:rPr>
+              <a:t>(</a:t>
+            </a:r>
+            <a:r>
+              <a:rPr lang="nl-NL" sz="1800" dirty="0" err="1">
+                <a:latin typeface="Lucida Console" panose="020B0609040504020204" pitchFamily="49" charset="0"/>
+              </a:rPr>
+              <a:t>staff.sal</a:t>
+            </a:r>
+            <a:r>
+              <a:rPr lang="nl-NL" sz="1800" dirty="0">
+                <a:latin typeface="Lucida Console" panose="020B0609040504020204" pitchFamily="49" charset="0"/>
+              </a:rPr>
+              <a:t>) </a:t>
+            </a:r>
+            <a:r>
+              <a:rPr lang="nl-NL" sz="1800" dirty="0" err="1">
+                <a:latin typeface="Lucida Console" panose="020B0609040504020204" pitchFamily="49" charset="0"/>
+              </a:rPr>
+              <a:t>total_salary_sum</a:t>
+            </a:r>
+            <a:endParaRPr lang="nl-NL" sz="1800" dirty="0">
+              <a:latin typeface="Lucida Console" panose="020B0609040504020204" pitchFamily="49" charset="0"/>
+            </a:endParaRPr>
+          </a:p>
+          <a:p>
+            <a:r>
+              <a:rPr lang="nl-NL" sz="1800" dirty="0">
+                <a:latin typeface="Lucida Console" panose="020B0609040504020204" pitchFamily="49" charset="0"/>
+              </a:rPr>
+              <a:t>,      </a:t>
+            </a:r>
+            <a:r>
+              <a:rPr lang="nl-NL" sz="1800" dirty="0" err="1">
+                <a:latin typeface="Lucida Console" panose="020B0609040504020204" pitchFamily="49" charset="0"/>
+              </a:rPr>
+              <a:t>count</a:t>
+            </a:r>
+            <a:r>
+              <a:rPr lang="nl-NL" sz="1800" dirty="0">
+                <a:latin typeface="Lucida Console" panose="020B0609040504020204" pitchFamily="49" charset="0"/>
+              </a:rPr>
+              <a:t>(</a:t>
+            </a:r>
+            <a:r>
+              <a:rPr lang="nl-NL" sz="1800" dirty="0" err="1">
+                <a:latin typeface="Lucida Console" panose="020B0609040504020204" pitchFamily="49" charset="0"/>
+              </a:rPr>
+              <a:t>staff.empno</a:t>
+            </a:r>
+            <a:r>
+              <a:rPr lang="nl-NL" sz="1800" dirty="0">
+                <a:latin typeface="Lucida Console" panose="020B0609040504020204" pitchFamily="49" charset="0"/>
+              </a:rPr>
+              <a:t>) </a:t>
+            </a:r>
+            <a:r>
+              <a:rPr lang="nl-NL" sz="1800" dirty="0" err="1">
+                <a:latin typeface="Lucida Console" panose="020B0609040504020204" pitchFamily="49" charset="0"/>
+              </a:rPr>
+              <a:t>total_staff_count</a:t>
+            </a:r>
+            <a:endParaRPr lang="nl-NL" sz="1800" dirty="0">
+              <a:latin typeface="Lucida Console" panose="020B0609040504020204" pitchFamily="49" charset="0"/>
+            </a:endParaRPr>
+          </a:p>
+          <a:p>
+            <a:r>
+              <a:rPr lang="nl-NL" sz="1800" dirty="0">
+                <a:latin typeface="Lucida Console" panose="020B0609040504020204" pitchFamily="49" charset="0"/>
+              </a:rPr>
+              <a:t>,      max(</a:t>
+            </a:r>
+            <a:r>
+              <a:rPr lang="nl-NL" sz="1800" dirty="0" err="1">
+                <a:latin typeface="Lucida Console" panose="020B0609040504020204" pitchFamily="49" charset="0"/>
+              </a:rPr>
+              <a:t>staff.sal</a:t>
+            </a:r>
+            <a:r>
+              <a:rPr lang="nl-NL" sz="1800" dirty="0">
+                <a:latin typeface="Lucida Console" panose="020B0609040504020204" pitchFamily="49" charset="0"/>
+              </a:rPr>
+              <a:t>) </a:t>
+            </a:r>
+            <a:r>
+              <a:rPr lang="nl-NL" sz="1800" dirty="0" err="1">
+                <a:latin typeface="Lucida Console" panose="020B0609040504020204" pitchFamily="49" charset="0"/>
+              </a:rPr>
+              <a:t>max_sal</a:t>
+            </a:r>
+            <a:endParaRPr lang="nl-NL" sz="1800" dirty="0">
+              <a:latin typeface="Lucida Console" panose="020B0609040504020204" pitchFamily="49" charset="0"/>
+            </a:endParaRPr>
+          </a:p>
+          <a:p>
+            <a:r>
+              <a:rPr lang="nl-NL" sz="1800" dirty="0">
+                <a:latin typeface="Lucida Console" panose="020B0609040504020204" pitchFamily="49" charset="0"/>
+              </a:rPr>
+              <a:t>,      min(</a:t>
+            </a:r>
+            <a:r>
+              <a:rPr lang="nl-NL" sz="1800" dirty="0" err="1">
+                <a:latin typeface="Lucida Console" panose="020B0609040504020204" pitchFamily="49" charset="0"/>
+              </a:rPr>
+              <a:t>staff.startdate</a:t>
+            </a:r>
+            <a:r>
+              <a:rPr lang="nl-NL" sz="1800" dirty="0">
+                <a:latin typeface="Lucida Console" panose="020B0609040504020204" pitchFamily="49" charset="0"/>
+              </a:rPr>
+              <a:t>) </a:t>
+            </a:r>
+            <a:r>
+              <a:rPr lang="nl-NL" sz="1800" dirty="0" err="1">
+                <a:latin typeface="Lucida Console" panose="020B0609040504020204" pitchFamily="49" charset="0"/>
+              </a:rPr>
+              <a:t>min_startdate</a:t>
+            </a:r>
+            <a:endParaRPr lang="nl-NL" sz="1800" dirty="0">
+              <a:latin typeface="Lucida Console" panose="020B0609040504020204" pitchFamily="49" charset="0"/>
+            </a:endParaRPr>
+          </a:p>
+          <a:p>
+            <a:r>
+              <a:rPr lang="nl-NL" sz="1800" dirty="0" err="1">
+                <a:latin typeface="Lucida Console" panose="020B0609040504020204" pitchFamily="49" charset="0"/>
+              </a:rPr>
+              <a:t>from</a:t>
+            </a:r>
+            <a:r>
+              <a:rPr lang="nl-NL" sz="1800" dirty="0">
+                <a:latin typeface="Lucida Console" panose="020B0609040504020204" pitchFamily="49" charset="0"/>
+              </a:rPr>
+              <a:t>   </a:t>
+            </a:r>
+            <a:r>
+              <a:rPr lang="nl-NL" sz="1800" dirty="0" err="1">
+                <a:latin typeface="Lucida Console" panose="020B0609040504020204" pitchFamily="49" charset="0"/>
+              </a:rPr>
+              <a:t>departments</a:t>
+            </a:r>
+            <a:r>
+              <a:rPr lang="nl-NL" sz="1800" dirty="0">
+                <a:latin typeface="Lucida Console" panose="020B0609040504020204" pitchFamily="49" charset="0"/>
+              </a:rPr>
+              <a:t> d</a:t>
+            </a:r>
+          </a:p>
+          <a:p>
+            <a:r>
+              <a:rPr lang="nl-NL" sz="1800" dirty="0">
+                <a:latin typeface="Lucida Console" panose="020B0609040504020204" pitchFamily="49" charset="0"/>
+              </a:rPr>
+              <a:t>,      </a:t>
+            </a:r>
+            <a:r>
+              <a:rPr lang="nl-NL" sz="1800" dirty="0" err="1">
                 <a:latin typeface="Lucida Console" panose="020B0609040504020204" pitchFamily="49" charset="0"/>
               </a:rPr>
               <a:t>table</a:t>
             </a:r>
             <a:r>
-              <a:rPr lang="nl-NL" sz="1800" dirty="0" smtClean="0">
-                <a:latin typeface="Lucida Console" panose="020B0609040504020204" pitchFamily="49" charset="0"/>
-              </a:rPr>
-              <a:t>?</a:t>
+              <a:rPr lang="nl-NL" sz="1800" dirty="0">
+                <a:latin typeface="Lucida Console" panose="020B0609040504020204" pitchFamily="49" charset="0"/>
+              </a:rPr>
+              <a:t>(</a:t>
+            </a:r>
+            <a:r>
+              <a:rPr lang="nl-NL" sz="1800" dirty="0" err="1">
+                <a:latin typeface="Lucida Console" panose="020B0609040504020204" pitchFamily="49" charset="0"/>
+              </a:rPr>
+              <a:t>d.staff</a:t>
+            </a:r>
+            <a:r>
+              <a:rPr lang="nl-NL" sz="1800" dirty="0">
+                <a:latin typeface="Lucida Console" panose="020B0609040504020204" pitchFamily="49" charset="0"/>
+              </a:rPr>
+              <a:t>) </a:t>
+            </a:r>
+            <a:r>
+              <a:rPr lang="nl-NL" sz="1800" dirty="0" err="1">
+                <a:latin typeface="Lucida Console" panose="020B0609040504020204" pitchFamily="49" charset="0"/>
+              </a:rPr>
+              <a:t>staff</a:t>
+            </a:r>
+            <a:endParaRPr lang="nl-NL" sz="1800" dirty="0">
+              <a:latin typeface="Lucida Console" panose="020B0609040504020204" pitchFamily="49" charset="0"/>
+            </a:endParaRPr>
+          </a:p>
+          <a:p>
+            <a:r>
+              <a:rPr lang="nl-NL" sz="1800" dirty="0" err="1">
+                <a:latin typeface="Lucida Console" panose="020B0609040504020204" pitchFamily="49" charset="0"/>
+              </a:rPr>
+              <a:t>group</a:t>
+            </a:r>
+            <a:endParaRPr lang="nl-NL" sz="1800" dirty="0">
+              <a:latin typeface="Lucida Console" panose="020B0609040504020204" pitchFamily="49" charset="0"/>
+            </a:endParaRPr>
+          </a:p>
+          <a:p>
+            <a:r>
+              <a:rPr lang="nl-NL" sz="1800" dirty="0" err="1">
+                <a:latin typeface="Lucida Console" panose="020B0609040504020204" pitchFamily="49" charset="0"/>
+              </a:rPr>
+              <a:t>by</a:t>
+            </a:r>
+            <a:r>
+              <a:rPr lang="nl-NL" sz="1800" dirty="0">
+                <a:latin typeface="Lucida Console" panose="020B0609040504020204" pitchFamily="49" charset="0"/>
+              </a:rPr>
+              <a:t>     </a:t>
+            </a:r>
+            <a:r>
+              <a:rPr lang="nl-NL" sz="1800">
+                <a:latin typeface="Lucida Console" panose="020B0609040504020204" pitchFamily="49" charset="0"/>
+              </a:rPr>
+              <a:t>d.deptno</a:t>
             </a:r>
             <a:endParaRPr lang="en-US" sz="1800" dirty="0">
               <a:latin typeface="Lucida Console" panose="020B0609040504020204" pitchFamily="49" charset="0"/>
@@ -36456,7 +37155,7 @@
         <p:spPr>
           <a:xfrm>
             <a:off x="8798166" y="1727200"/>
-            <a:ext cx="7800734" cy="5355312"/>
+            <a:ext cx="7800734" cy="8125301"/>
           </a:xfrm>
           <a:prstGeom prst="rect">
             <a:avLst/>
@@ -36742,11 +37441,279 @@
               </a:rPr>
               <a:t>)</a:t>
             </a:r>
+          </a:p>
+          <a:p>
+            <a:r>
+              <a:rPr lang="en-US" sz="1800" dirty="0">
+                <a:latin typeface="Lucida Console" panose="020B0609040504020204" pitchFamily="49" charset="0"/>
+              </a:rPr>
+              <a:t>-- to support stemming </a:t>
+            </a:r>
+          </a:p>
+          <a:p>
+            <a:r>
+              <a:rPr lang="en-US" sz="1800" dirty="0" smtClean="0">
+                <a:latin typeface="Lucida Console" panose="020B0609040504020204" pitchFamily="49" charset="0"/>
+              </a:rPr>
+              <a:t>exec </a:t>
+            </a:r>
+            <a:r>
+              <a:rPr lang="en-US" sz="1800" dirty="0" err="1" smtClean="0">
+                <a:latin typeface="Lucida Console" panose="020B0609040504020204" pitchFamily="49" charset="0"/>
+              </a:rPr>
+              <a:t>ctxsys.ctx_ddl.create_preference</a:t>
+            </a:r>
+            <a:r>
+              <a:rPr lang="en-US" sz="1800" dirty="0" smtClean="0">
+                <a:latin typeface="Lucida Console" panose="020B0609040504020204" pitchFamily="49" charset="0"/>
+              </a:rPr>
+              <a:t/>
+            </a:r>
             <a:br>
               <a:rPr lang="en-US" sz="1800" dirty="0" smtClean="0">
                 <a:latin typeface="Lucida Console" panose="020B0609040504020204" pitchFamily="49" charset="0"/>
               </a:rPr>
             </a:br>
+            <a:r>
+              <a:rPr lang="en-US" sz="1800" dirty="0" smtClean="0">
+                <a:latin typeface="Lucida Console" panose="020B0609040504020204" pitchFamily="49" charset="0"/>
+              </a:rPr>
+              <a:t>     (</a:t>
+            </a:r>
+            <a:r>
+              <a:rPr lang="en-US" sz="1800" dirty="0">
+                <a:latin typeface="Lucida Console" panose="020B0609040504020204" pitchFamily="49" charset="0"/>
+              </a:rPr>
+              <a:t>'my_</a:t>
+            </a:r>
+            <a:r>
+              <a:rPr lang="en-US" sz="1800" dirty="0" err="1">
+                <a:latin typeface="Lucida Console" panose="020B0609040504020204" pitchFamily="49" charset="0"/>
+              </a:rPr>
+              <a:t>lexer</a:t>
+            </a:r>
+            <a:r>
+              <a:rPr lang="en-US" sz="1800" dirty="0">
+                <a:latin typeface="Lucida Console" panose="020B0609040504020204" pitchFamily="49" charset="0"/>
+              </a:rPr>
+              <a:t>','BASIC_LEXER');</a:t>
+            </a:r>
+          </a:p>
+          <a:p>
+            <a:r>
+              <a:rPr lang="en-US" sz="1800" dirty="0" smtClean="0">
+                <a:latin typeface="Lucida Console" panose="020B0609040504020204" pitchFamily="49" charset="0"/>
+              </a:rPr>
+              <a:t>exec </a:t>
+            </a:r>
+            <a:r>
+              <a:rPr lang="en-US" sz="1800" dirty="0" err="1" smtClean="0">
+                <a:latin typeface="Lucida Console" panose="020B0609040504020204" pitchFamily="49" charset="0"/>
+              </a:rPr>
+              <a:t>ctxsys.ctx_ddl.set_attribute</a:t>
+            </a:r>
+            <a:r>
+              <a:rPr lang="en-US" sz="1800" dirty="0" smtClean="0">
+                <a:latin typeface="Lucida Console" panose="020B0609040504020204" pitchFamily="49" charset="0"/>
+              </a:rPr>
+              <a:t/>
+            </a:r>
+            <a:br>
+              <a:rPr lang="en-US" sz="1800" dirty="0" smtClean="0">
+                <a:latin typeface="Lucida Console" panose="020B0609040504020204" pitchFamily="49" charset="0"/>
+              </a:rPr>
+            </a:br>
+            <a:r>
+              <a:rPr lang="en-US" sz="1800" dirty="0" smtClean="0">
+                <a:latin typeface="Lucida Console" panose="020B0609040504020204" pitchFamily="49" charset="0"/>
+              </a:rPr>
+              <a:t>     (</a:t>
+            </a:r>
+            <a:r>
+              <a:rPr lang="en-US" sz="1800" dirty="0">
+                <a:latin typeface="Lucida Console" panose="020B0609040504020204" pitchFamily="49" charset="0"/>
+              </a:rPr>
+              <a:t>'my_lexer','index_stems','1');</a:t>
+            </a:r>
+          </a:p>
+          <a:p>
+            <a:r>
+              <a:rPr lang="en-US" sz="1800" dirty="0" smtClean="0">
+                <a:latin typeface="Lucida Console" panose="020B0609040504020204" pitchFamily="49" charset="0"/>
+              </a:rPr>
+              <a:t>exec </a:t>
+            </a:r>
+            <a:r>
+              <a:rPr lang="en-US" sz="1800" dirty="0" err="1" smtClean="0">
+                <a:latin typeface="Lucida Console" panose="020B0609040504020204" pitchFamily="49" charset="0"/>
+              </a:rPr>
+              <a:t>ctxsys.ctx_ddl.create_preference</a:t>
+            </a:r>
+            <a:r>
+              <a:rPr lang="en-US" sz="1800" dirty="0" smtClean="0">
+                <a:latin typeface="Lucida Console" panose="020B0609040504020204" pitchFamily="49" charset="0"/>
+              </a:rPr>
+              <a:t/>
+            </a:r>
+            <a:br>
+              <a:rPr lang="en-US" sz="1800" dirty="0" smtClean="0">
+                <a:latin typeface="Lucida Console" panose="020B0609040504020204" pitchFamily="49" charset="0"/>
+              </a:rPr>
+            </a:br>
+            <a:r>
+              <a:rPr lang="en-US" sz="1800" dirty="0" smtClean="0">
+                <a:latin typeface="Lucida Console" panose="020B0609040504020204" pitchFamily="49" charset="0"/>
+              </a:rPr>
+              <a:t>     (</a:t>
+            </a:r>
+            <a:r>
+              <a:rPr lang="en-US" sz="1800" dirty="0">
+                <a:latin typeface="Lucida Console" panose="020B0609040504020204" pitchFamily="49" charset="0"/>
+              </a:rPr>
+              <a:t>'</a:t>
+            </a:r>
+            <a:r>
+              <a:rPr lang="en-US" sz="1800" dirty="0" err="1">
+                <a:latin typeface="Lucida Console" panose="020B0609040504020204" pitchFamily="49" charset="0"/>
+              </a:rPr>
+              <a:t>my_wordlist','BASIC_WORDLIST</a:t>
+            </a:r>
+            <a:r>
+              <a:rPr lang="en-US" sz="1800" dirty="0">
+                <a:latin typeface="Lucida Console" panose="020B0609040504020204" pitchFamily="49" charset="0"/>
+              </a:rPr>
+              <a:t>');</a:t>
+            </a:r>
+          </a:p>
+          <a:p>
+            <a:r>
+              <a:rPr lang="en-US" sz="1800" dirty="0" smtClean="0">
+                <a:latin typeface="Lucida Console" panose="020B0609040504020204" pitchFamily="49" charset="0"/>
+              </a:rPr>
+              <a:t>exec </a:t>
+            </a:r>
+            <a:r>
+              <a:rPr lang="en-US" sz="1800" dirty="0" err="1" smtClean="0">
+                <a:latin typeface="Lucida Console" panose="020B0609040504020204" pitchFamily="49" charset="0"/>
+              </a:rPr>
+              <a:t>ctxsys.ctx_ddl.set_attribute</a:t>
+            </a:r>
+            <a:r>
+              <a:rPr lang="en-US" sz="1800" dirty="0" smtClean="0">
+                <a:latin typeface="Lucida Console" panose="020B0609040504020204" pitchFamily="49" charset="0"/>
+              </a:rPr>
+              <a:t/>
+            </a:r>
+            <a:br>
+              <a:rPr lang="en-US" sz="1800" dirty="0" smtClean="0">
+                <a:latin typeface="Lucida Console" panose="020B0609040504020204" pitchFamily="49" charset="0"/>
+              </a:rPr>
+            </a:br>
+            <a:r>
+              <a:rPr lang="en-US" sz="1800" dirty="0" smtClean="0">
+                <a:latin typeface="Lucida Console" panose="020B0609040504020204" pitchFamily="49" charset="0"/>
+              </a:rPr>
+              <a:t>     (</a:t>
+            </a:r>
+            <a:r>
+              <a:rPr lang="en-US" sz="1800" dirty="0">
+                <a:latin typeface="Lucida Console" panose="020B0609040504020204" pitchFamily="49" charset="0"/>
+              </a:rPr>
+              <a:t>'</a:t>
+            </a:r>
+            <a:r>
+              <a:rPr lang="en-US" sz="1800" dirty="0" err="1">
+                <a:latin typeface="Lucida Console" panose="020B0609040504020204" pitchFamily="49" charset="0"/>
+              </a:rPr>
+              <a:t>my_wordlist','stemmer','ENGLISH</a:t>
+            </a:r>
+            <a:r>
+              <a:rPr lang="en-US" sz="1800" dirty="0">
+                <a:latin typeface="Lucida Console" panose="020B0609040504020204" pitchFamily="49" charset="0"/>
+              </a:rPr>
+              <a:t>');</a:t>
+            </a:r>
+          </a:p>
+          <a:p>
+            <a:r>
+              <a:rPr lang="en-US" sz="1800" dirty="0" smtClean="0">
+                <a:latin typeface="Lucida Console" panose="020B0609040504020204" pitchFamily="49" charset="0"/>
+              </a:rPr>
+              <a:t/>
+            </a:r>
+            <a:br>
+              <a:rPr lang="en-US" sz="1800" dirty="0" smtClean="0">
+                <a:latin typeface="Lucida Console" panose="020B0609040504020204" pitchFamily="49" charset="0"/>
+              </a:rPr>
+            </a:br>
+            <a:r>
+              <a:rPr lang="en-US" sz="1800" dirty="0" smtClean="0">
+                <a:latin typeface="Lucida Console" panose="020B0609040504020204" pitchFamily="49" charset="0"/>
+              </a:rPr>
+              <a:t>create </a:t>
+            </a:r>
+            <a:r>
+              <a:rPr lang="en-US" sz="1800" dirty="0">
+                <a:latin typeface="Lucida Console" panose="020B0609040504020204" pitchFamily="49" charset="0"/>
+              </a:rPr>
+              <a:t>index </a:t>
+            </a:r>
+            <a:r>
+              <a:rPr lang="en-US" sz="1800" dirty="0" err="1">
+                <a:latin typeface="Lucida Console" panose="020B0609040504020204" pitchFamily="49" charset="0"/>
+              </a:rPr>
+              <a:t>emp_txt_idx</a:t>
+            </a:r>
+            <a:r>
+              <a:rPr lang="en-US" sz="1800" dirty="0">
+                <a:latin typeface="Lucida Console" panose="020B0609040504020204" pitchFamily="49" charset="0"/>
+              </a:rPr>
+              <a:t> on </a:t>
+            </a:r>
+            <a:r>
+              <a:rPr lang="en-US" sz="1800" dirty="0" err="1">
+                <a:latin typeface="Lucida Console" panose="020B0609040504020204" pitchFamily="49" charset="0"/>
+              </a:rPr>
+              <a:t>emp</a:t>
+            </a:r>
+            <a:r>
+              <a:rPr lang="en-US" sz="1800" dirty="0">
+                <a:latin typeface="Lucida Console" panose="020B0609040504020204" pitchFamily="49" charset="0"/>
+              </a:rPr>
+              <a:t>( </a:t>
+            </a:r>
+            <a:r>
+              <a:rPr lang="en-US" sz="1800" dirty="0" err="1">
+                <a:latin typeface="Lucida Console" panose="020B0609040504020204" pitchFamily="49" charset="0"/>
+              </a:rPr>
+              <a:t>ename</a:t>
+            </a:r>
+            <a:r>
+              <a:rPr lang="en-US" sz="1800" dirty="0">
+                <a:latin typeface="Lucida Console" panose="020B0609040504020204" pitchFamily="49" charset="0"/>
+              </a:rPr>
+              <a:t> )</a:t>
+            </a:r>
+          </a:p>
+          <a:p>
+            <a:r>
+              <a:rPr lang="en-US" sz="1800" dirty="0" err="1">
+                <a:latin typeface="Lucida Console" panose="020B0609040504020204" pitchFamily="49" charset="0"/>
+              </a:rPr>
+              <a:t>indextype</a:t>
+            </a:r>
+            <a:r>
+              <a:rPr lang="en-US" sz="1800" dirty="0">
+                <a:latin typeface="Lucida Console" panose="020B0609040504020204" pitchFamily="49" charset="0"/>
+              </a:rPr>
+              <a:t> is </a:t>
+            </a:r>
+            <a:r>
+              <a:rPr lang="en-US" sz="1800" dirty="0" err="1">
+                <a:latin typeface="Lucida Console" panose="020B0609040504020204" pitchFamily="49" charset="0"/>
+              </a:rPr>
+              <a:t>ctxsys.context</a:t>
+            </a:r>
             <a:endParaRPr lang="en-US" sz="1800" dirty="0">
               <a:latin typeface="Lucida Console" panose="020B0609040504020204" pitchFamily="49" charset="0"/>
             </a:endParaRPr>
@@ -36756,92 +37723,49 @@
               <a:rPr lang="en-US" sz="1800" dirty="0">
                 <a:latin typeface="Lucida Console" panose="020B0609040504020204" pitchFamily="49" charset="0"/>
               </a:rPr>
-              <a:t>create index </a:t>
+              <a:t>parameters( '</a:t>
             </a:r>
             <a:r>
               <a:rPr lang="en-US" sz="1800" dirty="0" err="1">
                 <a:latin typeface="Lucida Console" panose="020B0609040504020204" pitchFamily="49" charset="0"/>
               </a:rPr>
-              <a:t>emp_txt_idx</a:t>
+              <a:t>datastore</a:t>
             </a:r>
             <a:r>
               <a:rPr lang="en-US" sz="1800" dirty="0">
                 <a:latin typeface="Lucida Console" panose="020B0609040504020204" pitchFamily="49" charset="0"/>
               </a:rPr>
-              <a:t> on </a:t>
+              <a:t> </a:t>
             </a:r>
             <a:r>
               <a:rPr lang="en-US" sz="1800" dirty="0" err="1">
                 <a:latin typeface="Lucida Console" panose="020B0609040504020204" pitchFamily="49" charset="0"/>
               </a:rPr>
-              <a:t>emp</a:t>
+              <a:t>my_mcds</a:t>
             </a:r>
             <a:r>
               <a:rPr lang="en-US" sz="1800" dirty="0">
                 <a:latin typeface="Lucida Console" panose="020B0609040504020204" pitchFamily="49" charset="0"/>
               </a:rPr>
-              <a:t>( </a:t>
+              <a:t> WORDLIST </a:t>
             </a:r>
             <a:r>
               <a:rPr lang="en-US" sz="1800" dirty="0" err="1">
                 <a:latin typeface="Lucida Console" panose="020B0609040504020204" pitchFamily="49" charset="0"/>
               </a:rPr>
-              <a:t>ename</a:t>
+              <a:t>my_wordlist</a:t>
             </a:r>
             <a:r>
               <a:rPr lang="en-US" sz="1800" dirty="0">
                 <a:latin typeface="Lucida Console" panose="020B0609040504020204" pitchFamily="49" charset="0"/>
               </a:rPr>
-              <a:t> )</a:t>
-            </a:r>
-          </a:p>
-          <a:p>
+              <a:t> LEXER </a:t>
+            </a:r>
             <a:r>
               <a:rPr lang="en-US" sz="1800" dirty="0" err="1">
                 <a:latin typeface="Lucida Console" panose="020B0609040504020204" pitchFamily="49" charset="0"/>
               </a:rPr>
-              <a:t>indextype</a:t>
-            </a:r>
-            <a:r>
-              <a:rPr lang="en-US" sz="1800" dirty="0">
-                <a:latin typeface="Lucida Console" panose="020B0609040504020204" pitchFamily="49" charset="0"/>
-              </a:rPr>
-              <a:t> is </a:t>
-            </a:r>
-            <a:r>
-              <a:rPr lang="en-US" sz="1800" dirty="0" err="1">
-                <a:latin typeface="Lucida Console" panose="020B0609040504020204" pitchFamily="49" charset="0"/>
-              </a:rPr>
-              <a:t>ctxsys.context</a:t>
-            </a:r>
-            <a:endParaRPr lang="en-US" sz="1800" dirty="0">
-              <a:latin typeface="Lucida Console" panose="020B0609040504020204" pitchFamily="49" charset="0"/>
-            </a:endParaRPr>
-          </a:p>
-          <a:p>
-            <a:r>
-              <a:rPr lang="en-US" sz="1800" dirty="0">
-                <a:latin typeface="Lucida Console" panose="020B0609040504020204" pitchFamily="49" charset="0"/>
-              </a:rPr>
-              <a:t>parameters( '</a:t>
-            </a:r>
-            <a:r>
-              <a:rPr lang="en-US" sz="1800" dirty="0" err="1">
-                <a:latin typeface="Lucida Console" panose="020B0609040504020204" pitchFamily="49" charset="0"/>
-              </a:rPr>
-              <a:t>datastore</a:t>
-            </a:r>
-            <a:r>
-              <a:rPr lang="en-US" sz="1800" dirty="0">
-                <a:latin typeface="Lucida Console" panose="020B0609040504020204" pitchFamily="49" charset="0"/>
-              </a:rPr>
-              <a:t> </a:t>
-            </a:r>
-            <a:r>
-              <a:rPr lang="en-US" sz="1800" dirty="0" err="1">
-                <a:latin typeface="Lucida Console" panose="020B0609040504020204" pitchFamily="49" charset="0"/>
-              </a:rPr>
-              <a:t>my_mcds</a:t>
+              <a:t>my_lexer</a:t>
             </a:r>
             <a:r>
               <a:rPr lang="en-US" sz="1800" dirty="0">
@@ -38038,13 +38962,31 @@
               <a:t> </a:t>
             </a:r>
             <a:r>
-              <a:rPr lang="nl-NL" sz="1800" dirty="0" err="1">
+              <a:rPr lang="nl-NL" sz="1800" dirty="0" smtClean="0">
+                <a:latin typeface="Lucida Console" panose="020B0609040504020204" pitchFamily="49" charset="0"/>
+              </a:rPr>
+              <a:t>stemming </a:t>
+            </a:r>
+            <a:r>
+              <a:rPr lang="nl-NL" sz="1800" dirty="0" err="1" smtClean="0">
+                <a:latin typeface="Lucida Console" panose="020B0609040504020204" pitchFamily="49" charset="0"/>
+              </a:rPr>
+              <a:t>and</a:t>
+            </a:r>
+            <a:r>
+              <a:rPr lang="nl-NL" sz="1800" dirty="0" smtClean="0">
+                <a:latin typeface="Lucida Console" panose="020B0609040504020204" pitchFamily="49" charset="0"/>
+              </a:rPr>
+              <a:t> </a:t>
+            </a:r>
+            <a:r>
+              <a:rPr lang="nl-NL" sz="1800" dirty="0" err="1" smtClean="0">
                 <a:latin typeface="Lucida Console" panose="020B0609040504020204" pitchFamily="49" charset="0"/>
               </a:rPr>
               <a:t>the</a:t>
             </a:r>
             <a:r>
-              <a:rPr lang="nl-NL" sz="1800" dirty="0">
+              <a:rPr lang="nl-NL" sz="1800" dirty="0" smtClean="0">
                 <a:latin typeface="Lucida Console" panose="020B0609040504020204" pitchFamily="49" charset="0"/>
               </a:rPr>
               <a:t> </a:t>
@@ -38106,8 +39048,17 @@
               <a:rPr lang="nl-NL" sz="1800" dirty="0">
                 <a:latin typeface="Lucida Console" panose="020B0609040504020204" pitchFamily="49" charset="0"/>
               </a:rPr>
-              <a:t> job</a:t>
-            </a:r>
+              <a:t> </a:t>
+            </a:r>
+            <a:r>
+              <a:rPr lang="nl-NL" sz="1800" dirty="0" smtClean="0">
+                <a:latin typeface="Lucida Console" panose="020B0609040504020204" pitchFamily="49" charset="0"/>
+              </a:rPr>
+              <a:t>job</a:t>
+            </a:r>
+            <a:endParaRPr lang="nl-NL" sz="1800" dirty="0">
+              <a:latin typeface="Lucida Console" panose="020B0609040504020204" pitchFamily="49" charset="0"/>
+            </a:endParaRPr>
           </a:p>
           <a:p>
             <a:r>

</xml_diff>